<commit_message>
analyzing high score networks
</commit_message>
<xml_diff>
--- a/Figures/piecing_together_figs.pptx
+++ b/Figures/piecing_together_figs.pptx
@@ -7,6 +7,7 @@
   <p:sldIdLst>
     <p:sldId id="256" r:id="rId2"/>
     <p:sldId id="257" r:id="rId3"/>
+    <p:sldId id="258" r:id="rId4"/>
   </p:sldIdLst>
   <p:sldSz cx="12192000" cy="6858000"/>
   <p:notesSz cx="6858000" cy="9144000"/>
@@ -244,7 +245,7 @@
           <a:p>
             <a:fld id="{24F71ACE-7A2E-44C7-BEB0-E2DBFE9F86D8}" type="datetimeFigureOut">
               <a:rPr lang="en-US" smtClean="0"/>
-              <a:t>5/17/2021</a:t>
+              <a:t>5/18/2021</a:t>
             </a:fld>
             <a:endParaRPr lang="en-US"/>
           </a:p>
@@ -414,7 +415,7 @@
           <a:p>
             <a:fld id="{24F71ACE-7A2E-44C7-BEB0-E2DBFE9F86D8}" type="datetimeFigureOut">
               <a:rPr lang="en-US" smtClean="0"/>
-              <a:t>5/17/2021</a:t>
+              <a:t>5/18/2021</a:t>
             </a:fld>
             <a:endParaRPr lang="en-US"/>
           </a:p>
@@ -594,7 +595,7 @@
           <a:p>
             <a:fld id="{24F71ACE-7A2E-44C7-BEB0-E2DBFE9F86D8}" type="datetimeFigureOut">
               <a:rPr lang="en-US" smtClean="0"/>
-              <a:t>5/17/2021</a:t>
+              <a:t>5/18/2021</a:t>
             </a:fld>
             <a:endParaRPr lang="en-US"/>
           </a:p>
@@ -764,7 +765,7 @@
           <a:p>
             <a:fld id="{24F71ACE-7A2E-44C7-BEB0-E2DBFE9F86D8}" type="datetimeFigureOut">
               <a:rPr lang="en-US" smtClean="0"/>
-              <a:t>5/17/2021</a:t>
+              <a:t>5/18/2021</a:t>
             </a:fld>
             <a:endParaRPr lang="en-US"/>
           </a:p>
@@ -1010,7 +1011,7 @@
           <a:p>
             <a:fld id="{24F71ACE-7A2E-44C7-BEB0-E2DBFE9F86D8}" type="datetimeFigureOut">
               <a:rPr lang="en-US" smtClean="0"/>
-              <a:t>5/17/2021</a:t>
+              <a:t>5/18/2021</a:t>
             </a:fld>
             <a:endParaRPr lang="en-US"/>
           </a:p>
@@ -1242,7 +1243,7 @@
           <a:p>
             <a:fld id="{24F71ACE-7A2E-44C7-BEB0-E2DBFE9F86D8}" type="datetimeFigureOut">
               <a:rPr lang="en-US" smtClean="0"/>
-              <a:t>5/17/2021</a:t>
+              <a:t>5/18/2021</a:t>
             </a:fld>
             <a:endParaRPr lang="en-US"/>
           </a:p>
@@ -1609,7 +1610,7 @@
           <a:p>
             <a:fld id="{24F71ACE-7A2E-44C7-BEB0-E2DBFE9F86D8}" type="datetimeFigureOut">
               <a:rPr lang="en-US" smtClean="0"/>
-              <a:t>5/17/2021</a:t>
+              <a:t>5/18/2021</a:t>
             </a:fld>
             <a:endParaRPr lang="en-US"/>
           </a:p>
@@ -1727,7 +1728,7 @@
           <a:p>
             <a:fld id="{24F71ACE-7A2E-44C7-BEB0-E2DBFE9F86D8}" type="datetimeFigureOut">
               <a:rPr lang="en-US" smtClean="0"/>
-              <a:t>5/17/2021</a:t>
+              <a:t>5/18/2021</a:t>
             </a:fld>
             <a:endParaRPr lang="en-US"/>
           </a:p>
@@ -1822,7 +1823,7 @@
           <a:p>
             <a:fld id="{24F71ACE-7A2E-44C7-BEB0-E2DBFE9F86D8}" type="datetimeFigureOut">
               <a:rPr lang="en-US" smtClean="0"/>
-              <a:t>5/17/2021</a:t>
+              <a:t>5/18/2021</a:t>
             </a:fld>
             <a:endParaRPr lang="en-US"/>
           </a:p>
@@ -2099,7 +2100,7 @@
           <a:p>
             <a:fld id="{24F71ACE-7A2E-44C7-BEB0-E2DBFE9F86D8}" type="datetimeFigureOut">
               <a:rPr lang="en-US" smtClean="0"/>
-              <a:t>5/17/2021</a:t>
+              <a:t>5/18/2021</a:t>
             </a:fld>
             <a:endParaRPr lang="en-US"/>
           </a:p>
@@ -2352,7 +2353,7 @@
           <a:p>
             <a:fld id="{24F71ACE-7A2E-44C7-BEB0-E2DBFE9F86D8}" type="datetimeFigureOut">
               <a:rPr lang="en-US" smtClean="0"/>
-              <a:t>5/17/2021</a:t>
+              <a:t>5/18/2021</a:t>
             </a:fld>
             <a:endParaRPr lang="en-US"/>
           </a:p>
@@ -2565,7 +2566,7 @@
           <a:p>
             <a:fld id="{24F71ACE-7A2E-44C7-BEB0-E2DBFE9F86D8}" type="datetimeFigureOut">
               <a:rPr lang="en-US" smtClean="0"/>
-              <a:t>5/17/2021</a:t>
+              <a:t>5/18/2021</a:t>
             </a:fld>
             <a:endParaRPr lang="en-US"/>
           </a:p>
@@ -2972,7 +2973,7 @@
       </p:grpSpPr>
       <p:pic>
         <p:nvPicPr>
-          <p:cNvPr id="6" name="Picture 5"/>
+          <p:cNvPr id="4" name="Picture 3"/>
           <p:cNvPicPr>
             <a:picLocks noChangeAspect="1"/>
           </p:cNvPicPr>
@@ -3200,6 +3201,173 @@
     <p:extLst>
       <p:ext uri="{BB962C8B-B14F-4D97-AF65-F5344CB8AC3E}">
         <p14:creationId xmlns:p14="http://schemas.microsoft.com/office/powerpoint/2010/main" val="3434677239"/>
+      </p:ext>
+    </p:extLst>
+  </p:cSld>
+  <p:clrMapOvr>
+    <a:masterClrMapping/>
+  </p:clrMapOvr>
+</p:sld>
+</file>
+
+<file path=ppt/slides/slide3.xml><?xml version="1.0" encoding="utf-8"?>
+<p:sld xmlns:a="http://schemas.openxmlformats.org/drawingml/2006/main" xmlns:r="http://schemas.openxmlformats.org/officeDocument/2006/relationships" xmlns:p="http://schemas.openxmlformats.org/presentationml/2006/main">
+  <p:cSld>
+    <p:spTree>
+      <p:nvGrpSpPr>
+        <p:cNvPr id="1" name=""/>
+        <p:cNvGrpSpPr/>
+        <p:nvPr/>
+      </p:nvGrpSpPr>
+      <p:grpSpPr>
+        <a:xfrm>
+          <a:off x="0" y="0"/>
+          <a:ext cx="0" cy="0"/>
+          <a:chOff x="0" y="0"/>
+          <a:chExt cx="0" cy="0"/>
+        </a:xfrm>
+      </p:grpSpPr>
+      <p:pic>
+        <p:nvPicPr>
+          <p:cNvPr id="4" name="Picture 3"/>
+          <p:cNvPicPr>
+            <a:picLocks noChangeAspect="1"/>
+          </p:cNvPicPr>
+          <p:nvPr/>
+        </p:nvPicPr>
+        <p:blipFill>
+          <a:blip r:embed="rId2" cstate="print">
+            <a:extLst>
+              <a:ext uri="{28A0092B-C50C-407E-A947-70E740481C1C}">
+                <a14:useLocalDpi xmlns:a14="http://schemas.microsoft.com/office/drawing/2010/main" val="0"/>
+              </a:ext>
+            </a:extLst>
+          </a:blip>
+          <a:stretch>
+            <a:fillRect/>
+          </a:stretch>
+        </p:blipFill>
+        <p:spPr>
+          <a:xfrm>
+            <a:off x="3446318" y="0"/>
+            <a:ext cx="5299364" cy="6858000"/>
+          </a:xfrm>
+          <a:prstGeom prst="rect">
+            <a:avLst/>
+          </a:prstGeom>
+        </p:spPr>
+      </p:pic>
+      <p:pic>
+        <p:nvPicPr>
+          <p:cNvPr id="5" name="Picture 4"/>
+          <p:cNvPicPr>
+            <a:picLocks noChangeAspect="1"/>
+          </p:cNvPicPr>
+          <p:nvPr/>
+        </p:nvPicPr>
+        <p:blipFill>
+          <a:blip r:embed="rId3" cstate="print">
+            <a:extLst>
+              <a:ext uri="{28A0092B-C50C-407E-A947-70E740481C1C}">
+                <a14:useLocalDpi xmlns:a14="http://schemas.microsoft.com/office/drawing/2010/main" val="0"/>
+              </a:ext>
+            </a:extLst>
+          </a:blip>
+          <a:stretch>
+            <a:fillRect/>
+          </a:stretch>
+        </p:blipFill>
+        <p:spPr>
+          <a:xfrm>
+            <a:off x="5138955" y="3231171"/>
+            <a:ext cx="1901778" cy="1358413"/>
+          </a:xfrm>
+          <a:prstGeom prst="rect">
+            <a:avLst/>
+          </a:prstGeom>
+          <a:ln>
+            <a:solidFill>
+              <a:schemeClr val="tx1"/>
+            </a:solidFill>
+          </a:ln>
+        </p:spPr>
+      </p:pic>
+      <p:sp>
+        <p:nvSpPr>
+          <p:cNvPr id="6" name="TextBox 5"/>
+          <p:cNvSpPr txBox="1"/>
+          <p:nvPr/>
+        </p:nvSpPr>
+        <p:spPr>
+          <a:xfrm>
+            <a:off x="3569676" y="114300"/>
+            <a:ext cx="395654" cy="307777"/>
+          </a:xfrm>
+          <a:prstGeom prst="rect">
+            <a:avLst/>
+          </a:prstGeom>
+          <a:noFill/>
+        </p:spPr>
+        <p:txBody>
+          <a:bodyPr wrap="square" rtlCol="0">
+            <a:spAutoFit/>
+          </a:bodyPr>
+          <a:lstStyle/>
+          <a:p>
+            <a:r>
+              <a:rPr lang="en-US" sz="1400" b="1" dirty="0" smtClean="0">
+                <a:latin typeface="Arial" panose="020B0604020202020204" pitchFamily="34" charset="0"/>
+                <a:cs typeface="Arial" panose="020B0604020202020204" pitchFamily="34" charset="0"/>
+              </a:rPr>
+              <a:t>A)</a:t>
+            </a:r>
+            <a:endParaRPr lang="en-US" sz="1400" b="1" dirty="0">
+              <a:latin typeface="Arial" panose="020B0604020202020204" pitchFamily="34" charset="0"/>
+              <a:cs typeface="Arial" panose="020B0604020202020204" pitchFamily="34" charset="0"/>
+            </a:endParaRPr>
+          </a:p>
+        </p:txBody>
+      </p:sp>
+      <p:sp>
+        <p:nvSpPr>
+          <p:cNvPr id="7" name="TextBox 6"/>
+          <p:cNvSpPr txBox="1"/>
+          <p:nvPr/>
+        </p:nvSpPr>
+        <p:spPr>
+          <a:xfrm>
+            <a:off x="3569676" y="3134458"/>
+            <a:ext cx="395654" cy="307777"/>
+          </a:xfrm>
+          <a:prstGeom prst="rect">
+            <a:avLst/>
+          </a:prstGeom>
+          <a:noFill/>
+        </p:spPr>
+        <p:txBody>
+          <a:bodyPr wrap="square" rtlCol="0">
+            <a:spAutoFit/>
+          </a:bodyPr>
+          <a:lstStyle/>
+          <a:p>
+            <a:r>
+              <a:rPr lang="en-US" sz="1400" b="1" dirty="0" smtClean="0">
+                <a:latin typeface="Arial" panose="020B0604020202020204" pitchFamily="34" charset="0"/>
+                <a:cs typeface="Arial" panose="020B0604020202020204" pitchFamily="34" charset="0"/>
+              </a:rPr>
+              <a:t>B)</a:t>
+            </a:r>
+            <a:endParaRPr lang="en-US" sz="1400" b="1" dirty="0">
+              <a:latin typeface="Arial" panose="020B0604020202020204" pitchFamily="34" charset="0"/>
+              <a:cs typeface="Arial" panose="020B0604020202020204" pitchFamily="34" charset="0"/>
+            </a:endParaRPr>
+          </a:p>
+        </p:txBody>
+      </p:sp>
+    </p:spTree>
+    <p:extLst>
+      <p:ext uri="{BB962C8B-B14F-4D97-AF65-F5344CB8AC3E}">
+        <p14:creationId xmlns:p14="http://schemas.microsoft.com/office/powerpoint/2010/main" val="2618019842"/>
       </p:ext>
     </p:extLst>
   </p:cSld>

</xml_diff>

<commit_message>
analysis of conn scores, hubs and protection
</commit_message>
<xml_diff>
--- a/Figures/piecing_together_figs.pptx
+++ b/Figures/piecing_together_figs.pptx
@@ -8,6 +8,8 @@
     <p:sldId id="256" r:id="rId2"/>
     <p:sldId id="257" r:id="rId3"/>
     <p:sldId id="258" r:id="rId4"/>
+    <p:sldId id="259" r:id="rId5"/>
+    <p:sldId id="260" r:id="rId6"/>
   </p:sldIdLst>
   <p:sldSz cx="12192000" cy="6858000"/>
   <p:notesSz cx="6858000" cy="9144000"/>
@@ -245,7 +247,7 @@
           <a:p>
             <a:fld id="{24F71ACE-7A2E-44C7-BEB0-E2DBFE9F86D8}" type="datetimeFigureOut">
               <a:rPr lang="en-US" smtClean="0"/>
-              <a:t>5/18/2021</a:t>
+              <a:t>5/19/2021</a:t>
             </a:fld>
             <a:endParaRPr lang="en-US"/>
           </a:p>
@@ -415,7 +417,7 @@
           <a:p>
             <a:fld id="{24F71ACE-7A2E-44C7-BEB0-E2DBFE9F86D8}" type="datetimeFigureOut">
               <a:rPr lang="en-US" smtClean="0"/>
-              <a:t>5/18/2021</a:t>
+              <a:t>5/19/2021</a:t>
             </a:fld>
             <a:endParaRPr lang="en-US"/>
           </a:p>
@@ -595,7 +597,7 @@
           <a:p>
             <a:fld id="{24F71ACE-7A2E-44C7-BEB0-E2DBFE9F86D8}" type="datetimeFigureOut">
               <a:rPr lang="en-US" smtClean="0"/>
-              <a:t>5/18/2021</a:t>
+              <a:t>5/19/2021</a:t>
             </a:fld>
             <a:endParaRPr lang="en-US"/>
           </a:p>
@@ -765,7 +767,7 @@
           <a:p>
             <a:fld id="{24F71ACE-7A2E-44C7-BEB0-E2DBFE9F86D8}" type="datetimeFigureOut">
               <a:rPr lang="en-US" smtClean="0"/>
-              <a:t>5/18/2021</a:t>
+              <a:t>5/19/2021</a:t>
             </a:fld>
             <a:endParaRPr lang="en-US"/>
           </a:p>
@@ -1011,7 +1013,7 @@
           <a:p>
             <a:fld id="{24F71ACE-7A2E-44C7-BEB0-E2DBFE9F86D8}" type="datetimeFigureOut">
               <a:rPr lang="en-US" smtClean="0"/>
-              <a:t>5/18/2021</a:t>
+              <a:t>5/19/2021</a:t>
             </a:fld>
             <a:endParaRPr lang="en-US"/>
           </a:p>
@@ -1243,7 +1245,7 @@
           <a:p>
             <a:fld id="{24F71ACE-7A2E-44C7-BEB0-E2DBFE9F86D8}" type="datetimeFigureOut">
               <a:rPr lang="en-US" smtClean="0"/>
-              <a:t>5/18/2021</a:t>
+              <a:t>5/19/2021</a:t>
             </a:fld>
             <a:endParaRPr lang="en-US"/>
           </a:p>
@@ -1610,7 +1612,7 @@
           <a:p>
             <a:fld id="{24F71ACE-7A2E-44C7-BEB0-E2DBFE9F86D8}" type="datetimeFigureOut">
               <a:rPr lang="en-US" smtClean="0"/>
-              <a:t>5/18/2021</a:t>
+              <a:t>5/19/2021</a:t>
             </a:fld>
             <a:endParaRPr lang="en-US"/>
           </a:p>
@@ -1728,7 +1730,7 @@
           <a:p>
             <a:fld id="{24F71ACE-7A2E-44C7-BEB0-E2DBFE9F86D8}" type="datetimeFigureOut">
               <a:rPr lang="en-US" smtClean="0"/>
-              <a:t>5/18/2021</a:t>
+              <a:t>5/19/2021</a:t>
             </a:fld>
             <a:endParaRPr lang="en-US"/>
           </a:p>
@@ -1823,7 +1825,7 @@
           <a:p>
             <a:fld id="{24F71ACE-7A2E-44C7-BEB0-E2DBFE9F86D8}" type="datetimeFigureOut">
               <a:rPr lang="en-US" smtClean="0"/>
-              <a:t>5/18/2021</a:t>
+              <a:t>5/19/2021</a:t>
             </a:fld>
             <a:endParaRPr lang="en-US"/>
           </a:p>
@@ -2100,7 +2102,7 @@
           <a:p>
             <a:fld id="{24F71ACE-7A2E-44C7-BEB0-E2DBFE9F86D8}" type="datetimeFigureOut">
               <a:rPr lang="en-US" smtClean="0"/>
-              <a:t>5/18/2021</a:t>
+              <a:t>5/19/2021</a:t>
             </a:fld>
             <a:endParaRPr lang="en-US"/>
           </a:p>
@@ -2353,7 +2355,7 @@
           <a:p>
             <a:fld id="{24F71ACE-7A2E-44C7-BEB0-E2DBFE9F86D8}" type="datetimeFigureOut">
               <a:rPr lang="en-US" smtClean="0"/>
-              <a:t>5/18/2021</a:t>
+              <a:t>5/19/2021</a:t>
             </a:fld>
             <a:endParaRPr lang="en-US"/>
           </a:p>
@@ -2566,7 +2568,7 @@
           <a:p>
             <a:fld id="{24F71ACE-7A2E-44C7-BEB0-E2DBFE9F86D8}" type="datetimeFigureOut">
               <a:rPr lang="en-US" smtClean="0"/>
-              <a:t>5/18/2021</a:t>
+              <a:t>5/19/2021</a:t>
             </a:fld>
             <a:endParaRPr lang="en-US"/>
           </a:p>
@@ -3377,6 +3379,3295 @@
 </p:sld>
 </file>
 
+<file path=ppt/slides/slide4.xml><?xml version="1.0" encoding="utf-8"?>
+<p:sld xmlns:a="http://schemas.openxmlformats.org/drawingml/2006/main" xmlns:r="http://schemas.openxmlformats.org/officeDocument/2006/relationships" xmlns:p="http://schemas.openxmlformats.org/presentationml/2006/main">
+  <p:cSld>
+    <p:spTree>
+      <p:nvGrpSpPr>
+        <p:cNvPr id="1" name=""/>
+        <p:cNvGrpSpPr/>
+        <p:nvPr/>
+      </p:nvGrpSpPr>
+      <p:grpSpPr>
+        <a:xfrm>
+          <a:off x="0" y="0"/>
+          <a:ext cx="0" cy="0"/>
+          <a:chOff x="0" y="0"/>
+          <a:chExt cx="0" cy="0"/>
+        </a:xfrm>
+      </p:grpSpPr>
+      <p:pic>
+        <p:nvPicPr>
+          <p:cNvPr id="4" name="Picture 3"/>
+          <p:cNvPicPr>
+            <a:picLocks noChangeAspect="1"/>
+          </p:cNvPicPr>
+          <p:nvPr/>
+        </p:nvPicPr>
+        <p:blipFill>
+          <a:blip r:embed="rId2" cstate="print">
+            <a:extLst>
+              <a:ext uri="{28A0092B-C50C-407E-A947-70E740481C1C}">
+                <a14:useLocalDpi xmlns:a14="http://schemas.microsoft.com/office/drawing/2010/main" val="0"/>
+              </a:ext>
+            </a:extLst>
+          </a:blip>
+          <a:stretch>
+            <a:fillRect/>
+          </a:stretch>
+        </p:blipFill>
+        <p:spPr>
+          <a:xfrm>
+            <a:off x="3446318" y="0"/>
+            <a:ext cx="5299364" cy="6858000"/>
+          </a:xfrm>
+          <a:prstGeom prst="rect">
+            <a:avLst/>
+          </a:prstGeom>
+        </p:spPr>
+      </p:pic>
+      <p:sp>
+        <p:nvSpPr>
+          <p:cNvPr id="5" name="Oval 4"/>
+          <p:cNvSpPr/>
+          <p:nvPr/>
+        </p:nvSpPr>
+        <p:spPr>
+          <a:xfrm>
+            <a:off x="6910749" y="5477602"/>
+            <a:ext cx="228600" cy="228600"/>
+          </a:xfrm>
+          <a:prstGeom prst="ellipse">
+            <a:avLst/>
+          </a:prstGeom>
+          <a:solidFill>
+            <a:schemeClr val="bg1"/>
+          </a:solidFill>
+          <a:ln>
+            <a:solidFill>
+              <a:schemeClr val="tx1"/>
+            </a:solidFill>
+          </a:ln>
+        </p:spPr>
+        <p:style>
+          <a:lnRef idx="2">
+            <a:schemeClr val="accent1">
+              <a:shade val="50000"/>
+            </a:schemeClr>
+          </a:lnRef>
+          <a:fillRef idx="1">
+            <a:schemeClr val="accent1"/>
+          </a:fillRef>
+          <a:effectRef idx="0">
+            <a:schemeClr val="accent1"/>
+          </a:effectRef>
+          <a:fontRef idx="minor">
+            <a:schemeClr val="lt1"/>
+          </a:fontRef>
+        </p:style>
+        <p:txBody>
+          <a:bodyPr rtlCol="0" anchor="ctr"/>
+          <a:lstStyle/>
+          <a:p>
+            <a:pPr algn="ctr"/>
+            <a:r>
+              <a:rPr lang="en-US" sz="1600" dirty="0" smtClean="0">
+                <a:solidFill>
+                  <a:schemeClr val="tx1"/>
+                </a:solidFill>
+                <a:latin typeface="Arial" panose="020B0604020202020204" pitchFamily="34" charset="0"/>
+                <a:cs typeface="Arial" panose="020B0604020202020204" pitchFamily="34" charset="0"/>
+              </a:rPr>
+              <a:t>1</a:t>
+            </a:r>
+            <a:endParaRPr lang="en-US" sz="1600" dirty="0">
+              <a:solidFill>
+                <a:schemeClr val="tx1"/>
+              </a:solidFill>
+              <a:latin typeface="Arial" panose="020B0604020202020204" pitchFamily="34" charset="0"/>
+              <a:cs typeface="Arial" panose="020B0604020202020204" pitchFamily="34" charset="0"/>
+            </a:endParaRPr>
+          </a:p>
+        </p:txBody>
+      </p:sp>
+      <p:sp>
+        <p:nvSpPr>
+          <p:cNvPr id="7" name="Oval 6"/>
+          <p:cNvSpPr/>
+          <p:nvPr/>
+        </p:nvSpPr>
+        <p:spPr>
+          <a:xfrm>
+            <a:off x="7617072" y="4337528"/>
+            <a:ext cx="228600" cy="228600"/>
+          </a:xfrm>
+          <a:prstGeom prst="ellipse">
+            <a:avLst/>
+          </a:prstGeom>
+          <a:solidFill>
+            <a:schemeClr val="bg1"/>
+          </a:solidFill>
+          <a:ln>
+            <a:solidFill>
+              <a:schemeClr val="tx1"/>
+            </a:solidFill>
+          </a:ln>
+        </p:spPr>
+        <p:style>
+          <a:lnRef idx="2">
+            <a:schemeClr val="accent1">
+              <a:shade val="50000"/>
+            </a:schemeClr>
+          </a:lnRef>
+          <a:fillRef idx="1">
+            <a:schemeClr val="accent1"/>
+          </a:fillRef>
+          <a:effectRef idx="0">
+            <a:schemeClr val="accent1"/>
+          </a:effectRef>
+          <a:fontRef idx="minor">
+            <a:schemeClr val="lt1"/>
+          </a:fontRef>
+        </p:style>
+        <p:txBody>
+          <a:bodyPr rtlCol="0" anchor="ctr"/>
+          <a:lstStyle/>
+          <a:p>
+            <a:pPr algn="ctr"/>
+            <a:r>
+              <a:rPr lang="en-US" sz="1600" dirty="0" smtClean="0">
+                <a:solidFill>
+                  <a:schemeClr val="tx1"/>
+                </a:solidFill>
+                <a:latin typeface="Arial" panose="020B0604020202020204" pitchFamily="34" charset="0"/>
+                <a:cs typeface="Arial" panose="020B0604020202020204" pitchFamily="34" charset="0"/>
+              </a:rPr>
+              <a:t>3</a:t>
+            </a:r>
+            <a:endParaRPr lang="en-US" sz="1600" dirty="0">
+              <a:solidFill>
+                <a:schemeClr val="tx1"/>
+              </a:solidFill>
+              <a:latin typeface="Arial" panose="020B0604020202020204" pitchFamily="34" charset="0"/>
+              <a:cs typeface="Arial" panose="020B0604020202020204" pitchFamily="34" charset="0"/>
+            </a:endParaRPr>
+          </a:p>
+        </p:txBody>
+      </p:sp>
+      <p:cxnSp>
+        <p:nvCxnSpPr>
+          <p:cNvPr id="9" name="Straight Connector 8"/>
+          <p:cNvCxnSpPr>
+            <a:stCxn id="7" idx="2"/>
+          </p:cNvCxnSpPr>
+          <p:nvPr/>
+        </p:nvCxnSpPr>
+        <p:spPr>
+          <a:xfrm flipH="1">
+            <a:off x="7280031" y="4451828"/>
+            <a:ext cx="337041" cy="5872"/>
+          </a:xfrm>
+          <a:prstGeom prst="line">
+            <a:avLst/>
+          </a:prstGeom>
+          <a:ln w="28575">
+            <a:solidFill>
+              <a:schemeClr val="tx1"/>
+            </a:solidFill>
+          </a:ln>
+        </p:spPr>
+        <p:style>
+          <a:lnRef idx="1">
+            <a:schemeClr val="accent1"/>
+          </a:lnRef>
+          <a:fillRef idx="0">
+            <a:schemeClr val="accent1"/>
+          </a:fillRef>
+          <a:effectRef idx="0">
+            <a:schemeClr val="accent1"/>
+          </a:effectRef>
+          <a:fontRef idx="minor">
+            <a:schemeClr val="tx1"/>
+          </a:fontRef>
+        </p:style>
+      </p:cxnSp>
+      <p:sp>
+        <p:nvSpPr>
+          <p:cNvPr id="10" name="Oval 9"/>
+          <p:cNvSpPr/>
+          <p:nvPr/>
+        </p:nvSpPr>
+        <p:spPr>
+          <a:xfrm>
+            <a:off x="7663966" y="4621808"/>
+            <a:ext cx="228600" cy="228600"/>
+          </a:xfrm>
+          <a:prstGeom prst="ellipse">
+            <a:avLst/>
+          </a:prstGeom>
+          <a:solidFill>
+            <a:schemeClr val="bg1"/>
+          </a:solidFill>
+          <a:ln>
+            <a:solidFill>
+              <a:schemeClr val="tx1"/>
+            </a:solidFill>
+          </a:ln>
+        </p:spPr>
+        <p:style>
+          <a:lnRef idx="2">
+            <a:schemeClr val="accent1">
+              <a:shade val="50000"/>
+            </a:schemeClr>
+          </a:lnRef>
+          <a:fillRef idx="1">
+            <a:schemeClr val="accent1"/>
+          </a:fillRef>
+          <a:effectRef idx="0">
+            <a:schemeClr val="accent1"/>
+          </a:effectRef>
+          <a:fontRef idx="minor">
+            <a:schemeClr val="lt1"/>
+          </a:fontRef>
+        </p:style>
+        <p:txBody>
+          <a:bodyPr rtlCol="0" anchor="ctr"/>
+          <a:lstStyle/>
+          <a:p>
+            <a:pPr algn="ctr"/>
+            <a:r>
+              <a:rPr lang="en-US" sz="1600" dirty="0" smtClean="0">
+                <a:solidFill>
+                  <a:schemeClr val="tx1"/>
+                </a:solidFill>
+                <a:latin typeface="Arial" panose="020B0604020202020204" pitchFamily="34" charset="0"/>
+                <a:cs typeface="Arial" panose="020B0604020202020204" pitchFamily="34" charset="0"/>
+              </a:rPr>
+              <a:t>2</a:t>
+            </a:r>
+            <a:endParaRPr lang="en-US" sz="1600" dirty="0">
+              <a:solidFill>
+                <a:schemeClr val="tx1"/>
+              </a:solidFill>
+              <a:latin typeface="Arial" panose="020B0604020202020204" pitchFamily="34" charset="0"/>
+              <a:cs typeface="Arial" panose="020B0604020202020204" pitchFamily="34" charset="0"/>
+            </a:endParaRPr>
+          </a:p>
+        </p:txBody>
+      </p:sp>
+      <p:cxnSp>
+        <p:nvCxnSpPr>
+          <p:cNvPr id="11" name="Straight Connector 10"/>
+          <p:cNvCxnSpPr>
+            <a:stCxn id="10" idx="2"/>
+          </p:cNvCxnSpPr>
+          <p:nvPr/>
+        </p:nvCxnSpPr>
+        <p:spPr>
+          <a:xfrm flipH="1" flipV="1">
+            <a:off x="7280031" y="4617406"/>
+            <a:ext cx="383935" cy="118702"/>
+          </a:xfrm>
+          <a:prstGeom prst="line">
+            <a:avLst/>
+          </a:prstGeom>
+          <a:ln w="28575">
+            <a:solidFill>
+              <a:schemeClr val="tx1"/>
+            </a:solidFill>
+          </a:ln>
+        </p:spPr>
+        <p:style>
+          <a:lnRef idx="1">
+            <a:schemeClr val="accent1"/>
+          </a:lnRef>
+          <a:fillRef idx="0">
+            <a:schemeClr val="accent1"/>
+          </a:fillRef>
+          <a:effectRef idx="0">
+            <a:schemeClr val="accent1"/>
+          </a:effectRef>
+          <a:fontRef idx="minor">
+            <a:schemeClr val="tx1"/>
+          </a:fontRef>
+        </p:style>
+      </p:cxnSp>
+      <p:sp>
+        <p:nvSpPr>
+          <p:cNvPr id="14" name="Oval 13"/>
+          <p:cNvSpPr/>
+          <p:nvPr/>
+        </p:nvSpPr>
+        <p:spPr>
+          <a:xfrm>
+            <a:off x="7488116" y="5105386"/>
+            <a:ext cx="228600" cy="228600"/>
+          </a:xfrm>
+          <a:prstGeom prst="ellipse">
+            <a:avLst/>
+          </a:prstGeom>
+          <a:solidFill>
+            <a:schemeClr val="bg1"/>
+          </a:solidFill>
+          <a:ln>
+            <a:solidFill>
+              <a:schemeClr val="tx1"/>
+            </a:solidFill>
+          </a:ln>
+        </p:spPr>
+        <p:style>
+          <a:lnRef idx="2">
+            <a:schemeClr val="accent1">
+              <a:shade val="50000"/>
+            </a:schemeClr>
+          </a:lnRef>
+          <a:fillRef idx="1">
+            <a:schemeClr val="accent1"/>
+          </a:fillRef>
+          <a:effectRef idx="0">
+            <a:schemeClr val="accent1"/>
+          </a:effectRef>
+          <a:fontRef idx="minor">
+            <a:schemeClr val="lt1"/>
+          </a:fontRef>
+        </p:style>
+        <p:txBody>
+          <a:bodyPr rtlCol="0" anchor="ctr"/>
+          <a:lstStyle/>
+          <a:p>
+            <a:pPr algn="ctr"/>
+            <a:r>
+              <a:rPr lang="en-US" sz="1600" dirty="0" smtClean="0">
+                <a:solidFill>
+                  <a:schemeClr val="tx1"/>
+                </a:solidFill>
+                <a:latin typeface="Arial" panose="020B0604020202020204" pitchFamily="34" charset="0"/>
+                <a:cs typeface="Arial" panose="020B0604020202020204" pitchFamily="34" charset="0"/>
+              </a:rPr>
+              <a:t>4</a:t>
+            </a:r>
+            <a:endParaRPr lang="en-US" sz="1600" dirty="0">
+              <a:solidFill>
+                <a:schemeClr val="tx1"/>
+              </a:solidFill>
+              <a:latin typeface="Arial" panose="020B0604020202020204" pitchFamily="34" charset="0"/>
+              <a:cs typeface="Arial" panose="020B0604020202020204" pitchFamily="34" charset="0"/>
+            </a:endParaRPr>
+          </a:p>
+        </p:txBody>
+      </p:sp>
+      <p:cxnSp>
+        <p:nvCxnSpPr>
+          <p:cNvPr id="15" name="Straight Connector 14"/>
+          <p:cNvCxnSpPr>
+            <a:stCxn id="14" idx="2"/>
+          </p:cNvCxnSpPr>
+          <p:nvPr/>
+        </p:nvCxnSpPr>
+        <p:spPr>
+          <a:xfrm flipH="1" flipV="1">
+            <a:off x="7139349" y="5105386"/>
+            <a:ext cx="348767" cy="114300"/>
+          </a:xfrm>
+          <a:prstGeom prst="line">
+            <a:avLst/>
+          </a:prstGeom>
+          <a:ln w="28575">
+            <a:solidFill>
+              <a:schemeClr val="tx1"/>
+            </a:solidFill>
+          </a:ln>
+        </p:spPr>
+        <p:style>
+          <a:lnRef idx="1">
+            <a:schemeClr val="accent1"/>
+          </a:lnRef>
+          <a:fillRef idx="0">
+            <a:schemeClr val="accent1"/>
+          </a:fillRef>
+          <a:effectRef idx="0">
+            <a:schemeClr val="accent1"/>
+          </a:effectRef>
+          <a:fontRef idx="minor">
+            <a:schemeClr val="tx1"/>
+          </a:fontRef>
+        </p:style>
+      </p:cxnSp>
+      <p:sp>
+        <p:nvSpPr>
+          <p:cNvPr id="17" name="Oval 16"/>
+          <p:cNvSpPr/>
+          <p:nvPr/>
+        </p:nvSpPr>
+        <p:spPr>
+          <a:xfrm>
+            <a:off x="6353912" y="5650512"/>
+            <a:ext cx="228600" cy="228600"/>
+          </a:xfrm>
+          <a:prstGeom prst="ellipse">
+            <a:avLst/>
+          </a:prstGeom>
+          <a:solidFill>
+            <a:schemeClr val="bg1"/>
+          </a:solidFill>
+          <a:ln>
+            <a:solidFill>
+              <a:schemeClr val="tx1"/>
+            </a:solidFill>
+          </a:ln>
+        </p:spPr>
+        <p:style>
+          <a:lnRef idx="2">
+            <a:schemeClr val="accent1">
+              <a:shade val="50000"/>
+            </a:schemeClr>
+          </a:lnRef>
+          <a:fillRef idx="1">
+            <a:schemeClr val="accent1"/>
+          </a:fillRef>
+          <a:effectRef idx="0">
+            <a:schemeClr val="accent1"/>
+          </a:effectRef>
+          <a:fontRef idx="minor">
+            <a:schemeClr val="lt1"/>
+          </a:fontRef>
+        </p:style>
+        <p:txBody>
+          <a:bodyPr rtlCol="0" anchor="ctr"/>
+          <a:lstStyle/>
+          <a:p>
+            <a:pPr algn="ctr"/>
+            <a:r>
+              <a:rPr lang="en-US" sz="1600" dirty="0">
+                <a:solidFill>
+                  <a:schemeClr val="tx1"/>
+                </a:solidFill>
+                <a:latin typeface="Arial" panose="020B0604020202020204" pitchFamily="34" charset="0"/>
+                <a:cs typeface="Arial" panose="020B0604020202020204" pitchFamily="34" charset="0"/>
+              </a:rPr>
+              <a:t>5</a:t>
+            </a:r>
+            <a:endParaRPr lang="en-US" sz="1600" dirty="0">
+              <a:solidFill>
+                <a:schemeClr val="tx1"/>
+              </a:solidFill>
+              <a:latin typeface="Arial" panose="020B0604020202020204" pitchFamily="34" charset="0"/>
+              <a:cs typeface="Arial" panose="020B0604020202020204" pitchFamily="34" charset="0"/>
+            </a:endParaRPr>
+          </a:p>
+        </p:txBody>
+      </p:sp>
+      <p:cxnSp>
+        <p:nvCxnSpPr>
+          <p:cNvPr id="18" name="Straight Connector 17"/>
+          <p:cNvCxnSpPr/>
+          <p:nvPr/>
+        </p:nvCxnSpPr>
+        <p:spPr>
+          <a:xfrm flipV="1">
+            <a:off x="6450624" y="5246066"/>
+            <a:ext cx="0" cy="404450"/>
+          </a:xfrm>
+          <a:prstGeom prst="line">
+            <a:avLst/>
+          </a:prstGeom>
+          <a:ln w="28575">
+            <a:solidFill>
+              <a:schemeClr val="tx1"/>
+            </a:solidFill>
+          </a:ln>
+        </p:spPr>
+        <p:style>
+          <a:lnRef idx="1">
+            <a:schemeClr val="accent1"/>
+          </a:lnRef>
+          <a:fillRef idx="0">
+            <a:schemeClr val="accent1"/>
+          </a:fillRef>
+          <a:effectRef idx="0">
+            <a:schemeClr val="accent1"/>
+          </a:effectRef>
+          <a:fontRef idx="minor">
+            <a:schemeClr val="tx1"/>
+          </a:fontRef>
+        </p:style>
+      </p:cxnSp>
+      <p:sp>
+        <p:nvSpPr>
+          <p:cNvPr id="21" name="Oval 20"/>
+          <p:cNvSpPr/>
+          <p:nvPr/>
+        </p:nvSpPr>
+        <p:spPr>
+          <a:xfrm>
+            <a:off x="7681552" y="3883262"/>
+            <a:ext cx="228600" cy="228600"/>
+          </a:xfrm>
+          <a:prstGeom prst="ellipse">
+            <a:avLst/>
+          </a:prstGeom>
+          <a:solidFill>
+            <a:schemeClr val="bg1"/>
+          </a:solidFill>
+          <a:ln>
+            <a:solidFill>
+              <a:schemeClr val="tx1"/>
+            </a:solidFill>
+          </a:ln>
+        </p:spPr>
+        <p:style>
+          <a:lnRef idx="2">
+            <a:schemeClr val="accent1">
+              <a:shade val="50000"/>
+            </a:schemeClr>
+          </a:lnRef>
+          <a:fillRef idx="1">
+            <a:schemeClr val="accent1"/>
+          </a:fillRef>
+          <a:effectRef idx="0">
+            <a:schemeClr val="accent1"/>
+          </a:effectRef>
+          <a:fontRef idx="minor">
+            <a:schemeClr val="lt1"/>
+          </a:fontRef>
+        </p:style>
+        <p:txBody>
+          <a:bodyPr rtlCol="0" anchor="ctr"/>
+          <a:lstStyle/>
+          <a:p>
+            <a:pPr algn="ctr"/>
+            <a:r>
+              <a:rPr lang="en-US" sz="1600" dirty="0" smtClean="0">
+                <a:solidFill>
+                  <a:schemeClr val="tx1"/>
+                </a:solidFill>
+                <a:latin typeface="Arial" panose="020B0604020202020204" pitchFamily="34" charset="0"/>
+                <a:cs typeface="Arial" panose="020B0604020202020204" pitchFamily="34" charset="0"/>
+              </a:rPr>
+              <a:t>6</a:t>
+            </a:r>
+            <a:endParaRPr lang="en-US" sz="1600" dirty="0">
+              <a:solidFill>
+                <a:schemeClr val="tx1"/>
+              </a:solidFill>
+              <a:latin typeface="Arial" panose="020B0604020202020204" pitchFamily="34" charset="0"/>
+              <a:cs typeface="Arial" panose="020B0604020202020204" pitchFamily="34" charset="0"/>
+            </a:endParaRPr>
+          </a:p>
+        </p:txBody>
+      </p:sp>
+      <p:cxnSp>
+        <p:nvCxnSpPr>
+          <p:cNvPr id="22" name="Straight Connector 21"/>
+          <p:cNvCxnSpPr>
+            <a:stCxn id="21" idx="2"/>
+          </p:cNvCxnSpPr>
+          <p:nvPr/>
+        </p:nvCxnSpPr>
+        <p:spPr>
+          <a:xfrm flipH="1">
+            <a:off x="7344511" y="3997562"/>
+            <a:ext cx="337041" cy="5872"/>
+          </a:xfrm>
+          <a:prstGeom prst="line">
+            <a:avLst/>
+          </a:prstGeom>
+          <a:ln w="28575">
+            <a:solidFill>
+              <a:schemeClr val="tx1"/>
+            </a:solidFill>
+          </a:ln>
+        </p:spPr>
+        <p:style>
+          <a:lnRef idx="1">
+            <a:schemeClr val="accent1"/>
+          </a:lnRef>
+          <a:fillRef idx="0">
+            <a:schemeClr val="accent1"/>
+          </a:fillRef>
+          <a:effectRef idx="0">
+            <a:schemeClr val="accent1"/>
+          </a:effectRef>
+          <a:fontRef idx="minor">
+            <a:schemeClr val="tx1"/>
+          </a:fontRef>
+        </p:style>
+      </p:cxnSp>
+      <p:sp>
+        <p:nvSpPr>
+          <p:cNvPr id="23" name="Oval 22"/>
+          <p:cNvSpPr/>
+          <p:nvPr/>
+        </p:nvSpPr>
+        <p:spPr>
+          <a:xfrm>
+            <a:off x="4700960" y="3452436"/>
+            <a:ext cx="228600" cy="228600"/>
+          </a:xfrm>
+          <a:prstGeom prst="ellipse">
+            <a:avLst/>
+          </a:prstGeom>
+          <a:solidFill>
+            <a:schemeClr val="bg1"/>
+          </a:solidFill>
+          <a:ln>
+            <a:solidFill>
+              <a:schemeClr val="tx1"/>
+            </a:solidFill>
+          </a:ln>
+        </p:spPr>
+        <p:style>
+          <a:lnRef idx="2">
+            <a:schemeClr val="accent1">
+              <a:shade val="50000"/>
+            </a:schemeClr>
+          </a:lnRef>
+          <a:fillRef idx="1">
+            <a:schemeClr val="accent1"/>
+          </a:fillRef>
+          <a:effectRef idx="0">
+            <a:schemeClr val="accent1"/>
+          </a:effectRef>
+          <a:fontRef idx="minor">
+            <a:schemeClr val="lt1"/>
+          </a:fontRef>
+        </p:style>
+        <p:txBody>
+          <a:bodyPr rtlCol="0" anchor="ctr"/>
+          <a:lstStyle/>
+          <a:p>
+            <a:pPr algn="ctr"/>
+            <a:r>
+              <a:rPr lang="en-US" sz="1600" dirty="0" smtClean="0">
+                <a:solidFill>
+                  <a:schemeClr val="tx1"/>
+                </a:solidFill>
+                <a:latin typeface="Arial" panose="020B0604020202020204" pitchFamily="34" charset="0"/>
+                <a:cs typeface="Arial" panose="020B0604020202020204" pitchFamily="34" charset="0"/>
+              </a:rPr>
+              <a:t>7</a:t>
+            </a:r>
+            <a:endParaRPr lang="en-US" sz="1600" dirty="0">
+              <a:solidFill>
+                <a:schemeClr val="tx1"/>
+              </a:solidFill>
+              <a:latin typeface="Arial" panose="020B0604020202020204" pitchFamily="34" charset="0"/>
+              <a:cs typeface="Arial" panose="020B0604020202020204" pitchFamily="34" charset="0"/>
+            </a:endParaRPr>
+          </a:p>
+        </p:txBody>
+      </p:sp>
+      <p:sp>
+        <p:nvSpPr>
+          <p:cNvPr id="25" name="Oval 24"/>
+          <p:cNvSpPr/>
+          <p:nvPr/>
+        </p:nvSpPr>
+        <p:spPr>
+          <a:xfrm>
+            <a:off x="6629401" y="5732576"/>
+            <a:ext cx="228600" cy="228600"/>
+          </a:xfrm>
+          <a:prstGeom prst="ellipse">
+            <a:avLst/>
+          </a:prstGeom>
+          <a:solidFill>
+            <a:schemeClr val="bg1"/>
+          </a:solidFill>
+          <a:ln>
+            <a:solidFill>
+              <a:schemeClr val="tx1"/>
+            </a:solidFill>
+          </a:ln>
+        </p:spPr>
+        <p:style>
+          <a:lnRef idx="2">
+            <a:schemeClr val="accent1">
+              <a:shade val="50000"/>
+            </a:schemeClr>
+          </a:lnRef>
+          <a:fillRef idx="1">
+            <a:schemeClr val="accent1"/>
+          </a:fillRef>
+          <a:effectRef idx="0">
+            <a:schemeClr val="accent1"/>
+          </a:effectRef>
+          <a:fontRef idx="minor">
+            <a:schemeClr val="lt1"/>
+          </a:fontRef>
+        </p:style>
+        <p:txBody>
+          <a:bodyPr rtlCol="0" anchor="ctr"/>
+          <a:lstStyle/>
+          <a:p>
+            <a:pPr algn="ctr"/>
+            <a:r>
+              <a:rPr lang="en-US" sz="1600" dirty="0" smtClean="0">
+                <a:solidFill>
+                  <a:schemeClr val="tx1"/>
+                </a:solidFill>
+                <a:latin typeface="Arial" panose="020B0604020202020204" pitchFamily="34" charset="0"/>
+                <a:cs typeface="Arial" panose="020B0604020202020204" pitchFamily="34" charset="0"/>
+              </a:rPr>
+              <a:t>8</a:t>
+            </a:r>
+            <a:endParaRPr lang="en-US" sz="1600" dirty="0">
+              <a:solidFill>
+                <a:schemeClr val="tx1"/>
+              </a:solidFill>
+              <a:latin typeface="Arial" panose="020B0604020202020204" pitchFamily="34" charset="0"/>
+              <a:cs typeface="Arial" panose="020B0604020202020204" pitchFamily="34" charset="0"/>
+            </a:endParaRPr>
+          </a:p>
+        </p:txBody>
+      </p:sp>
+      <p:cxnSp>
+        <p:nvCxnSpPr>
+          <p:cNvPr id="26" name="Straight Connector 25"/>
+          <p:cNvCxnSpPr/>
+          <p:nvPr/>
+        </p:nvCxnSpPr>
+        <p:spPr>
+          <a:xfrm flipV="1">
+            <a:off x="6726113" y="5328130"/>
+            <a:ext cx="0" cy="404450"/>
+          </a:xfrm>
+          <a:prstGeom prst="line">
+            <a:avLst/>
+          </a:prstGeom>
+          <a:ln w="28575">
+            <a:solidFill>
+              <a:schemeClr val="tx1"/>
+            </a:solidFill>
+          </a:ln>
+        </p:spPr>
+        <p:style>
+          <a:lnRef idx="1">
+            <a:schemeClr val="accent1"/>
+          </a:lnRef>
+          <a:fillRef idx="0">
+            <a:schemeClr val="accent1"/>
+          </a:fillRef>
+          <a:effectRef idx="0">
+            <a:schemeClr val="accent1"/>
+          </a:effectRef>
+          <a:fontRef idx="minor">
+            <a:schemeClr val="tx1"/>
+          </a:fontRef>
+        </p:style>
+      </p:cxnSp>
+      <p:sp>
+        <p:nvSpPr>
+          <p:cNvPr id="27" name="Oval 26"/>
+          <p:cNvSpPr/>
+          <p:nvPr/>
+        </p:nvSpPr>
+        <p:spPr>
+          <a:xfrm>
+            <a:off x="7640516" y="4879723"/>
+            <a:ext cx="228600" cy="228600"/>
+          </a:xfrm>
+          <a:prstGeom prst="ellipse">
+            <a:avLst/>
+          </a:prstGeom>
+          <a:solidFill>
+            <a:schemeClr val="bg1"/>
+          </a:solidFill>
+          <a:ln>
+            <a:solidFill>
+              <a:schemeClr val="tx1"/>
+            </a:solidFill>
+          </a:ln>
+        </p:spPr>
+        <p:style>
+          <a:lnRef idx="2">
+            <a:schemeClr val="accent1">
+              <a:shade val="50000"/>
+            </a:schemeClr>
+          </a:lnRef>
+          <a:fillRef idx="1">
+            <a:schemeClr val="accent1"/>
+          </a:fillRef>
+          <a:effectRef idx="0">
+            <a:schemeClr val="accent1"/>
+          </a:effectRef>
+          <a:fontRef idx="minor">
+            <a:schemeClr val="lt1"/>
+          </a:fontRef>
+        </p:style>
+        <p:txBody>
+          <a:bodyPr rtlCol="0" anchor="ctr"/>
+          <a:lstStyle/>
+          <a:p>
+            <a:pPr algn="ctr"/>
+            <a:r>
+              <a:rPr lang="en-US" sz="1600" dirty="0" smtClean="0">
+                <a:solidFill>
+                  <a:schemeClr val="tx1"/>
+                </a:solidFill>
+                <a:latin typeface="Arial" panose="020B0604020202020204" pitchFamily="34" charset="0"/>
+                <a:cs typeface="Arial" panose="020B0604020202020204" pitchFamily="34" charset="0"/>
+              </a:rPr>
+              <a:t>9</a:t>
+            </a:r>
+            <a:endParaRPr lang="en-US" sz="1600" dirty="0">
+              <a:solidFill>
+                <a:schemeClr val="tx1"/>
+              </a:solidFill>
+              <a:latin typeface="Arial" panose="020B0604020202020204" pitchFamily="34" charset="0"/>
+              <a:cs typeface="Arial" panose="020B0604020202020204" pitchFamily="34" charset="0"/>
+            </a:endParaRPr>
+          </a:p>
+        </p:txBody>
+      </p:sp>
+      <p:cxnSp>
+        <p:nvCxnSpPr>
+          <p:cNvPr id="28" name="Straight Connector 27"/>
+          <p:cNvCxnSpPr>
+            <a:stCxn id="27" idx="2"/>
+          </p:cNvCxnSpPr>
+          <p:nvPr/>
+        </p:nvCxnSpPr>
+        <p:spPr>
+          <a:xfrm flipH="1" flipV="1">
+            <a:off x="7291749" y="4879723"/>
+            <a:ext cx="348767" cy="114300"/>
+          </a:xfrm>
+          <a:prstGeom prst="line">
+            <a:avLst/>
+          </a:prstGeom>
+          <a:ln w="28575">
+            <a:solidFill>
+              <a:schemeClr val="tx1"/>
+            </a:solidFill>
+          </a:ln>
+        </p:spPr>
+        <p:style>
+          <a:lnRef idx="1">
+            <a:schemeClr val="accent1"/>
+          </a:lnRef>
+          <a:fillRef idx="0">
+            <a:schemeClr val="accent1"/>
+          </a:fillRef>
+          <a:effectRef idx="0">
+            <a:schemeClr val="accent1"/>
+          </a:effectRef>
+          <a:fontRef idx="minor">
+            <a:schemeClr val="tx1"/>
+          </a:fontRef>
+        </p:style>
+      </p:cxnSp>
+      <p:sp>
+        <p:nvSpPr>
+          <p:cNvPr id="30" name="Oval 29"/>
+          <p:cNvSpPr/>
+          <p:nvPr/>
+        </p:nvSpPr>
+        <p:spPr>
+          <a:xfrm>
+            <a:off x="4879737" y="4941269"/>
+            <a:ext cx="228600" cy="228600"/>
+          </a:xfrm>
+          <a:prstGeom prst="ellipse">
+            <a:avLst/>
+          </a:prstGeom>
+          <a:solidFill>
+            <a:schemeClr val="bg1"/>
+          </a:solidFill>
+          <a:ln>
+            <a:solidFill>
+              <a:schemeClr val="tx1"/>
+            </a:solidFill>
+          </a:ln>
+        </p:spPr>
+        <p:style>
+          <a:lnRef idx="2">
+            <a:schemeClr val="accent1">
+              <a:shade val="50000"/>
+            </a:schemeClr>
+          </a:lnRef>
+          <a:fillRef idx="1">
+            <a:schemeClr val="accent1"/>
+          </a:fillRef>
+          <a:effectRef idx="0">
+            <a:schemeClr val="accent1"/>
+          </a:effectRef>
+          <a:fontRef idx="minor">
+            <a:schemeClr val="lt1"/>
+          </a:fontRef>
+        </p:style>
+        <p:txBody>
+          <a:bodyPr rtlCol="0" anchor="ctr"/>
+          <a:lstStyle/>
+          <a:p>
+            <a:pPr algn="ctr"/>
+            <a:endParaRPr lang="en-US" sz="1600" dirty="0">
+              <a:solidFill>
+                <a:schemeClr val="tx1"/>
+              </a:solidFill>
+              <a:latin typeface="Arial" panose="020B0604020202020204" pitchFamily="34" charset="0"/>
+              <a:cs typeface="Arial" panose="020B0604020202020204" pitchFamily="34" charset="0"/>
+            </a:endParaRPr>
+          </a:p>
+        </p:txBody>
+      </p:sp>
+      <p:sp>
+        <p:nvSpPr>
+          <p:cNvPr id="31" name="TextBox 30"/>
+          <p:cNvSpPr txBox="1"/>
+          <p:nvPr/>
+        </p:nvSpPr>
+        <p:spPr>
+          <a:xfrm>
+            <a:off x="4774088" y="4885552"/>
+            <a:ext cx="509953" cy="338554"/>
+          </a:xfrm>
+          <a:prstGeom prst="rect">
+            <a:avLst/>
+          </a:prstGeom>
+          <a:noFill/>
+        </p:spPr>
+        <p:txBody>
+          <a:bodyPr wrap="square" rtlCol="0">
+            <a:spAutoFit/>
+          </a:bodyPr>
+          <a:lstStyle/>
+          <a:p>
+            <a:r>
+              <a:rPr lang="en-US" sz="1600" dirty="0" smtClean="0">
+                <a:latin typeface="Arial" panose="020B0604020202020204" pitchFamily="34" charset="0"/>
+                <a:cs typeface="Arial" panose="020B0604020202020204" pitchFamily="34" charset="0"/>
+              </a:rPr>
+              <a:t>10</a:t>
+            </a:r>
+            <a:endParaRPr lang="en-US" dirty="0">
+              <a:latin typeface="Arial" panose="020B0604020202020204" pitchFamily="34" charset="0"/>
+              <a:cs typeface="Arial" panose="020B0604020202020204" pitchFamily="34" charset="0"/>
+            </a:endParaRPr>
+          </a:p>
+        </p:txBody>
+      </p:sp>
+      <p:sp>
+        <p:nvSpPr>
+          <p:cNvPr id="32" name="Oval 31"/>
+          <p:cNvSpPr/>
+          <p:nvPr/>
+        </p:nvSpPr>
+        <p:spPr>
+          <a:xfrm>
+            <a:off x="7218482" y="5272439"/>
+            <a:ext cx="228600" cy="228600"/>
+          </a:xfrm>
+          <a:prstGeom prst="ellipse">
+            <a:avLst/>
+          </a:prstGeom>
+          <a:solidFill>
+            <a:schemeClr val="bg1"/>
+          </a:solidFill>
+          <a:ln>
+            <a:solidFill>
+              <a:schemeClr val="tx1"/>
+            </a:solidFill>
+          </a:ln>
+        </p:spPr>
+        <p:style>
+          <a:lnRef idx="2">
+            <a:schemeClr val="accent1">
+              <a:shade val="50000"/>
+            </a:schemeClr>
+          </a:lnRef>
+          <a:fillRef idx="1">
+            <a:schemeClr val="accent1"/>
+          </a:fillRef>
+          <a:effectRef idx="0">
+            <a:schemeClr val="accent1"/>
+          </a:effectRef>
+          <a:fontRef idx="minor">
+            <a:schemeClr val="lt1"/>
+          </a:fontRef>
+        </p:style>
+        <p:txBody>
+          <a:bodyPr rtlCol="0" anchor="ctr"/>
+          <a:lstStyle/>
+          <a:p>
+            <a:pPr algn="ctr"/>
+            <a:endParaRPr lang="en-US" sz="1600" dirty="0">
+              <a:solidFill>
+                <a:schemeClr val="tx1"/>
+              </a:solidFill>
+              <a:latin typeface="Arial" panose="020B0604020202020204" pitchFamily="34" charset="0"/>
+              <a:cs typeface="Arial" panose="020B0604020202020204" pitchFamily="34" charset="0"/>
+            </a:endParaRPr>
+          </a:p>
+        </p:txBody>
+      </p:sp>
+      <p:cxnSp>
+        <p:nvCxnSpPr>
+          <p:cNvPr id="33" name="Straight Connector 32"/>
+          <p:cNvCxnSpPr>
+            <a:stCxn id="32" idx="2"/>
+          </p:cNvCxnSpPr>
+          <p:nvPr/>
+        </p:nvCxnSpPr>
+        <p:spPr>
+          <a:xfrm flipH="1" flipV="1">
+            <a:off x="6910749" y="5169869"/>
+            <a:ext cx="307733" cy="216870"/>
+          </a:xfrm>
+          <a:prstGeom prst="line">
+            <a:avLst/>
+          </a:prstGeom>
+          <a:ln w="28575">
+            <a:solidFill>
+              <a:schemeClr val="tx1"/>
+            </a:solidFill>
+          </a:ln>
+        </p:spPr>
+        <p:style>
+          <a:lnRef idx="1">
+            <a:schemeClr val="accent1"/>
+          </a:lnRef>
+          <a:fillRef idx="0">
+            <a:schemeClr val="accent1"/>
+          </a:fillRef>
+          <a:effectRef idx="0">
+            <a:schemeClr val="accent1"/>
+          </a:effectRef>
+          <a:fontRef idx="minor">
+            <a:schemeClr val="tx1"/>
+          </a:fontRef>
+        </p:style>
+      </p:cxnSp>
+      <p:sp>
+        <p:nvSpPr>
+          <p:cNvPr id="36" name="TextBox 35"/>
+          <p:cNvSpPr txBox="1"/>
+          <p:nvPr/>
+        </p:nvSpPr>
+        <p:spPr>
+          <a:xfrm>
+            <a:off x="7145215" y="5224788"/>
+            <a:ext cx="509953" cy="338554"/>
+          </a:xfrm>
+          <a:prstGeom prst="rect">
+            <a:avLst/>
+          </a:prstGeom>
+          <a:noFill/>
+        </p:spPr>
+        <p:txBody>
+          <a:bodyPr wrap="square" rtlCol="0">
+            <a:spAutoFit/>
+          </a:bodyPr>
+          <a:lstStyle/>
+          <a:p>
+            <a:r>
+              <a:rPr lang="en-US" sz="1600" dirty="0" smtClean="0">
+                <a:latin typeface="Arial" panose="020B0604020202020204" pitchFamily="34" charset="0"/>
+                <a:cs typeface="Arial" panose="020B0604020202020204" pitchFamily="34" charset="0"/>
+              </a:rPr>
+              <a:t>11</a:t>
+            </a:r>
+            <a:endParaRPr lang="en-US" dirty="0">
+              <a:latin typeface="Arial" panose="020B0604020202020204" pitchFamily="34" charset="0"/>
+              <a:cs typeface="Arial" panose="020B0604020202020204" pitchFamily="34" charset="0"/>
+            </a:endParaRPr>
+          </a:p>
+        </p:txBody>
+      </p:sp>
+      <p:sp>
+        <p:nvSpPr>
+          <p:cNvPr id="39" name="Oval 38"/>
+          <p:cNvSpPr/>
+          <p:nvPr/>
+        </p:nvSpPr>
+        <p:spPr>
+          <a:xfrm>
+            <a:off x="4026885" y="4158741"/>
+            <a:ext cx="228600" cy="228600"/>
+          </a:xfrm>
+          <a:prstGeom prst="ellipse">
+            <a:avLst/>
+          </a:prstGeom>
+          <a:solidFill>
+            <a:schemeClr val="bg1"/>
+          </a:solidFill>
+          <a:ln>
+            <a:solidFill>
+              <a:schemeClr val="tx1"/>
+            </a:solidFill>
+          </a:ln>
+        </p:spPr>
+        <p:style>
+          <a:lnRef idx="2">
+            <a:schemeClr val="accent1">
+              <a:shade val="50000"/>
+            </a:schemeClr>
+          </a:lnRef>
+          <a:fillRef idx="1">
+            <a:schemeClr val="accent1"/>
+          </a:fillRef>
+          <a:effectRef idx="0">
+            <a:schemeClr val="accent1"/>
+          </a:effectRef>
+          <a:fontRef idx="minor">
+            <a:schemeClr val="lt1"/>
+          </a:fontRef>
+        </p:style>
+        <p:txBody>
+          <a:bodyPr rtlCol="0" anchor="ctr"/>
+          <a:lstStyle/>
+          <a:p>
+            <a:pPr algn="ctr"/>
+            <a:endParaRPr lang="en-US" sz="1600" dirty="0">
+              <a:solidFill>
+                <a:schemeClr val="tx1"/>
+              </a:solidFill>
+              <a:latin typeface="Arial" panose="020B0604020202020204" pitchFamily="34" charset="0"/>
+              <a:cs typeface="Arial" panose="020B0604020202020204" pitchFamily="34" charset="0"/>
+            </a:endParaRPr>
+          </a:p>
+        </p:txBody>
+      </p:sp>
+      <p:sp>
+        <p:nvSpPr>
+          <p:cNvPr id="37" name="TextBox 36"/>
+          <p:cNvSpPr txBox="1"/>
+          <p:nvPr/>
+        </p:nvSpPr>
+        <p:spPr>
+          <a:xfrm>
+            <a:off x="3921376" y="4116226"/>
+            <a:ext cx="509953" cy="338554"/>
+          </a:xfrm>
+          <a:prstGeom prst="rect">
+            <a:avLst/>
+          </a:prstGeom>
+          <a:noFill/>
+        </p:spPr>
+        <p:txBody>
+          <a:bodyPr wrap="square" rtlCol="0">
+            <a:spAutoFit/>
+          </a:bodyPr>
+          <a:lstStyle/>
+          <a:p>
+            <a:r>
+              <a:rPr lang="en-US" sz="1600" dirty="0" smtClean="0">
+                <a:latin typeface="Arial" panose="020B0604020202020204" pitchFamily="34" charset="0"/>
+                <a:cs typeface="Arial" panose="020B0604020202020204" pitchFamily="34" charset="0"/>
+              </a:rPr>
+              <a:t>12</a:t>
+            </a:r>
+            <a:endParaRPr lang="en-US" dirty="0">
+              <a:latin typeface="Arial" panose="020B0604020202020204" pitchFamily="34" charset="0"/>
+              <a:cs typeface="Arial" panose="020B0604020202020204" pitchFamily="34" charset="0"/>
+            </a:endParaRPr>
+          </a:p>
+        </p:txBody>
+      </p:sp>
+      <p:sp>
+        <p:nvSpPr>
+          <p:cNvPr id="40" name="Oval 39"/>
+          <p:cNvSpPr/>
+          <p:nvPr/>
+        </p:nvSpPr>
+        <p:spPr>
+          <a:xfrm>
+            <a:off x="7367959" y="3349859"/>
+            <a:ext cx="228600" cy="228600"/>
+          </a:xfrm>
+          <a:prstGeom prst="ellipse">
+            <a:avLst/>
+          </a:prstGeom>
+          <a:solidFill>
+            <a:schemeClr val="bg1"/>
+          </a:solidFill>
+          <a:ln>
+            <a:solidFill>
+              <a:schemeClr val="tx1"/>
+            </a:solidFill>
+          </a:ln>
+        </p:spPr>
+        <p:style>
+          <a:lnRef idx="2">
+            <a:schemeClr val="accent1">
+              <a:shade val="50000"/>
+            </a:schemeClr>
+          </a:lnRef>
+          <a:fillRef idx="1">
+            <a:schemeClr val="accent1"/>
+          </a:fillRef>
+          <a:effectRef idx="0">
+            <a:schemeClr val="accent1"/>
+          </a:effectRef>
+          <a:fontRef idx="minor">
+            <a:schemeClr val="lt1"/>
+          </a:fontRef>
+        </p:style>
+        <p:txBody>
+          <a:bodyPr rtlCol="0" anchor="ctr"/>
+          <a:lstStyle/>
+          <a:p>
+            <a:pPr algn="ctr"/>
+            <a:endParaRPr lang="en-US" sz="1600" dirty="0">
+              <a:solidFill>
+                <a:schemeClr val="tx1"/>
+              </a:solidFill>
+              <a:latin typeface="Arial" panose="020B0604020202020204" pitchFamily="34" charset="0"/>
+              <a:cs typeface="Arial" panose="020B0604020202020204" pitchFamily="34" charset="0"/>
+            </a:endParaRPr>
+          </a:p>
+        </p:txBody>
+      </p:sp>
+      <p:sp>
+        <p:nvSpPr>
+          <p:cNvPr id="41" name="TextBox 40"/>
+          <p:cNvSpPr txBox="1"/>
+          <p:nvPr/>
+        </p:nvSpPr>
+        <p:spPr>
+          <a:xfrm>
+            <a:off x="7274182" y="3300743"/>
+            <a:ext cx="509953" cy="338554"/>
+          </a:xfrm>
+          <a:prstGeom prst="rect">
+            <a:avLst/>
+          </a:prstGeom>
+          <a:noFill/>
+        </p:spPr>
+        <p:txBody>
+          <a:bodyPr wrap="square" rtlCol="0">
+            <a:spAutoFit/>
+          </a:bodyPr>
+          <a:lstStyle/>
+          <a:p>
+            <a:r>
+              <a:rPr lang="en-US" sz="1600" dirty="0" smtClean="0">
+                <a:latin typeface="Arial" panose="020B0604020202020204" pitchFamily="34" charset="0"/>
+                <a:cs typeface="Arial" panose="020B0604020202020204" pitchFamily="34" charset="0"/>
+              </a:rPr>
+              <a:t>13</a:t>
+            </a:r>
+            <a:endParaRPr lang="en-US" dirty="0">
+              <a:latin typeface="Arial" panose="020B0604020202020204" pitchFamily="34" charset="0"/>
+              <a:cs typeface="Arial" panose="020B0604020202020204" pitchFamily="34" charset="0"/>
+            </a:endParaRPr>
+          </a:p>
+        </p:txBody>
+      </p:sp>
+      <p:sp>
+        <p:nvSpPr>
+          <p:cNvPr id="42" name="Oval 41"/>
+          <p:cNvSpPr/>
+          <p:nvPr/>
+        </p:nvSpPr>
+        <p:spPr>
+          <a:xfrm>
+            <a:off x="6761287" y="4633529"/>
+            <a:ext cx="228600" cy="228600"/>
+          </a:xfrm>
+          <a:prstGeom prst="ellipse">
+            <a:avLst/>
+          </a:prstGeom>
+          <a:solidFill>
+            <a:schemeClr val="bg1"/>
+          </a:solidFill>
+          <a:ln>
+            <a:solidFill>
+              <a:schemeClr val="tx1"/>
+            </a:solidFill>
+          </a:ln>
+        </p:spPr>
+        <p:style>
+          <a:lnRef idx="2">
+            <a:schemeClr val="accent1">
+              <a:shade val="50000"/>
+            </a:schemeClr>
+          </a:lnRef>
+          <a:fillRef idx="1">
+            <a:schemeClr val="accent1"/>
+          </a:fillRef>
+          <a:effectRef idx="0">
+            <a:schemeClr val="accent1"/>
+          </a:effectRef>
+          <a:fontRef idx="minor">
+            <a:schemeClr val="lt1"/>
+          </a:fontRef>
+        </p:style>
+        <p:txBody>
+          <a:bodyPr rtlCol="0" anchor="ctr"/>
+          <a:lstStyle/>
+          <a:p>
+            <a:pPr algn="ctr"/>
+            <a:endParaRPr lang="en-US" sz="1600" dirty="0">
+              <a:solidFill>
+                <a:schemeClr val="tx1"/>
+              </a:solidFill>
+              <a:latin typeface="Arial" panose="020B0604020202020204" pitchFamily="34" charset="0"/>
+              <a:cs typeface="Arial" panose="020B0604020202020204" pitchFamily="34" charset="0"/>
+            </a:endParaRPr>
+          </a:p>
+        </p:txBody>
+      </p:sp>
+      <p:cxnSp>
+        <p:nvCxnSpPr>
+          <p:cNvPr id="43" name="Straight Connector 42"/>
+          <p:cNvCxnSpPr/>
+          <p:nvPr/>
+        </p:nvCxnSpPr>
+        <p:spPr>
+          <a:xfrm flipV="1">
+            <a:off x="6787400" y="4850408"/>
+            <a:ext cx="70601" cy="312129"/>
+          </a:xfrm>
+          <a:prstGeom prst="line">
+            <a:avLst/>
+          </a:prstGeom>
+          <a:ln w="28575">
+            <a:solidFill>
+              <a:schemeClr val="tx1"/>
+            </a:solidFill>
+          </a:ln>
+        </p:spPr>
+        <p:style>
+          <a:lnRef idx="1">
+            <a:schemeClr val="accent1"/>
+          </a:lnRef>
+          <a:fillRef idx="0">
+            <a:schemeClr val="accent1"/>
+          </a:fillRef>
+          <a:effectRef idx="0">
+            <a:schemeClr val="accent1"/>
+          </a:effectRef>
+          <a:fontRef idx="minor">
+            <a:schemeClr val="tx1"/>
+          </a:fontRef>
+        </p:style>
+      </p:cxnSp>
+      <p:sp>
+        <p:nvSpPr>
+          <p:cNvPr id="46" name="TextBox 45"/>
+          <p:cNvSpPr txBox="1"/>
+          <p:nvPr/>
+        </p:nvSpPr>
+        <p:spPr>
+          <a:xfrm>
+            <a:off x="6655777" y="4587359"/>
+            <a:ext cx="509953" cy="338554"/>
+          </a:xfrm>
+          <a:prstGeom prst="rect">
+            <a:avLst/>
+          </a:prstGeom>
+          <a:noFill/>
+        </p:spPr>
+        <p:txBody>
+          <a:bodyPr wrap="square" rtlCol="0">
+            <a:spAutoFit/>
+          </a:bodyPr>
+          <a:lstStyle/>
+          <a:p>
+            <a:r>
+              <a:rPr lang="en-US" sz="1600" dirty="0" smtClean="0">
+                <a:latin typeface="Arial" panose="020B0604020202020204" pitchFamily="34" charset="0"/>
+                <a:cs typeface="Arial" panose="020B0604020202020204" pitchFamily="34" charset="0"/>
+              </a:rPr>
+              <a:t>14</a:t>
+            </a:r>
+            <a:endParaRPr lang="en-US" dirty="0">
+              <a:latin typeface="Arial" panose="020B0604020202020204" pitchFamily="34" charset="0"/>
+              <a:cs typeface="Arial" panose="020B0604020202020204" pitchFamily="34" charset="0"/>
+            </a:endParaRPr>
+          </a:p>
+        </p:txBody>
+      </p:sp>
+      <p:sp>
+        <p:nvSpPr>
+          <p:cNvPr id="48" name="Oval 47"/>
+          <p:cNvSpPr/>
+          <p:nvPr/>
+        </p:nvSpPr>
+        <p:spPr>
+          <a:xfrm>
+            <a:off x="4563216" y="3147635"/>
+            <a:ext cx="228600" cy="228600"/>
+          </a:xfrm>
+          <a:prstGeom prst="ellipse">
+            <a:avLst/>
+          </a:prstGeom>
+          <a:solidFill>
+            <a:schemeClr val="bg1"/>
+          </a:solidFill>
+          <a:ln>
+            <a:solidFill>
+              <a:schemeClr val="tx1"/>
+            </a:solidFill>
+          </a:ln>
+        </p:spPr>
+        <p:style>
+          <a:lnRef idx="2">
+            <a:schemeClr val="accent1">
+              <a:shade val="50000"/>
+            </a:schemeClr>
+          </a:lnRef>
+          <a:fillRef idx="1">
+            <a:schemeClr val="accent1"/>
+          </a:fillRef>
+          <a:effectRef idx="0">
+            <a:schemeClr val="accent1"/>
+          </a:effectRef>
+          <a:fontRef idx="minor">
+            <a:schemeClr val="lt1"/>
+          </a:fontRef>
+        </p:style>
+        <p:txBody>
+          <a:bodyPr rtlCol="0" anchor="ctr"/>
+          <a:lstStyle/>
+          <a:p>
+            <a:pPr algn="ctr"/>
+            <a:endParaRPr lang="en-US" sz="1600" dirty="0">
+              <a:solidFill>
+                <a:schemeClr val="tx1"/>
+              </a:solidFill>
+              <a:latin typeface="Arial" panose="020B0604020202020204" pitchFamily="34" charset="0"/>
+              <a:cs typeface="Arial" panose="020B0604020202020204" pitchFamily="34" charset="0"/>
+            </a:endParaRPr>
+          </a:p>
+        </p:txBody>
+      </p:sp>
+      <p:sp>
+        <p:nvSpPr>
+          <p:cNvPr id="47" name="TextBox 46"/>
+          <p:cNvSpPr txBox="1"/>
+          <p:nvPr/>
+        </p:nvSpPr>
+        <p:spPr>
+          <a:xfrm>
+            <a:off x="4457705" y="3108010"/>
+            <a:ext cx="509953" cy="338554"/>
+          </a:xfrm>
+          <a:prstGeom prst="rect">
+            <a:avLst/>
+          </a:prstGeom>
+          <a:noFill/>
+        </p:spPr>
+        <p:txBody>
+          <a:bodyPr wrap="square" rtlCol="0">
+            <a:spAutoFit/>
+          </a:bodyPr>
+          <a:lstStyle/>
+          <a:p>
+            <a:r>
+              <a:rPr lang="en-US" sz="1600" dirty="0" smtClean="0">
+                <a:latin typeface="Arial" panose="020B0604020202020204" pitchFamily="34" charset="0"/>
+                <a:cs typeface="Arial" panose="020B0604020202020204" pitchFamily="34" charset="0"/>
+              </a:rPr>
+              <a:t>15</a:t>
+            </a:r>
+            <a:endParaRPr lang="en-US" dirty="0">
+              <a:latin typeface="Arial" panose="020B0604020202020204" pitchFamily="34" charset="0"/>
+              <a:cs typeface="Arial" panose="020B0604020202020204" pitchFamily="34" charset="0"/>
+            </a:endParaRPr>
+          </a:p>
+        </p:txBody>
+      </p:sp>
+      <p:cxnSp>
+        <p:nvCxnSpPr>
+          <p:cNvPr id="49" name="Straight Connector 48"/>
+          <p:cNvCxnSpPr/>
+          <p:nvPr/>
+        </p:nvCxnSpPr>
+        <p:spPr>
+          <a:xfrm flipV="1">
+            <a:off x="4298584" y="3349860"/>
+            <a:ext cx="304321" cy="136329"/>
+          </a:xfrm>
+          <a:prstGeom prst="line">
+            <a:avLst/>
+          </a:prstGeom>
+          <a:ln w="28575">
+            <a:solidFill>
+              <a:schemeClr val="tx1"/>
+            </a:solidFill>
+          </a:ln>
+        </p:spPr>
+        <p:style>
+          <a:lnRef idx="1">
+            <a:schemeClr val="accent1"/>
+          </a:lnRef>
+          <a:fillRef idx="0">
+            <a:schemeClr val="accent1"/>
+          </a:fillRef>
+          <a:effectRef idx="0">
+            <a:schemeClr val="accent1"/>
+          </a:effectRef>
+          <a:fontRef idx="minor">
+            <a:schemeClr val="tx1"/>
+          </a:fontRef>
+        </p:style>
+      </p:cxnSp>
+      <p:pic>
+        <p:nvPicPr>
+          <p:cNvPr id="53" name="Picture 52"/>
+          <p:cNvPicPr>
+            <a:picLocks noChangeAspect="1"/>
+          </p:cNvPicPr>
+          <p:nvPr/>
+        </p:nvPicPr>
+        <p:blipFill>
+          <a:blip r:embed="rId3" cstate="print">
+            <a:extLst>
+              <a:ext uri="{28A0092B-C50C-407E-A947-70E740481C1C}">
+                <a14:useLocalDpi xmlns:a14="http://schemas.microsoft.com/office/drawing/2010/main" val="0"/>
+              </a:ext>
+            </a:extLst>
+          </a:blip>
+          <a:stretch>
+            <a:fillRect/>
+          </a:stretch>
+        </p:blipFill>
+        <p:spPr>
+          <a:xfrm>
+            <a:off x="5138955" y="3231171"/>
+            <a:ext cx="1901778" cy="1358413"/>
+          </a:xfrm>
+          <a:prstGeom prst="rect">
+            <a:avLst/>
+          </a:prstGeom>
+          <a:ln>
+            <a:solidFill>
+              <a:schemeClr val="tx1"/>
+            </a:solidFill>
+          </a:ln>
+        </p:spPr>
+      </p:pic>
+      <p:sp>
+        <p:nvSpPr>
+          <p:cNvPr id="54" name="TextBox 53"/>
+          <p:cNvSpPr txBox="1"/>
+          <p:nvPr/>
+        </p:nvSpPr>
+        <p:spPr>
+          <a:xfrm>
+            <a:off x="3569676" y="114300"/>
+            <a:ext cx="395654" cy="307777"/>
+          </a:xfrm>
+          <a:prstGeom prst="rect">
+            <a:avLst/>
+          </a:prstGeom>
+          <a:noFill/>
+        </p:spPr>
+        <p:txBody>
+          <a:bodyPr wrap="square" rtlCol="0">
+            <a:spAutoFit/>
+          </a:bodyPr>
+          <a:lstStyle/>
+          <a:p>
+            <a:r>
+              <a:rPr lang="en-US" sz="1400" b="1" dirty="0" smtClean="0">
+                <a:latin typeface="Arial" panose="020B0604020202020204" pitchFamily="34" charset="0"/>
+                <a:cs typeface="Arial" panose="020B0604020202020204" pitchFamily="34" charset="0"/>
+              </a:rPr>
+              <a:t>A)</a:t>
+            </a:r>
+            <a:endParaRPr lang="en-US" sz="1400" b="1" dirty="0">
+              <a:latin typeface="Arial" panose="020B0604020202020204" pitchFamily="34" charset="0"/>
+              <a:cs typeface="Arial" panose="020B0604020202020204" pitchFamily="34" charset="0"/>
+            </a:endParaRPr>
+          </a:p>
+        </p:txBody>
+      </p:sp>
+      <p:sp>
+        <p:nvSpPr>
+          <p:cNvPr id="55" name="TextBox 54"/>
+          <p:cNvSpPr txBox="1"/>
+          <p:nvPr/>
+        </p:nvSpPr>
+        <p:spPr>
+          <a:xfrm>
+            <a:off x="3569676" y="3134458"/>
+            <a:ext cx="395654" cy="307777"/>
+          </a:xfrm>
+          <a:prstGeom prst="rect">
+            <a:avLst/>
+          </a:prstGeom>
+          <a:noFill/>
+        </p:spPr>
+        <p:txBody>
+          <a:bodyPr wrap="square" rtlCol="0">
+            <a:spAutoFit/>
+          </a:bodyPr>
+          <a:lstStyle/>
+          <a:p>
+            <a:r>
+              <a:rPr lang="en-US" sz="1400" b="1" dirty="0" smtClean="0">
+                <a:latin typeface="Arial" panose="020B0604020202020204" pitchFamily="34" charset="0"/>
+                <a:cs typeface="Arial" panose="020B0604020202020204" pitchFamily="34" charset="0"/>
+              </a:rPr>
+              <a:t>B)</a:t>
+            </a:r>
+            <a:endParaRPr lang="en-US" sz="1400" b="1" dirty="0">
+              <a:latin typeface="Arial" panose="020B0604020202020204" pitchFamily="34" charset="0"/>
+              <a:cs typeface="Arial" panose="020B0604020202020204" pitchFamily="34" charset="0"/>
+            </a:endParaRPr>
+          </a:p>
+        </p:txBody>
+      </p:sp>
+    </p:spTree>
+    <p:extLst>
+      <p:ext uri="{BB962C8B-B14F-4D97-AF65-F5344CB8AC3E}">
+        <p14:creationId xmlns:p14="http://schemas.microsoft.com/office/powerpoint/2010/main" val="1179445465"/>
+      </p:ext>
+    </p:extLst>
+  </p:cSld>
+  <p:clrMapOvr>
+    <a:masterClrMapping/>
+  </p:clrMapOvr>
+</p:sld>
+</file>
+
+<file path=ppt/slides/slide5.xml><?xml version="1.0" encoding="utf-8"?>
+<p:sld xmlns:a="http://schemas.openxmlformats.org/drawingml/2006/main" xmlns:r="http://schemas.openxmlformats.org/officeDocument/2006/relationships" xmlns:p="http://schemas.openxmlformats.org/presentationml/2006/main">
+  <p:cSld>
+    <p:spTree>
+      <p:nvGrpSpPr>
+        <p:cNvPr id="1" name=""/>
+        <p:cNvGrpSpPr/>
+        <p:nvPr/>
+      </p:nvGrpSpPr>
+      <p:grpSpPr>
+        <a:xfrm>
+          <a:off x="0" y="0"/>
+          <a:ext cx="0" cy="0"/>
+          <a:chOff x="0" y="0"/>
+          <a:chExt cx="0" cy="0"/>
+        </a:xfrm>
+      </p:grpSpPr>
+      <p:pic>
+        <p:nvPicPr>
+          <p:cNvPr id="4" name="Picture 3"/>
+          <p:cNvPicPr>
+            <a:picLocks noChangeAspect="1"/>
+          </p:cNvPicPr>
+          <p:nvPr/>
+        </p:nvPicPr>
+        <p:blipFill>
+          <a:blip r:embed="rId2" cstate="print">
+            <a:extLst>
+              <a:ext uri="{28A0092B-C50C-407E-A947-70E740481C1C}">
+                <a14:useLocalDpi xmlns:a14="http://schemas.microsoft.com/office/drawing/2010/main" val="0"/>
+              </a:ext>
+            </a:extLst>
+          </a:blip>
+          <a:stretch>
+            <a:fillRect/>
+          </a:stretch>
+        </p:blipFill>
+        <p:spPr>
+          <a:xfrm>
+            <a:off x="3446318" y="0"/>
+            <a:ext cx="5299364" cy="6858000"/>
+          </a:xfrm>
+          <a:prstGeom prst="rect">
+            <a:avLst/>
+          </a:prstGeom>
+        </p:spPr>
+      </p:pic>
+      <p:sp>
+        <p:nvSpPr>
+          <p:cNvPr id="5" name="Oval 4"/>
+          <p:cNvSpPr/>
+          <p:nvPr/>
+        </p:nvSpPr>
+        <p:spPr>
+          <a:xfrm>
+            <a:off x="6910749" y="5477602"/>
+            <a:ext cx="228600" cy="228600"/>
+          </a:xfrm>
+          <a:prstGeom prst="ellipse">
+            <a:avLst/>
+          </a:prstGeom>
+          <a:solidFill>
+            <a:schemeClr val="bg1"/>
+          </a:solidFill>
+          <a:ln>
+            <a:solidFill>
+              <a:schemeClr val="tx1"/>
+            </a:solidFill>
+          </a:ln>
+        </p:spPr>
+        <p:style>
+          <a:lnRef idx="2">
+            <a:schemeClr val="accent1">
+              <a:shade val="50000"/>
+            </a:schemeClr>
+          </a:lnRef>
+          <a:fillRef idx="1">
+            <a:schemeClr val="accent1"/>
+          </a:fillRef>
+          <a:effectRef idx="0">
+            <a:schemeClr val="accent1"/>
+          </a:effectRef>
+          <a:fontRef idx="minor">
+            <a:schemeClr val="lt1"/>
+          </a:fontRef>
+        </p:style>
+        <p:txBody>
+          <a:bodyPr rtlCol="0" anchor="ctr"/>
+          <a:lstStyle/>
+          <a:p>
+            <a:pPr algn="ctr"/>
+            <a:r>
+              <a:rPr lang="en-US" sz="1600" dirty="0" smtClean="0">
+                <a:solidFill>
+                  <a:schemeClr val="tx1"/>
+                </a:solidFill>
+                <a:latin typeface="Arial" panose="020B0604020202020204" pitchFamily="34" charset="0"/>
+                <a:cs typeface="Arial" panose="020B0604020202020204" pitchFamily="34" charset="0"/>
+              </a:rPr>
+              <a:t>1</a:t>
+            </a:r>
+            <a:endParaRPr lang="en-US" sz="1600" dirty="0">
+              <a:solidFill>
+                <a:schemeClr val="tx1"/>
+              </a:solidFill>
+              <a:latin typeface="Arial" panose="020B0604020202020204" pitchFamily="34" charset="0"/>
+              <a:cs typeface="Arial" panose="020B0604020202020204" pitchFamily="34" charset="0"/>
+            </a:endParaRPr>
+          </a:p>
+        </p:txBody>
+      </p:sp>
+      <p:sp>
+        <p:nvSpPr>
+          <p:cNvPr id="7" name="Oval 6"/>
+          <p:cNvSpPr/>
+          <p:nvPr/>
+        </p:nvSpPr>
+        <p:spPr>
+          <a:xfrm>
+            <a:off x="7617072" y="4337528"/>
+            <a:ext cx="228600" cy="228600"/>
+          </a:xfrm>
+          <a:prstGeom prst="ellipse">
+            <a:avLst/>
+          </a:prstGeom>
+          <a:solidFill>
+            <a:schemeClr val="bg1"/>
+          </a:solidFill>
+          <a:ln>
+            <a:solidFill>
+              <a:schemeClr val="tx1"/>
+            </a:solidFill>
+          </a:ln>
+        </p:spPr>
+        <p:style>
+          <a:lnRef idx="2">
+            <a:schemeClr val="accent1">
+              <a:shade val="50000"/>
+            </a:schemeClr>
+          </a:lnRef>
+          <a:fillRef idx="1">
+            <a:schemeClr val="accent1"/>
+          </a:fillRef>
+          <a:effectRef idx="0">
+            <a:schemeClr val="accent1"/>
+          </a:effectRef>
+          <a:fontRef idx="minor">
+            <a:schemeClr val="lt1"/>
+          </a:fontRef>
+        </p:style>
+        <p:txBody>
+          <a:bodyPr rtlCol="0" anchor="ctr"/>
+          <a:lstStyle/>
+          <a:p>
+            <a:pPr algn="ctr"/>
+            <a:r>
+              <a:rPr lang="en-US" sz="1600" dirty="0" smtClean="0">
+                <a:solidFill>
+                  <a:schemeClr val="tx1"/>
+                </a:solidFill>
+                <a:latin typeface="Arial" panose="020B0604020202020204" pitchFamily="34" charset="0"/>
+                <a:cs typeface="Arial" panose="020B0604020202020204" pitchFamily="34" charset="0"/>
+              </a:rPr>
+              <a:t>3</a:t>
+            </a:r>
+            <a:endParaRPr lang="en-US" sz="1600" dirty="0">
+              <a:solidFill>
+                <a:schemeClr val="tx1"/>
+              </a:solidFill>
+              <a:latin typeface="Arial" panose="020B0604020202020204" pitchFamily="34" charset="0"/>
+              <a:cs typeface="Arial" panose="020B0604020202020204" pitchFamily="34" charset="0"/>
+            </a:endParaRPr>
+          </a:p>
+        </p:txBody>
+      </p:sp>
+      <p:cxnSp>
+        <p:nvCxnSpPr>
+          <p:cNvPr id="9" name="Straight Connector 8"/>
+          <p:cNvCxnSpPr>
+            <a:stCxn id="7" idx="2"/>
+          </p:cNvCxnSpPr>
+          <p:nvPr/>
+        </p:nvCxnSpPr>
+        <p:spPr>
+          <a:xfrm flipH="1">
+            <a:off x="7280031" y="4451828"/>
+            <a:ext cx="337041" cy="5872"/>
+          </a:xfrm>
+          <a:prstGeom prst="line">
+            <a:avLst/>
+          </a:prstGeom>
+          <a:ln w="28575">
+            <a:solidFill>
+              <a:schemeClr val="tx1"/>
+            </a:solidFill>
+          </a:ln>
+        </p:spPr>
+        <p:style>
+          <a:lnRef idx="1">
+            <a:schemeClr val="accent1"/>
+          </a:lnRef>
+          <a:fillRef idx="0">
+            <a:schemeClr val="accent1"/>
+          </a:fillRef>
+          <a:effectRef idx="0">
+            <a:schemeClr val="accent1"/>
+          </a:effectRef>
+          <a:fontRef idx="minor">
+            <a:schemeClr val="tx1"/>
+          </a:fontRef>
+        </p:style>
+      </p:cxnSp>
+      <p:sp>
+        <p:nvSpPr>
+          <p:cNvPr id="10" name="Oval 9"/>
+          <p:cNvSpPr/>
+          <p:nvPr/>
+        </p:nvSpPr>
+        <p:spPr>
+          <a:xfrm>
+            <a:off x="7663966" y="4621808"/>
+            <a:ext cx="228600" cy="228600"/>
+          </a:xfrm>
+          <a:prstGeom prst="ellipse">
+            <a:avLst/>
+          </a:prstGeom>
+          <a:solidFill>
+            <a:schemeClr val="bg1"/>
+          </a:solidFill>
+          <a:ln>
+            <a:solidFill>
+              <a:schemeClr val="tx1"/>
+            </a:solidFill>
+          </a:ln>
+        </p:spPr>
+        <p:style>
+          <a:lnRef idx="2">
+            <a:schemeClr val="accent1">
+              <a:shade val="50000"/>
+            </a:schemeClr>
+          </a:lnRef>
+          <a:fillRef idx="1">
+            <a:schemeClr val="accent1"/>
+          </a:fillRef>
+          <a:effectRef idx="0">
+            <a:schemeClr val="accent1"/>
+          </a:effectRef>
+          <a:fontRef idx="minor">
+            <a:schemeClr val="lt1"/>
+          </a:fontRef>
+        </p:style>
+        <p:txBody>
+          <a:bodyPr rtlCol="0" anchor="ctr"/>
+          <a:lstStyle/>
+          <a:p>
+            <a:pPr algn="ctr"/>
+            <a:r>
+              <a:rPr lang="en-US" sz="1600" dirty="0" smtClean="0">
+                <a:solidFill>
+                  <a:schemeClr val="tx1"/>
+                </a:solidFill>
+                <a:latin typeface="Arial" panose="020B0604020202020204" pitchFamily="34" charset="0"/>
+                <a:cs typeface="Arial" panose="020B0604020202020204" pitchFamily="34" charset="0"/>
+              </a:rPr>
+              <a:t>2</a:t>
+            </a:r>
+            <a:endParaRPr lang="en-US" sz="1600" dirty="0">
+              <a:solidFill>
+                <a:schemeClr val="tx1"/>
+              </a:solidFill>
+              <a:latin typeface="Arial" panose="020B0604020202020204" pitchFamily="34" charset="0"/>
+              <a:cs typeface="Arial" panose="020B0604020202020204" pitchFamily="34" charset="0"/>
+            </a:endParaRPr>
+          </a:p>
+        </p:txBody>
+      </p:sp>
+      <p:cxnSp>
+        <p:nvCxnSpPr>
+          <p:cNvPr id="11" name="Straight Connector 10"/>
+          <p:cNvCxnSpPr>
+            <a:stCxn id="10" idx="2"/>
+          </p:cNvCxnSpPr>
+          <p:nvPr/>
+        </p:nvCxnSpPr>
+        <p:spPr>
+          <a:xfrm flipH="1" flipV="1">
+            <a:off x="7280031" y="4617406"/>
+            <a:ext cx="383935" cy="118702"/>
+          </a:xfrm>
+          <a:prstGeom prst="line">
+            <a:avLst/>
+          </a:prstGeom>
+          <a:ln w="28575">
+            <a:solidFill>
+              <a:schemeClr val="tx1"/>
+            </a:solidFill>
+          </a:ln>
+        </p:spPr>
+        <p:style>
+          <a:lnRef idx="1">
+            <a:schemeClr val="accent1"/>
+          </a:lnRef>
+          <a:fillRef idx="0">
+            <a:schemeClr val="accent1"/>
+          </a:fillRef>
+          <a:effectRef idx="0">
+            <a:schemeClr val="accent1"/>
+          </a:effectRef>
+          <a:fontRef idx="minor">
+            <a:schemeClr val="tx1"/>
+          </a:fontRef>
+        </p:style>
+      </p:cxnSp>
+      <p:sp>
+        <p:nvSpPr>
+          <p:cNvPr id="14" name="Oval 13"/>
+          <p:cNvSpPr/>
+          <p:nvPr/>
+        </p:nvSpPr>
+        <p:spPr>
+          <a:xfrm>
+            <a:off x="7488116" y="5105386"/>
+            <a:ext cx="228600" cy="228600"/>
+          </a:xfrm>
+          <a:prstGeom prst="ellipse">
+            <a:avLst/>
+          </a:prstGeom>
+          <a:solidFill>
+            <a:schemeClr val="bg1"/>
+          </a:solidFill>
+          <a:ln>
+            <a:solidFill>
+              <a:schemeClr val="tx1"/>
+            </a:solidFill>
+          </a:ln>
+        </p:spPr>
+        <p:style>
+          <a:lnRef idx="2">
+            <a:schemeClr val="accent1">
+              <a:shade val="50000"/>
+            </a:schemeClr>
+          </a:lnRef>
+          <a:fillRef idx="1">
+            <a:schemeClr val="accent1"/>
+          </a:fillRef>
+          <a:effectRef idx="0">
+            <a:schemeClr val="accent1"/>
+          </a:effectRef>
+          <a:fontRef idx="minor">
+            <a:schemeClr val="lt1"/>
+          </a:fontRef>
+        </p:style>
+        <p:txBody>
+          <a:bodyPr rtlCol="0" anchor="ctr"/>
+          <a:lstStyle/>
+          <a:p>
+            <a:pPr algn="ctr"/>
+            <a:r>
+              <a:rPr lang="en-US" sz="1600" dirty="0" smtClean="0">
+                <a:solidFill>
+                  <a:schemeClr val="tx1"/>
+                </a:solidFill>
+                <a:latin typeface="Arial" panose="020B0604020202020204" pitchFamily="34" charset="0"/>
+                <a:cs typeface="Arial" panose="020B0604020202020204" pitchFamily="34" charset="0"/>
+              </a:rPr>
+              <a:t>4</a:t>
+            </a:r>
+            <a:endParaRPr lang="en-US" sz="1600" dirty="0">
+              <a:solidFill>
+                <a:schemeClr val="tx1"/>
+              </a:solidFill>
+              <a:latin typeface="Arial" panose="020B0604020202020204" pitchFamily="34" charset="0"/>
+              <a:cs typeface="Arial" panose="020B0604020202020204" pitchFamily="34" charset="0"/>
+            </a:endParaRPr>
+          </a:p>
+        </p:txBody>
+      </p:sp>
+      <p:cxnSp>
+        <p:nvCxnSpPr>
+          <p:cNvPr id="15" name="Straight Connector 14"/>
+          <p:cNvCxnSpPr>
+            <a:stCxn id="14" idx="2"/>
+          </p:cNvCxnSpPr>
+          <p:nvPr/>
+        </p:nvCxnSpPr>
+        <p:spPr>
+          <a:xfrm flipH="1" flipV="1">
+            <a:off x="7139349" y="5105386"/>
+            <a:ext cx="348767" cy="114300"/>
+          </a:xfrm>
+          <a:prstGeom prst="line">
+            <a:avLst/>
+          </a:prstGeom>
+          <a:ln w="28575">
+            <a:solidFill>
+              <a:schemeClr val="tx1"/>
+            </a:solidFill>
+          </a:ln>
+        </p:spPr>
+        <p:style>
+          <a:lnRef idx="1">
+            <a:schemeClr val="accent1"/>
+          </a:lnRef>
+          <a:fillRef idx="0">
+            <a:schemeClr val="accent1"/>
+          </a:fillRef>
+          <a:effectRef idx="0">
+            <a:schemeClr val="accent1"/>
+          </a:effectRef>
+          <a:fontRef idx="minor">
+            <a:schemeClr val="tx1"/>
+          </a:fontRef>
+        </p:style>
+      </p:cxnSp>
+      <p:sp>
+        <p:nvSpPr>
+          <p:cNvPr id="17" name="Oval 16"/>
+          <p:cNvSpPr/>
+          <p:nvPr/>
+        </p:nvSpPr>
+        <p:spPr>
+          <a:xfrm>
+            <a:off x="6353912" y="5650512"/>
+            <a:ext cx="228600" cy="228600"/>
+          </a:xfrm>
+          <a:prstGeom prst="ellipse">
+            <a:avLst/>
+          </a:prstGeom>
+          <a:solidFill>
+            <a:schemeClr val="bg1"/>
+          </a:solidFill>
+          <a:ln>
+            <a:solidFill>
+              <a:schemeClr val="tx1"/>
+            </a:solidFill>
+          </a:ln>
+        </p:spPr>
+        <p:style>
+          <a:lnRef idx="2">
+            <a:schemeClr val="accent1">
+              <a:shade val="50000"/>
+            </a:schemeClr>
+          </a:lnRef>
+          <a:fillRef idx="1">
+            <a:schemeClr val="accent1"/>
+          </a:fillRef>
+          <a:effectRef idx="0">
+            <a:schemeClr val="accent1"/>
+          </a:effectRef>
+          <a:fontRef idx="minor">
+            <a:schemeClr val="lt1"/>
+          </a:fontRef>
+        </p:style>
+        <p:txBody>
+          <a:bodyPr rtlCol="0" anchor="ctr"/>
+          <a:lstStyle/>
+          <a:p>
+            <a:pPr algn="ctr"/>
+            <a:r>
+              <a:rPr lang="en-US" sz="1600" dirty="0">
+                <a:solidFill>
+                  <a:schemeClr val="tx1"/>
+                </a:solidFill>
+                <a:latin typeface="Arial" panose="020B0604020202020204" pitchFamily="34" charset="0"/>
+                <a:cs typeface="Arial" panose="020B0604020202020204" pitchFamily="34" charset="0"/>
+              </a:rPr>
+              <a:t>5</a:t>
+            </a:r>
+            <a:endParaRPr lang="en-US" sz="1600" dirty="0">
+              <a:solidFill>
+                <a:schemeClr val="tx1"/>
+              </a:solidFill>
+              <a:latin typeface="Arial" panose="020B0604020202020204" pitchFamily="34" charset="0"/>
+              <a:cs typeface="Arial" panose="020B0604020202020204" pitchFamily="34" charset="0"/>
+            </a:endParaRPr>
+          </a:p>
+        </p:txBody>
+      </p:sp>
+      <p:cxnSp>
+        <p:nvCxnSpPr>
+          <p:cNvPr id="18" name="Straight Connector 17"/>
+          <p:cNvCxnSpPr/>
+          <p:nvPr/>
+        </p:nvCxnSpPr>
+        <p:spPr>
+          <a:xfrm flipV="1">
+            <a:off x="6450624" y="5246066"/>
+            <a:ext cx="0" cy="404450"/>
+          </a:xfrm>
+          <a:prstGeom prst="line">
+            <a:avLst/>
+          </a:prstGeom>
+          <a:ln w="28575">
+            <a:solidFill>
+              <a:schemeClr val="tx1"/>
+            </a:solidFill>
+          </a:ln>
+        </p:spPr>
+        <p:style>
+          <a:lnRef idx="1">
+            <a:schemeClr val="accent1"/>
+          </a:lnRef>
+          <a:fillRef idx="0">
+            <a:schemeClr val="accent1"/>
+          </a:fillRef>
+          <a:effectRef idx="0">
+            <a:schemeClr val="accent1"/>
+          </a:effectRef>
+          <a:fontRef idx="minor">
+            <a:schemeClr val="tx1"/>
+          </a:fontRef>
+        </p:style>
+      </p:cxnSp>
+      <p:sp>
+        <p:nvSpPr>
+          <p:cNvPr id="21" name="Oval 20"/>
+          <p:cNvSpPr/>
+          <p:nvPr/>
+        </p:nvSpPr>
+        <p:spPr>
+          <a:xfrm>
+            <a:off x="7681552" y="3883262"/>
+            <a:ext cx="228600" cy="228600"/>
+          </a:xfrm>
+          <a:prstGeom prst="ellipse">
+            <a:avLst/>
+          </a:prstGeom>
+          <a:solidFill>
+            <a:schemeClr val="bg1"/>
+          </a:solidFill>
+          <a:ln>
+            <a:solidFill>
+              <a:schemeClr val="tx1"/>
+            </a:solidFill>
+          </a:ln>
+        </p:spPr>
+        <p:style>
+          <a:lnRef idx="2">
+            <a:schemeClr val="accent1">
+              <a:shade val="50000"/>
+            </a:schemeClr>
+          </a:lnRef>
+          <a:fillRef idx="1">
+            <a:schemeClr val="accent1"/>
+          </a:fillRef>
+          <a:effectRef idx="0">
+            <a:schemeClr val="accent1"/>
+          </a:effectRef>
+          <a:fontRef idx="minor">
+            <a:schemeClr val="lt1"/>
+          </a:fontRef>
+        </p:style>
+        <p:txBody>
+          <a:bodyPr rtlCol="0" anchor="ctr"/>
+          <a:lstStyle/>
+          <a:p>
+            <a:pPr algn="ctr"/>
+            <a:r>
+              <a:rPr lang="en-US" sz="1600" dirty="0" smtClean="0">
+                <a:solidFill>
+                  <a:schemeClr val="tx1"/>
+                </a:solidFill>
+                <a:latin typeface="Arial" panose="020B0604020202020204" pitchFamily="34" charset="0"/>
+                <a:cs typeface="Arial" panose="020B0604020202020204" pitchFamily="34" charset="0"/>
+              </a:rPr>
+              <a:t>6</a:t>
+            </a:r>
+            <a:endParaRPr lang="en-US" sz="1600" dirty="0">
+              <a:solidFill>
+                <a:schemeClr val="tx1"/>
+              </a:solidFill>
+              <a:latin typeface="Arial" panose="020B0604020202020204" pitchFamily="34" charset="0"/>
+              <a:cs typeface="Arial" panose="020B0604020202020204" pitchFamily="34" charset="0"/>
+            </a:endParaRPr>
+          </a:p>
+        </p:txBody>
+      </p:sp>
+      <p:cxnSp>
+        <p:nvCxnSpPr>
+          <p:cNvPr id="22" name="Straight Connector 21"/>
+          <p:cNvCxnSpPr>
+            <a:stCxn id="21" idx="2"/>
+          </p:cNvCxnSpPr>
+          <p:nvPr/>
+        </p:nvCxnSpPr>
+        <p:spPr>
+          <a:xfrm flipH="1">
+            <a:off x="7344511" y="3997562"/>
+            <a:ext cx="337041" cy="5872"/>
+          </a:xfrm>
+          <a:prstGeom prst="line">
+            <a:avLst/>
+          </a:prstGeom>
+          <a:ln w="28575">
+            <a:solidFill>
+              <a:schemeClr val="tx1"/>
+            </a:solidFill>
+          </a:ln>
+        </p:spPr>
+        <p:style>
+          <a:lnRef idx="1">
+            <a:schemeClr val="accent1"/>
+          </a:lnRef>
+          <a:fillRef idx="0">
+            <a:schemeClr val="accent1"/>
+          </a:fillRef>
+          <a:effectRef idx="0">
+            <a:schemeClr val="accent1"/>
+          </a:effectRef>
+          <a:fontRef idx="minor">
+            <a:schemeClr val="tx1"/>
+          </a:fontRef>
+        </p:style>
+      </p:cxnSp>
+      <p:sp>
+        <p:nvSpPr>
+          <p:cNvPr id="23" name="Oval 22"/>
+          <p:cNvSpPr/>
+          <p:nvPr/>
+        </p:nvSpPr>
+        <p:spPr>
+          <a:xfrm>
+            <a:off x="4700960" y="3452436"/>
+            <a:ext cx="228600" cy="228600"/>
+          </a:xfrm>
+          <a:prstGeom prst="ellipse">
+            <a:avLst/>
+          </a:prstGeom>
+          <a:solidFill>
+            <a:schemeClr val="bg1"/>
+          </a:solidFill>
+          <a:ln>
+            <a:solidFill>
+              <a:schemeClr val="tx1"/>
+            </a:solidFill>
+          </a:ln>
+        </p:spPr>
+        <p:style>
+          <a:lnRef idx="2">
+            <a:schemeClr val="accent1">
+              <a:shade val="50000"/>
+            </a:schemeClr>
+          </a:lnRef>
+          <a:fillRef idx="1">
+            <a:schemeClr val="accent1"/>
+          </a:fillRef>
+          <a:effectRef idx="0">
+            <a:schemeClr val="accent1"/>
+          </a:effectRef>
+          <a:fontRef idx="minor">
+            <a:schemeClr val="lt1"/>
+          </a:fontRef>
+        </p:style>
+        <p:txBody>
+          <a:bodyPr rtlCol="0" anchor="ctr"/>
+          <a:lstStyle/>
+          <a:p>
+            <a:pPr algn="ctr"/>
+            <a:r>
+              <a:rPr lang="en-US" sz="1600" dirty="0" smtClean="0">
+                <a:solidFill>
+                  <a:schemeClr val="tx1"/>
+                </a:solidFill>
+                <a:latin typeface="Arial" panose="020B0604020202020204" pitchFamily="34" charset="0"/>
+                <a:cs typeface="Arial" panose="020B0604020202020204" pitchFamily="34" charset="0"/>
+              </a:rPr>
+              <a:t>7</a:t>
+            </a:r>
+            <a:endParaRPr lang="en-US" sz="1600" dirty="0">
+              <a:solidFill>
+                <a:schemeClr val="tx1"/>
+              </a:solidFill>
+              <a:latin typeface="Arial" panose="020B0604020202020204" pitchFamily="34" charset="0"/>
+              <a:cs typeface="Arial" panose="020B0604020202020204" pitchFamily="34" charset="0"/>
+            </a:endParaRPr>
+          </a:p>
+        </p:txBody>
+      </p:sp>
+      <p:sp>
+        <p:nvSpPr>
+          <p:cNvPr id="25" name="Oval 24"/>
+          <p:cNvSpPr/>
+          <p:nvPr/>
+        </p:nvSpPr>
+        <p:spPr>
+          <a:xfrm>
+            <a:off x="6629401" y="5732576"/>
+            <a:ext cx="228600" cy="228600"/>
+          </a:xfrm>
+          <a:prstGeom prst="ellipse">
+            <a:avLst/>
+          </a:prstGeom>
+          <a:solidFill>
+            <a:schemeClr val="bg1"/>
+          </a:solidFill>
+          <a:ln>
+            <a:solidFill>
+              <a:schemeClr val="tx1"/>
+            </a:solidFill>
+          </a:ln>
+        </p:spPr>
+        <p:style>
+          <a:lnRef idx="2">
+            <a:schemeClr val="accent1">
+              <a:shade val="50000"/>
+            </a:schemeClr>
+          </a:lnRef>
+          <a:fillRef idx="1">
+            <a:schemeClr val="accent1"/>
+          </a:fillRef>
+          <a:effectRef idx="0">
+            <a:schemeClr val="accent1"/>
+          </a:effectRef>
+          <a:fontRef idx="minor">
+            <a:schemeClr val="lt1"/>
+          </a:fontRef>
+        </p:style>
+        <p:txBody>
+          <a:bodyPr rtlCol="0" anchor="ctr"/>
+          <a:lstStyle/>
+          <a:p>
+            <a:pPr algn="ctr"/>
+            <a:r>
+              <a:rPr lang="en-US" sz="1600" dirty="0" smtClean="0">
+                <a:solidFill>
+                  <a:schemeClr val="tx1"/>
+                </a:solidFill>
+                <a:latin typeface="Arial" panose="020B0604020202020204" pitchFamily="34" charset="0"/>
+                <a:cs typeface="Arial" panose="020B0604020202020204" pitchFamily="34" charset="0"/>
+              </a:rPr>
+              <a:t>8</a:t>
+            </a:r>
+            <a:endParaRPr lang="en-US" sz="1600" dirty="0">
+              <a:solidFill>
+                <a:schemeClr val="tx1"/>
+              </a:solidFill>
+              <a:latin typeface="Arial" panose="020B0604020202020204" pitchFamily="34" charset="0"/>
+              <a:cs typeface="Arial" panose="020B0604020202020204" pitchFamily="34" charset="0"/>
+            </a:endParaRPr>
+          </a:p>
+        </p:txBody>
+      </p:sp>
+      <p:cxnSp>
+        <p:nvCxnSpPr>
+          <p:cNvPr id="26" name="Straight Connector 25"/>
+          <p:cNvCxnSpPr/>
+          <p:nvPr/>
+        </p:nvCxnSpPr>
+        <p:spPr>
+          <a:xfrm flipV="1">
+            <a:off x="6726113" y="5328130"/>
+            <a:ext cx="0" cy="404450"/>
+          </a:xfrm>
+          <a:prstGeom prst="line">
+            <a:avLst/>
+          </a:prstGeom>
+          <a:ln w="28575">
+            <a:solidFill>
+              <a:schemeClr val="tx1"/>
+            </a:solidFill>
+          </a:ln>
+        </p:spPr>
+        <p:style>
+          <a:lnRef idx="1">
+            <a:schemeClr val="accent1"/>
+          </a:lnRef>
+          <a:fillRef idx="0">
+            <a:schemeClr val="accent1"/>
+          </a:fillRef>
+          <a:effectRef idx="0">
+            <a:schemeClr val="accent1"/>
+          </a:effectRef>
+          <a:fontRef idx="minor">
+            <a:schemeClr val="tx1"/>
+          </a:fontRef>
+        </p:style>
+      </p:cxnSp>
+      <p:sp>
+        <p:nvSpPr>
+          <p:cNvPr id="27" name="Oval 26"/>
+          <p:cNvSpPr/>
+          <p:nvPr/>
+        </p:nvSpPr>
+        <p:spPr>
+          <a:xfrm>
+            <a:off x="7640516" y="4879723"/>
+            <a:ext cx="228600" cy="228600"/>
+          </a:xfrm>
+          <a:prstGeom prst="ellipse">
+            <a:avLst/>
+          </a:prstGeom>
+          <a:solidFill>
+            <a:schemeClr val="bg1"/>
+          </a:solidFill>
+          <a:ln>
+            <a:solidFill>
+              <a:schemeClr val="tx1"/>
+            </a:solidFill>
+          </a:ln>
+        </p:spPr>
+        <p:style>
+          <a:lnRef idx="2">
+            <a:schemeClr val="accent1">
+              <a:shade val="50000"/>
+            </a:schemeClr>
+          </a:lnRef>
+          <a:fillRef idx="1">
+            <a:schemeClr val="accent1"/>
+          </a:fillRef>
+          <a:effectRef idx="0">
+            <a:schemeClr val="accent1"/>
+          </a:effectRef>
+          <a:fontRef idx="minor">
+            <a:schemeClr val="lt1"/>
+          </a:fontRef>
+        </p:style>
+        <p:txBody>
+          <a:bodyPr rtlCol="0" anchor="ctr"/>
+          <a:lstStyle/>
+          <a:p>
+            <a:pPr algn="ctr"/>
+            <a:r>
+              <a:rPr lang="en-US" sz="1600" dirty="0" smtClean="0">
+                <a:solidFill>
+                  <a:schemeClr val="tx1"/>
+                </a:solidFill>
+                <a:latin typeface="Arial" panose="020B0604020202020204" pitchFamily="34" charset="0"/>
+                <a:cs typeface="Arial" panose="020B0604020202020204" pitchFamily="34" charset="0"/>
+              </a:rPr>
+              <a:t>9</a:t>
+            </a:r>
+            <a:endParaRPr lang="en-US" sz="1600" dirty="0">
+              <a:solidFill>
+                <a:schemeClr val="tx1"/>
+              </a:solidFill>
+              <a:latin typeface="Arial" panose="020B0604020202020204" pitchFamily="34" charset="0"/>
+              <a:cs typeface="Arial" panose="020B0604020202020204" pitchFamily="34" charset="0"/>
+            </a:endParaRPr>
+          </a:p>
+        </p:txBody>
+      </p:sp>
+      <p:cxnSp>
+        <p:nvCxnSpPr>
+          <p:cNvPr id="28" name="Straight Connector 27"/>
+          <p:cNvCxnSpPr>
+            <a:stCxn id="27" idx="2"/>
+          </p:cNvCxnSpPr>
+          <p:nvPr/>
+        </p:nvCxnSpPr>
+        <p:spPr>
+          <a:xfrm flipH="1" flipV="1">
+            <a:off x="7291749" y="4879723"/>
+            <a:ext cx="348767" cy="114300"/>
+          </a:xfrm>
+          <a:prstGeom prst="line">
+            <a:avLst/>
+          </a:prstGeom>
+          <a:ln w="28575">
+            <a:solidFill>
+              <a:schemeClr val="tx1"/>
+            </a:solidFill>
+          </a:ln>
+        </p:spPr>
+        <p:style>
+          <a:lnRef idx="1">
+            <a:schemeClr val="accent1"/>
+          </a:lnRef>
+          <a:fillRef idx="0">
+            <a:schemeClr val="accent1"/>
+          </a:fillRef>
+          <a:effectRef idx="0">
+            <a:schemeClr val="accent1"/>
+          </a:effectRef>
+          <a:fontRef idx="minor">
+            <a:schemeClr val="tx1"/>
+          </a:fontRef>
+        </p:style>
+      </p:cxnSp>
+      <p:sp>
+        <p:nvSpPr>
+          <p:cNvPr id="30" name="Oval 29"/>
+          <p:cNvSpPr/>
+          <p:nvPr/>
+        </p:nvSpPr>
+        <p:spPr>
+          <a:xfrm>
+            <a:off x="4879737" y="4941269"/>
+            <a:ext cx="228600" cy="228600"/>
+          </a:xfrm>
+          <a:prstGeom prst="ellipse">
+            <a:avLst/>
+          </a:prstGeom>
+          <a:solidFill>
+            <a:schemeClr val="bg1"/>
+          </a:solidFill>
+          <a:ln>
+            <a:solidFill>
+              <a:schemeClr val="tx1"/>
+            </a:solidFill>
+          </a:ln>
+        </p:spPr>
+        <p:style>
+          <a:lnRef idx="2">
+            <a:schemeClr val="accent1">
+              <a:shade val="50000"/>
+            </a:schemeClr>
+          </a:lnRef>
+          <a:fillRef idx="1">
+            <a:schemeClr val="accent1"/>
+          </a:fillRef>
+          <a:effectRef idx="0">
+            <a:schemeClr val="accent1"/>
+          </a:effectRef>
+          <a:fontRef idx="minor">
+            <a:schemeClr val="lt1"/>
+          </a:fontRef>
+        </p:style>
+        <p:txBody>
+          <a:bodyPr rtlCol="0" anchor="ctr"/>
+          <a:lstStyle/>
+          <a:p>
+            <a:pPr algn="ctr"/>
+            <a:endParaRPr lang="en-US" sz="1600" dirty="0">
+              <a:solidFill>
+                <a:schemeClr val="tx1"/>
+              </a:solidFill>
+              <a:latin typeface="Arial" panose="020B0604020202020204" pitchFamily="34" charset="0"/>
+              <a:cs typeface="Arial" panose="020B0604020202020204" pitchFamily="34" charset="0"/>
+            </a:endParaRPr>
+          </a:p>
+        </p:txBody>
+      </p:sp>
+      <p:sp>
+        <p:nvSpPr>
+          <p:cNvPr id="31" name="TextBox 30"/>
+          <p:cNvSpPr txBox="1"/>
+          <p:nvPr/>
+        </p:nvSpPr>
+        <p:spPr>
+          <a:xfrm>
+            <a:off x="4774088" y="4885552"/>
+            <a:ext cx="509953" cy="338554"/>
+          </a:xfrm>
+          <a:prstGeom prst="rect">
+            <a:avLst/>
+          </a:prstGeom>
+          <a:noFill/>
+        </p:spPr>
+        <p:txBody>
+          <a:bodyPr wrap="square" rtlCol="0">
+            <a:spAutoFit/>
+          </a:bodyPr>
+          <a:lstStyle/>
+          <a:p>
+            <a:r>
+              <a:rPr lang="en-US" sz="1600" dirty="0" smtClean="0">
+                <a:latin typeface="Arial" panose="020B0604020202020204" pitchFamily="34" charset="0"/>
+                <a:cs typeface="Arial" panose="020B0604020202020204" pitchFamily="34" charset="0"/>
+              </a:rPr>
+              <a:t>10</a:t>
+            </a:r>
+            <a:endParaRPr lang="en-US" dirty="0">
+              <a:latin typeface="Arial" panose="020B0604020202020204" pitchFamily="34" charset="0"/>
+              <a:cs typeface="Arial" panose="020B0604020202020204" pitchFamily="34" charset="0"/>
+            </a:endParaRPr>
+          </a:p>
+        </p:txBody>
+      </p:sp>
+      <p:sp>
+        <p:nvSpPr>
+          <p:cNvPr id="32" name="Oval 31"/>
+          <p:cNvSpPr/>
+          <p:nvPr/>
+        </p:nvSpPr>
+        <p:spPr>
+          <a:xfrm>
+            <a:off x="7218482" y="5272439"/>
+            <a:ext cx="228600" cy="228600"/>
+          </a:xfrm>
+          <a:prstGeom prst="ellipse">
+            <a:avLst/>
+          </a:prstGeom>
+          <a:solidFill>
+            <a:schemeClr val="bg1"/>
+          </a:solidFill>
+          <a:ln>
+            <a:solidFill>
+              <a:schemeClr val="tx1"/>
+            </a:solidFill>
+          </a:ln>
+        </p:spPr>
+        <p:style>
+          <a:lnRef idx="2">
+            <a:schemeClr val="accent1">
+              <a:shade val="50000"/>
+            </a:schemeClr>
+          </a:lnRef>
+          <a:fillRef idx="1">
+            <a:schemeClr val="accent1"/>
+          </a:fillRef>
+          <a:effectRef idx="0">
+            <a:schemeClr val="accent1"/>
+          </a:effectRef>
+          <a:fontRef idx="minor">
+            <a:schemeClr val="lt1"/>
+          </a:fontRef>
+        </p:style>
+        <p:txBody>
+          <a:bodyPr rtlCol="0" anchor="ctr"/>
+          <a:lstStyle/>
+          <a:p>
+            <a:pPr algn="ctr"/>
+            <a:endParaRPr lang="en-US" sz="1600" dirty="0">
+              <a:solidFill>
+                <a:schemeClr val="tx1"/>
+              </a:solidFill>
+              <a:latin typeface="Arial" panose="020B0604020202020204" pitchFamily="34" charset="0"/>
+              <a:cs typeface="Arial" panose="020B0604020202020204" pitchFamily="34" charset="0"/>
+            </a:endParaRPr>
+          </a:p>
+        </p:txBody>
+      </p:sp>
+      <p:cxnSp>
+        <p:nvCxnSpPr>
+          <p:cNvPr id="33" name="Straight Connector 32"/>
+          <p:cNvCxnSpPr>
+            <a:stCxn id="32" idx="2"/>
+          </p:cNvCxnSpPr>
+          <p:nvPr/>
+        </p:nvCxnSpPr>
+        <p:spPr>
+          <a:xfrm flipH="1" flipV="1">
+            <a:off x="6910749" y="5169869"/>
+            <a:ext cx="307733" cy="216870"/>
+          </a:xfrm>
+          <a:prstGeom prst="line">
+            <a:avLst/>
+          </a:prstGeom>
+          <a:ln w="28575">
+            <a:solidFill>
+              <a:schemeClr val="tx1"/>
+            </a:solidFill>
+          </a:ln>
+        </p:spPr>
+        <p:style>
+          <a:lnRef idx="1">
+            <a:schemeClr val="accent1"/>
+          </a:lnRef>
+          <a:fillRef idx="0">
+            <a:schemeClr val="accent1"/>
+          </a:fillRef>
+          <a:effectRef idx="0">
+            <a:schemeClr val="accent1"/>
+          </a:effectRef>
+          <a:fontRef idx="minor">
+            <a:schemeClr val="tx1"/>
+          </a:fontRef>
+        </p:style>
+      </p:cxnSp>
+      <p:sp>
+        <p:nvSpPr>
+          <p:cNvPr id="36" name="TextBox 35"/>
+          <p:cNvSpPr txBox="1"/>
+          <p:nvPr/>
+        </p:nvSpPr>
+        <p:spPr>
+          <a:xfrm>
+            <a:off x="7145215" y="5224788"/>
+            <a:ext cx="509953" cy="338554"/>
+          </a:xfrm>
+          <a:prstGeom prst="rect">
+            <a:avLst/>
+          </a:prstGeom>
+          <a:noFill/>
+        </p:spPr>
+        <p:txBody>
+          <a:bodyPr wrap="square" rtlCol="0">
+            <a:spAutoFit/>
+          </a:bodyPr>
+          <a:lstStyle/>
+          <a:p>
+            <a:r>
+              <a:rPr lang="en-US" sz="1600" dirty="0" smtClean="0">
+                <a:latin typeface="Arial" panose="020B0604020202020204" pitchFamily="34" charset="0"/>
+                <a:cs typeface="Arial" panose="020B0604020202020204" pitchFamily="34" charset="0"/>
+              </a:rPr>
+              <a:t>11</a:t>
+            </a:r>
+            <a:endParaRPr lang="en-US" dirty="0">
+              <a:latin typeface="Arial" panose="020B0604020202020204" pitchFamily="34" charset="0"/>
+              <a:cs typeface="Arial" panose="020B0604020202020204" pitchFamily="34" charset="0"/>
+            </a:endParaRPr>
+          </a:p>
+        </p:txBody>
+      </p:sp>
+      <p:sp>
+        <p:nvSpPr>
+          <p:cNvPr id="39" name="Oval 38"/>
+          <p:cNvSpPr/>
+          <p:nvPr/>
+        </p:nvSpPr>
+        <p:spPr>
+          <a:xfrm>
+            <a:off x="4026885" y="4158741"/>
+            <a:ext cx="228600" cy="228600"/>
+          </a:xfrm>
+          <a:prstGeom prst="ellipse">
+            <a:avLst/>
+          </a:prstGeom>
+          <a:solidFill>
+            <a:schemeClr val="bg1"/>
+          </a:solidFill>
+          <a:ln>
+            <a:solidFill>
+              <a:schemeClr val="tx1"/>
+            </a:solidFill>
+          </a:ln>
+        </p:spPr>
+        <p:style>
+          <a:lnRef idx="2">
+            <a:schemeClr val="accent1">
+              <a:shade val="50000"/>
+            </a:schemeClr>
+          </a:lnRef>
+          <a:fillRef idx="1">
+            <a:schemeClr val="accent1"/>
+          </a:fillRef>
+          <a:effectRef idx="0">
+            <a:schemeClr val="accent1"/>
+          </a:effectRef>
+          <a:fontRef idx="minor">
+            <a:schemeClr val="lt1"/>
+          </a:fontRef>
+        </p:style>
+        <p:txBody>
+          <a:bodyPr rtlCol="0" anchor="ctr"/>
+          <a:lstStyle/>
+          <a:p>
+            <a:pPr algn="ctr"/>
+            <a:endParaRPr lang="en-US" sz="1600" dirty="0">
+              <a:solidFill>
+                <a:schemeClr val="tx1"/>
+              </a:solidFill>
+              <a:latin typeface="Arial" panose="020B0604020202020204" pitchFamily="34" charset="0"/>
+              <a:cs typeface="Arial" panose="020B0604020202020204" pitchFamily="34" charset="0"/>
+            </a:endParaRPr>
+          </a:p>
+        </p:txBody>
+      </p:sp>
+      <p:sp>
+        <p:nvSpPr>
+          <p:cNvPr id="37" name="TextBox 36"/>
+          <p:cNvSpPr txBox="1"/>
+          <p:nvPr/>
+        </p:nvSpPr>
+        <p:spPr>
+          <a:xfrm>
+            <a:off x="3921376" y="4116226"/>
+            <a:ext cx="509953" cy="338554"/>
+          </a:xfrm>
+          <a:prstGeom prst="rect">
+            <a:avLst/>
+          </a:prstGeom>
+          <a:noFill/>
+        </p:spPr>
+        <p:txBody>
+          <a:bodyPr wrap="square" rtlCol="0">
+            <a:spAutoFit/>
+          </a:bodyPr>
+          <a:lstStyle/>
+          <a:p>
+            <a:r>
+              <a:rPr lang="en-US" sz="1600" dirty="0" smtClean="0">
+                <a:latin typeface="Arial" panose="020B0604020202020204" pitchFamily="34" charset="0"/>
+                <a:cs typeface="Arial" panose="020B0604020202020204" pitchFamily="34" charset="0"/>
+              </a:rPr>
+              <a:t>12</a:t>
+            </a:r>
+            <a:endParaRPr lang="en-US" dirty="0">
+              <a:latin typeface="Arial" panose="020B0604020202020204" pitchFamily="34" charset="0"/>
+              <a:cs typeface="Arial" panose="020B0604020202020204" pitchFamily="34" charset="0"/>
+            </a:endParaRPr>
+          </a:p>
+        </p:txBody>
+      </p:sp>
+      <p:sp>
+        <p:nvSpPr>
+          <p:cNvPr id="40" name="Oval 39"/>
+          <p:cNvSpPr/>
+          <p:nvPr/>
+        </p:nvSpPr>
+        <p:spPr>
+          <a:xfrm>
+            <a:off x="7367959" y="3349859"/>
+            <a:ext cx="228600" cy="228600"/>
+          </a:xfrm>
+          <a:prstGeom prst="ellipse">
+            <a:avLst/>
+          </a:prstGeom>
+          <a:solidFill>
+            <a:schemeClr val="bg1"/>
+          </a:solidFill>
+          <a:ln>
+            <a:solidFill>
+              <a:schemeClr val="tx1"/>
+            </a:solidFill>
+          </a:ln>
+        </p:spPr>
+        <p:style>
+          <a:lnRef idx="2">
+            <a:schemeClr val="accent1">
+              <a:shade val="50000"/>
+            </a:schemeClr>
+          </a:lnRef>
+          <a:fillRef idx="1">
+            <a:schemeClr val="accent1"/>
+          </a:fillRef>
+          <a:effectRef idx="0">
+            <a:schemeClr val="accent1"/>
+          </a:effectRef>
+          <a:fontRef idx="minor">
+            <a:schemeClr val="lt1"/>
+          </a:fontRef>
+        </p:style>
+        <p:txBody>
+          <a:bodyPr rtlCol="0" anchor="ctr"/>
+          <a:lstStyle/>
+          <a:p>
+            <a:pPr algn="ctr"/>
+            <a:endParaRPr lang="en-US" sz="1600" dirty="0">
+              <a:solidFill>
+                <a:schemeClr val="tx1"/>
+              </a:solidFill>
+              <a:latin typeface="Arial" panose="020B0604020202020204" pitchFamily="34" charset="0"/>
+              <a:cs typeface="Arial" panose="020B0604020202020204" pitchFamily="34" charset="0"/>
+            </a:endParaRPr>
+          </a:p>
+        </p:txBody>
+      </p:sp>
+      <p:sp>
+        <p:nvSpPr>
+          <p:cNvPr id="41" name="TextBox 40"/>
+          <p:cNvSpPr txBox="1"/>
+          <p:nvPr/>
+        </p:nvSpPr>
+        <p:spPr>
+          <a:xfrm>
+            <a:off x="7274182" y="3300743"/>
+            <a:ext cx="509953" cy="338554"/>
+          </a:xfrm>
+          <a:prstGeom prst="rect">
+            <a:avLst/>
+          </a:prstGeom>
+          <a:noFill/>
+        </p:spPr>
+        <p:txBody>
+          <a:bodyPr wrap="square" rtlCol="0">
+            <a:spAutoFit/>
+          </a:bodyPr>
+          <a:lstStyle/>
+          <a:p>
+            <a:r>
+              <a:rPr lang="en-US" sz="1600" dirty="0" smtClean="0">
+                <a:latin typeface="Arial" panose="020B0604020202020204" pitchFamily="34" charset="0"/>
+                <a:cs typeface="Arial" panose="020B0604020202020204" pitchFamily="34" charset="0"/>
+              </a:rPr>
+              <a:t>13</a:t>
+            </a:r>
+            <a:endParaRPr lang="en-US" dirty="0">
+              <a:latin typeface="Arial" panose="020B0604020202020204" pitchFamily="34" charset="0"/>
+              <a:cs typeface="Arial" panose="020B0604020202020204" pitchFamily="34" charset="0"/>
+            </a:endParaRPr>
+          </a:p>
+        </p:txBody>
+      </p:sp>
+      <p:sp>
+        <p:nvSpPr>
+          <p:cNvPr id="42" name="Oval 41"/>
+          <p:cNvSpPr/>
+          <p:nvPr/>
+        </p:nvSpPr>
+        <p:spPr>
+          <a:xfrm>
+            <a:off x="6761287" y="4633529"/>
+            <a:ext cx="228600" cy="228600"/>
+          </a:xfrm>
+          <a:prstGeom prst="ellipse">
+            <a:avLst/>
+          </a:prstGeom>
+          <a:solidFill>
+            <a:schemeClr val="bg1"/>
+          </a:solidFill>
+          <a:ln>
+            <a:solidFill>
+              <a:schemeClr val="tx1"/>
+            </a:solidFill>
+          </a:ln>
+        </p:spPr>
+        <p:style>
+          <a:lnRef idx="2">
+            <a:schemeClr val="accent1">
+              <a:shade val="50000"/>
+            </a:schemeClr>
+          </a:lnRef>
+          <a:fillRef idx="1">
+            <a:schemeClr val="accent1"/>
+          </a:fillRef>
+          <a:effectRef idx="0">
+            <a:schemeClr val="accent1"/>
+          </a:effectRef>
+          <a:fontRef idx="minor">
+            <a:schemeClr val="lt1"/>
+          </a:fontRef>
+        </p:style>
+        <p:txBody>
+          <a:bodyPr rtlCol="0" anchor="ctr"/>
+          <a:lstStyle/>
+          <a:p>
+            <a:pPr algn="ctr"/>
+            <a:endParaRPr lang="en-US" sz="1600" dirty="0">
+              <a:solidFill>
+                <a:schemeClr val="tx1"/>
+              </a:solidFill>
+              <a:latin typeface="Arial" panose="020B0604020202020204" pitchFamily="34" charset="0"/>
+              <a:cs typeface="Arial" panose="020B0604020202020204" pitchFamily="34" charset="0"/>
+            </a:endParaRPr>
+          </a:p>
+        </p:txBody>
+      </p:sp>
+      <p:cxnSp>
+        <p:nvCxnSpPr>
+          <p:cNvPr id="43" name="Straight Connector 42"/>
+          <p:cNvCxnSpPr/>
+          <p:nvPr/>
+        </p:nvCxnSpPr>
+        <p:spPr>
+          <a:xfrm flipV="1">
+            <a:off x="6787400" y="4850408"/>
+            <a:ext cx="70601" cy="312129"/>
+          </a:xfrm>
+          <a:prstGeom prst="line">
+            <a:avLst/>
+          </a:prstGeom>
+          <a:ln w="28575">
+            <a:solidFill>
+              <a:schemeClr val="tx1"/>
+            </a:solidFill>
+          </a:ln>
+        </p:spPr>
+        <p:style>
+          <a:lnRef idx="1">
+            <a:schemeClr val="accent1"/>
+          </a:lnRef>
+          <a:fillRef idx="0">
+            <a:schemeClr val="accent1"/>
+          </a:fillRef>
+          <a:effectRef idx="0">
+            <a:schemeClr val="accent1"/>
+          </a:effectRef>
+          <a:fontRef idx="minor">
+            <a:schemeClr val="tx1"/>
+          </a:fontRef>
+        </p:style>
+      </p:cxnSp>
+      <p:sp>
+        <p:nvSpPr>
+          <p:cNvPr id="46" name="TextBox 45"/>
+          <p:cNvSpPr txBox="1"/>
+          <p:nvPr/>
+        </p:nvSpPr>
+        <p:spPr>
+          <a:xfrm>
+            <a:off x="6655777" y="4587359"/>
+            <a:ext cx="509953" cy="338554"/>
+          </a:xfrm>
+          <a:prstGeom prst="rect">
+            <a:avLst/>
+          </a:prstGeom>
+          <a:noFill/>
+        </p:spPr>
+        <p:txBody>
+          <a:bodyPr wrap="square" rtlCol="0">
+            <a:spAutoFit/>
+          </a:bodyPr>
+          <a:lstStyle/>
+          <a:p>
+            <a:r>
+              <a:rPr lang="en-US" sz="1600" dirty="0" smtClean="0">
+                <a:latin typeface="Arial" panose="020B0604020202020204" pitchFamily="34" charset="0"/>
+                <a:cs typeface="Arial" panose="020B0604020202020204" pitchFamily="34" charset="0"/>
+              </a:rPr>
+              <a:t>14</a:t>
+            </a:r>
+            <a:endParaRPr lang="en-US" dirty="0">
+              <a:latin typeface="Arial" panose="020B0604020202020204" pitchFamily="34" charset="0"/>
+              <a:cs typeface="Arial" panose="020B0604020202020204" pitchFamily="34" charset="0"/>
+            </a:endParaRPr>
+          </a:p>
+        </p:txBody>
+      </p:sp>
+      <p:sp>
+        <p:nvSpPr>
+          <p:cNvPr id="48" name="Oval 47"/>
+          <p:cNvSpPr/>
+          <p:nvPr/>
+        </p:nvSpPr>
+        <p:spPr>
+          <a:xfrm>
+            <a:off x="4563216" y="3147635"/>
+            <a:ext cx="228600" cy="228600"/>
+          </a:xfrm>
+          <a:prstGeom prst="ellipse">
+            <a:avLst/>
+          </a:prstGeom>
+          <a:solidFill>
+            <a:schemeClr val="bg1"/>
+          </a:solidFill>
+          <a:ln>
+            <a:solidFill>
+              <a:schemeClr val="tx1"/>
+            </a:solidFill>
+          </a:ln>
+        </p:spPr>
+        <p:style>
+          <a:lnRef idx="2">
+            <a:schemeClr val="accent1">
+              <a:shade val="50000"/>
+            </a:schemeClr>
+          </a:lnRef>
+          <a:fillRef idx="1">
+            <a:schemeClr val="accent1"/>
+          </a:fillRef>
+          <a:effectRef idx="0">
+            <a:schemeClr val="accent1"/>
+          </a:effectRef>
+          <a:fontRef idx="minor">
+            <a:schemeClr val="lt1"/>
+          </a:fontRef>
+        </p:style>
+        <p:txBody>
+          <a:bodyPr rtlCol="0" anchor="ctr"/>
+          <a:lstStyle/>
+          <a:p>
+            <a:pPr algn="ctr"/>
+            <a:endParaRPr lang="en-US" sz="1600" dirty="0">
+              <a:solidFill>
+                <a:schemeClr val="tx1"/>
+              </a:solidFill>
+              <a:latin typeface="Arial" panose="020B0604020202020204" pitchFamily="34" charset="0"/>
+              <a:cs typeface="Arial" panose="020B0604020202020204" pitchFamily="34" charset="0"/>
+            </a:endParaRPr>
+          </a:p>
+        </p:txBody>
+      </p:sp>
+      <p:sp>
+        <p:nvSpPr>
+          <p:cNvPr id="47" name="TextBox 46"/>
+          <p:cNvSpPr txBox="1"/>
+          <p:nvPr/>
+        </p:nvSpPr>
+        <p:spPr>
+          <a:xfrm>
+            <a:off x="4457705" y="3108010"/>
+            <a:ext cx="509953" cy="338554"/>
+          </a:xfrm>
+          <a:prstGeom prst="rect">
+            <a:avLst/>
+          </a:prstGeom>
+          <a:noFill/>
+        </p:spPr>
+        <p:txBody>
+          <a:bodyPr wrap="square" rtlCol="0">
+            <a:spAutoFit/>
+          </a:bodyPr>
+          <a:lstStyle/>
+          <a:p>
+            <a:r>
+              <a:rPr lang="en-US" sz="1600" dirty="0" smtClean="0">
+                <a:latin typeface="Arial" panose="020B0604020202020204" pitchFamily="34" charset="0"/>
+                <a:cs typeface="Arial" panose="020B0604020202020204" pitchFamily="34" charset="0"/>
+              </a:rPr>
+              <a:t>15</a:t>
+            </a:r>
+            <a:endParaRPr lang="en-US" dirty="0">
+              <a:latin typeface="Arial" panose="020B0604020202020204" pitchFamily="34" charset="0"/>
+              <a:cs typeface="Arial" panose="020B0604020202020204" pitchFamily="34" charset="0"/>
+            </a:endParaRPr>
+          </a:p>
+        </p:txBody>
+      </p:sp>
+      <p:cxnSp>
+        <p:nvCxnSpPr>
+          <p:cNvPr id="49" name="Straight Connector 48"/>
+          <p:cNvCxnSpPr/>
+          <p:nvPr/>
+        </p:nvCxnSpPr>
+        <p:spPr>
+          <a:xfrm flipV="1">
+            <a:off x="4298584" y="3349860"/>
+            <a:ext cx="304321" cy="136329"/>
+          </a:xfrm>
+          <a:prstGeom prst="line">
+            <a:avLst/>
+          </a:prstGeom>
+          <a:ln w="28575">
+            <a:solidFill>
+              <a:schemeClr val="tx1"/>
+            </a:solidFill>
+          </a:ln>
+        </p:spPr>
+        <p:style>
+          <a:lnRef idx="1">
+            <a:schemeClr val="accent1"/>
+          </a:lnRef>
+          <a:fillRef idx="0">
+            <a:schemeClr val="accent1"/>
+          </a:fillRef>
+          <a:effectRef idx="0">
+            <a:schemeClr val="accent1"/>
+          </a:effectRef>
+          <a:fontRef idx="minor">
+            <a:schemeClr val="tx1"/>
+          </a:fontRef>
+        </p:style>
+      </p:cxnSp>
+      <p:pic>
+        <p:nvPicPr>
+          <p:cNvPr id="53" name="Picture 52"/>
+          <p:cNvPicPr>
+            <a:picLocks noChangeAspect="1"/>
+          </p:cNvPicPr>
+          <p:nvPr/>
+        </p:nvPicPr>
+        <p:blipFill rotWithShape="1">
+          <a:blip r:embed="rId3" cstate="print">
+            <a:extLst>
+              <a:ext uri="{28A0092B-C50C-407E-A947-70E740481C1C}">
+                <a14:useLocalDpi xmlns:a14="http://schemas.microsoft.com/office/drawing/2010/main" val="0"/>
+              </a:ext>
+            </a:extLst>
+          </a:blip>
+          <a:srcRect l="3475" t="16402" r="5910"/>
+          <a:stretch/>
+        </p:blipFill>
+        <p:spPr>
+          <a:xfrm>
+            <a:off x="5284042" y="1347445"/>
+            <a:ext cx="1239856" cy="580341"/>
+          </a:xfrm>
+          <a:prstGeom prst="rect">
+            <a:avLst/>
+          </a:prstGeom>
+          <a:ln>
+            <a:solidFill>
+              <a:schemeClr val="tx1"/>
+            </a:solidFill>
+          </a:ln>
+        </p:spPr>
+      </p:pic>
+      <p:sp>
+        <p:nvSpPr>
+          <p:cNvPr id="54" name="TextBox 53"/>
+          <p:cNvSpPr txBox="1"/>
+          <p:nvPr/>
+        </p:nvSpPr>
+        <p:spPr>
+          <a:xfrm>
+            <a:off x="3569676" y="114300"/>
+            <a:ext cx="395654" cy="307777"/>
+          </a:xfrm>
+          <a:prstGeom prst="rect">
+            <a:avLst/>
+          </a:prstGeom>
+          <a:noFill/>
+        </p:spPr>
+        <p:txBody>
+          <a:bodyPr wrap="square" rtlCol="0">
+            <a:spAutoFit/>
+          </a:bodyPr>
+          <a:lstStyle/>
+          <a:p>
+            <a:r>
+              <a:rPr lang="en-US" sz="1400" b="1" dirty="0" smtClean="0">
+                <a:latin typeface="Arial" panose="020B0604020202020204" pitchFamily="34" charset="0"/>
+                <a:cs typeface="Arial" panose="020B0604020202020204" pitchFamily="34" charset="0"/>
+              </a:rPr>
+              <a:t>A)</a:t>
+            </a:r>
+            <a:endParaRPr lang="en-US" sz="1400" b="1" dirty="0">
+              <a:latin typeface="Arial" panose="020B0604020202020204" pitchFamily="34" charset="0"/>
+              <a:cs typeface="Arial" panose="020B0604020202020204" pitchFamily="34" charset="0"/>
+            </a:endParaRPr>
+          </a:p>
+        </p:txBody>
+      </p:sp>
+      <p:sp>
+        <p:nvSpPr>
+          <p:cNvPr id="55" name="TextBox 54"/>
+          <p:cNvSpPr txBox="1"/>
+          <p:nvPr/>
+        </p:nvSpPr>
+        <p:spPr>
+          <a:xfrm>
+            <a:off x="3569676" y="3134458"/>
+            <a:ext cx="395654" cy="307777"/>
+          </a:xfrm>
+          <a:prstGeom prst="rect">
+            <a:avLst/>
+          </a:prstGeom>
+          <a:noFill/>
+        </p:spPr>
+        <p:txBody>
+          <a:bodyPr wrap="square" rtlCol="0">
+            <a:spAutoFit/>
+          </a:bodyPr>
+          <a:lstStyle/>
+          <a:p>
+            <a:r>
+              <a:rPr lang="en-US" sz="1400" b="1" dirty="0" smtClean="0">
+                <a:latin typeface="Arial" panose="020B0604020202020204" pitchFamily="34" charset="0"/>
+                <a:cs typeface="Arial" panose="020B0604020202020204" pitchFamily="34" charset="0"/>
+              </a:rPr>
+              <a:t>B)</a:t>
+            </a:r>
+            <a:endParaRPr lang="en-US" sz="1400" b="1" dirty="0">
+              <a:latin typeface="Arial" panose="020B0604020202020204" pitchFamily="34" charset="0"/>
+              <a:cs typeface="Arial" panose="020B0604020202020204" pitchFamily="34" charset="0"/>
+            </a:endParaRPr>
+          </a:p>
+        </p:txBody>
+      </p:sp>
+    </p:spTree>
+    <p:extLst>
+      <p:ext uri="{BB962C8B-B14F-4D97-AF65-F5344CB8AC3E}">
+        <p14:creationId xmlns:p14="http://schemas.microsoft.com/office/powerpoint/2010/main" val="4029745223"/>
+      </p:ext>
+    </p:extLst>
+  </p:cSld>
+  <p:clrMapOvr>
+    <a:masterClrMapping/>
+  </p:clrMapOvr>
+</p:sld>
+</file>
+
 <file path=ppt/theme/theme1.xml><?xml version="1.0" encoding="utf-8"?>
 <a:theme xmlns:a="http://schemas.openxmlformats.org/drawingml/2006/main" name="Office Theme">
   <a:themeElements>

</xml_diff>

<commit_message>
ax histogram, add dam rate to pca
</commit_message>
<xml_diff>
--- a/Figures/piecing_together_figs.pptx
+++ b/Figures/piecing_together_figs.pptx
@@ -5747,13 +5747,6 @@
               </a:rPr>
               <a:t>4</a:t>
             </a:r>
-            <a:endParaRPr lang="en-US" sz="1600" dirty="0">
-              <a:solidFill>
-                <a:schemeClr val="tx1"/>
-              </a:solidFill>
-              <a:latin typeface="Arial" panose="020B0604020202020204" pitchFamily="34" charset="0"/>
-              <a:cs typeface="Arial" panose="020B0604020202020204" pitchFamily="34" charset="0"/>
-            </a:endParaRPr>
           </a:p>
         </p:txBody>
       </p:sp>
@@ -6050,13 +6043,6 @@
               </a:rPr>
               <a:t>6</a:t>
             </a:r>
-            <a:endParaRPr lang="en-US" sz="1600" dirty="0">
-              <a:solidFill>
-                <a:schemeClr val="tx1"/>
-              </a:solidFill>
-              <a:latin typeface="Arial" panose="020B0604020202020204" pitchFamily="34" charset="0"/>
-              <a:cs typeface="Arial" panose="020B0604020202020204" pitchFamily="34" charset="0"/>
-            </a:endParaRPr>
           </a:p>
         </p:txBody>
       </p:sp>
@@ -6149,13 +6135,6 @@
               </a:rPr>
               <a:t>7</a:t>
             </a:r>
-            <a:endParaRPr lang="en-US" sz="1600" dirty="0">
-              <a:solidFill>
-                <a:schemeClr val="tx1"/>
-              </a:solidFill>
-              <a:latin typeface="Arial" panose="020B0604020202020204" pitchFamily="34" charset="0"/>
-              <a:cs typeface="Arial" panose="020B0604020202020204" pitchFamily="34" charset="0"/>
-            </a:endParaRPr>
           </a:p>
         </p:txBody>
       </p:sp>
@@ -8014,13 +7993,6 @@
               </a:rPr>
               <a:t>4</a:t>
             </a:r>
-            <a:endParaRPr lang="en-US" sz="1600" dirty="0">
-              <a:solidFill>
-                <a:schemeClr val="tx1"/>
-              </a:solidFill>
-              <a:latin typeface="Arial" panose="020B0604020202020204" pitchFamily="34" charset="0"/>
-              <a:cs typeface="Arial" panose="020B0604020202020204" pitchFamily="34" charset="0"/>
-            </a:endParaRPr>
           </a:p>
         </p:txBody>
       </p:sp>
@@ -8317,13 +8289,6 @@
               </a:rPr>
               <a:t>6</a:t>
             </a:r>
-            <a:endParaRPr lang="en-US" sz="1600" dirty="0">
-              <a:solidFill>
-                <a:schemeClr val="tx1"/>
-              </a:solidFill>
-              <a:latin typeface="Arial" panose="020B0604020202020204" pitchFamily="34" charset="0"/>
-              <a:cs typeface="Arial" panose="020B0604020202020204" pitchFamily="34" charset="0"/>
-            </a:endParaRPr>
           </a:p>
         </p:txBody>
       </p:sp>
@@ -8416,13 +8381,6 @@
               </a:rPr>
               <a:t>7</a:t>
             </a:r>
-            <a:endParaRPr lang="en-US" sz="1600" dirty="0">
-              <a:solidFill>
-                <a:schemeClr val="tx1"/>
-              </a:solidFill>
-              <a:latin typeface="Arial" panose="020B0604020202020204" pitchFamily="34" charset="0"/>
-              <a:cs typeface="Arial" panose="020B0604020202020204" pitchFamily="34" charset="0"/>
-            </a:endParaRPr>
           </a:p>
         </p:txBody>
       </p:sp>
@@ -10097,6 +10055,114 @@
               <a:t>20</a:t>
             </a:r>
             <a:endParaRPr lang="en-US" dirty="0">
+              <a:latin typeface="Arial" panose="020B0604020202020204" pitchFamily="34" charset="0"/>
+              <a:cs typeface="Arial" panose="020B0604020202020204" pitchFamily="34" charset="0"/>
+            </a:endParaRPr>
+          </a:p>
+        </p:txBody>
+      </p:sp>
+      <p:sp>
+        <p:nvSpPr>
+          <p:cNvPr id="2" name="TextBox 1"/>
+          <p:cNvSpPr txBox="1"/>
+          <p:nvPr/>
+        </p:nvSpPr>
+        <p:spPr>
+          <a:xfrm>
+            <a:off x="4365387" y="2275742"/>
+            <a:ext cx="1222131" cy="246221"/>
+          </a:xfrm>
+          <a:prstGeom prst="rect">
+            <a:avLst/>
+          </a:prstGeom>
+          <a:noFill/>
+        </p:spPr>
+        <p:txBody>
+          <a:bodyPr wrap="square" rtlCol="0">
+            <a:spAutoFit/>
+          </a:bodyPr>
+          <a:lstStyle/>
+          <a:p>
+            <a:r>
+              <a:rPr lang="en-US" sz="1000" dirty="0" smtClean="0">
+                <a:latin typeface="Arial" panose="020B0604020202020204" pitchFamily="34" charset="0"/>
+                <a:cs typeface="Arial" panose="020B0604020202020204" pitchFamily="34" charset="0"/>
+              </a:rPr>
+              <a:t>(61%)</a:t>
+            </a:r>
+            <a:endParaRPr lang="en-US" sz="1000" dirty="0">
+              <a:latin typeface="Arial" panose="020B0604020202020204" pitchFamily="34" charset="0"/>
+              <a:cs typeface="Arial" panose="020B0604020202020204" pitchFamily="34" charset="0"/>
+            </a:endParaRPr>
+          </a:p>
+        </p:txBody>
+      </p:sp>
+      <p:sp>
+        <p:nvSpPr>
+          <p:cNvPr id="61" name="TextBox 60"/>
+          <p:cNvSpPr txBox="1"/>
+          <p:nvPr/>
+        </p:nvSpPr>
+        <p:spPr>
+          <a:xfrm>
+            <a:off x="4642354" y="2454569"/>
+            <a:ext cx="1222131" cy="246221"/>
+          </a:xfrm>
+          <a:prstGeom prst="rect">
+            <a:avLst/>
+          </a:prstGeom>
+          <a:noFill/>
+        </p:spPr>
+        <p:txBody>
+          <a:bodyPr wrap="square" rtlCol="0">
+            <a:spAutoFit/>
+          </a:bodyPr>
+          <a:lstStyle/>
+          <a:p>
+            <a:r>
+              <a:rPr lang="en-US" sz="1000" dirty="0" smtClean="0">
+                <a:latin typeface="Arial" panose="020B0604020202020204" pitchFamily="34" charset="0"/>
+                <a:cs typeface="Arial" panose="020B0604020202020204" pitchFamily="34" charset="0"/>
+              </a:rPr>
+              <a:t>(34%)</a:t>
+            </a:r>
+            <a:endParaRPr lang="en-US" sz="1000" dirty="0">
+              <a:latin typeface="Arial" panose="020B0604020202020204" pitchFamily="34" charset="0"/>
+              <a:cs typeface="Arial" panose="020B0604020202020204" pitchFamily="34" charset="0"/>
+            </a:endParaRPr>
+          </a:p>
+        </p:txBody>
+      </p:sp>
+      <p:sp>
+        <p:nvSpPr>
+          <p:cNvPr id="65" name="TextBox 64"/>
+          <p:cNvSpPr txBox="1"/>
+          <p:nvPr/>
+        </p:nvSpPr>
+        <p:spPr>
+          <a:xfrm>
+            <a:off x="4382971" y="2631910"/>
+            <a:ext cx="1222131" cy="246221"/>
+          </a:xfrm>
+          <a:prstGeom prst="rect">
+            <a:avLst/>
+          </a:prstGeom>
+          <a:noFill/>
+        </p:spPr>
+        <p:txBody>
+          <a:bodyPr wrap="square" rtlCol="0">
+            <a:spAutoFit/>
+          </a:bodyPr>
+          <a:lstStyle/>
+          <a:p>
+            <a:r>
+              <a:rPr lang="en-US" sz="1000" dirty="0" smtClean="0">
+                <a:latin typeface="Arial" panose="020B0604020202020204" pitchFamily="34" charset="0"/>
+                <a:cs typeface="Arial" panose="020B0604020202020204" pitchFamily="34" charset="0"/>
+              </a:rPr>
+              <a:t>(5%)</a:t>
+            </a:r>
+            <a:endParaRPr lang="en-US" sz="1000" dirty="0">
               <a:latin typeface="Arial" panose="020B0604020202020204" pitchFamily="34" charset="0"/>
               <a:cs typeface="Arial" panose="020B0604020202020204" pitchFamily="34" charset="0"/>
             </a:endParaRPr>

</xml_diff>

<commit_message>
updating pca output figs
</commit_message>
<xml_diff>
--- a/Figures/piecing_together_figs.pptx
+++ b/Figures/piecing_together_figs.pptx
@@ -5,7 +5,7 @@
     <p:sldMasterId id="2147483648" r:id="rId1"/>
   </p:sldMasterIdLst>
   <p:notesMasterIdLst>
-    <p:notesMasterId r:id="rId8"/>
+    <p:notesMasterId r:id="rId10"/>
   </p:notesMasterIdLst>
   <p:sldIdLst>
     <p:sldId id="256" r:id="rId2"/>
@@ -14,6 +14,8 @@
     <p:sldId id="259" r:id="rId5"/>
     <p:sldId id="260" r:id="rId6"/>
     <p:sldId id="261" r:id="rId7"/>
+    <p:sldId id="262" r:id="rId8"/>
+    <p:sldId id="263" r:id="rId9"/>
   </p:sldIdLst>
   <p:sldSz cx="12192000" cy="6858000"/>
   <p:notesSz cx="6858000" cy="9144000"/>
@@ -202,7 +204,7 @@
           <a:p>
             <a:fld id="{E21A01C1-7195-4936-AB8D-A0C52A614CAA}" type="datetimeFigureOut">
               <a:rPr lang="en-US" smtClean="0"/>
-              <a:t>6/4/2021</a:t>
+              <a:t>6/7/2021</a:t>
             </a:fld>
             <a:endParaRPr lang="en-US"/>
           </a:p>
@@ -516,7 +518,15 @@
           <a:p>
             <a:r>
               <a:rPr lang="en-US" dirty="0" smtClean="0"/>
-              <a:t>WITH DAM RATE</a:t>
+              <a:t>WITH DAM </a:t>
+            </a:r>
+            <a:r>
+              <a:rPr lang="en-US" dirty="0" smtClean="0"/>
+              <a:t>RATE – wonky</a:t>
+            </a:r>
+            <a:r>
+              <a:rPr lang="en-US" baseline="0" dirty="0" smtClean="0"/>
+              <a:t> results</a:t>
             </a:r>
             <a:endParaRPr lang="en-US" dirty="0"/>
           </a:p>
@@ -604,7 +614,11 @@
           <a:p>
             <a:r>
               <a:rPr lang="en-US" dirty="0" smtClean="0"/>
-              <a:t>WITH DAM RATE</a:t>
+              <a:t>WITH DAM RATE – wonky</a:t>
+            </a:r>
+            <a:r>
+              <a:rPr lang="en-US" baseline="0" dirty="0" smtClean="0"/>
+              <a:t> results</a:t>
             </a:r>
             <a:endParaRPr lang="en-US" dirty="0"/>
           </a:p>
@@ -637,6 +651,198 @@
     <p:extLst>
       <p:ext uri="{BB962C8B-B14F-4D97-AF65-F5344CB8AC3E}">
         <p14:creationId xmlns:p14="http://schemas.microsoft.com/office/powerpoint/2010/main" val="3464375201"/>
+      </p:ext>
+    </p:extLst>
+  </p:cSld>
+  <p:clrMapOvr>
+    <a:masterClrMapping/>
+  </p:clrMapOvr>
+</p:notes>
+</file>
+
+<file path=ppt/notesSlides/notesSlide3.xml><?xml version="1.0" encoding="utf-8"?>
+<p:notes xmlns:a="http://schemas.openxmlformats.org/drawingml/2006/main" xmlns:r="http://schemas.openxmlformats.org/officeDocument/2006/relationships" xmlns:p="http://schemas.openxmlformats.org/presentationml/2006/main">
+  <p:cSld>
+    <p:spTree>
+      <p:nvGrpSpPr>
+        <p:cNvPr id="1" name=""/>
+        <p:cNvGrpSpPr/>
+        <p:nvPr/>
+      </p:nvGrpSpPr>
+      <p:grpSpPr>
+        <a:xfrm>
+          <a:off x="0" y="0"/>
+          <a:ext cx="0" cy="0"/>
+          <a:chOff x="0" y="0"/>
+          <a:chExt cx="0" cy="0"/>
+        </a:xfrm>
+      </p:grpSpPr>
+      <p:sp>
+        <p:nvSpPr>
+          <p:cNvPr id="2" name="Slide Image Placeholder 1"/>
+          <p:cNvSpPr>
+            <a:spLocks noGrp="1" noRot="1" noChangeAspect="1"/>
+          </p:cNvSpPr>
+          <p:nvPr>
+            <p:ph type="sldImg"/>
+          </p:nvPr>
+        </p:nvSpPr>
+        <p:spPr/>
+      </p:sp>
+      <p:sp>
+        <p:nvSpPr>
+          <p:cNvPr id="3" name="Notes Placeholder 2"/>
+          <p:cNvSpPr>
+            <a:spLocks noGrp="1"/>
+          </p:cNvSpPr>
+          <p:nvPr>
+            <p:ph type="body" idx="1"/>
+          </p:nvPr>
+        </p:nvSpPr>
+        <p:spPr/>
+        <p:txBody>
+          <a:bodyPr/>
+          <a:lstStyle/>
+          <a:p>
+            <a:r>
+              <a:rPr lang="en-US" dirty="0" smtClean="0"/>
+              <a:t>With dam rate and </a:t>
+            </a:r>
+            <a:r>
+              <a:rPr lang="en-US" dirty="0" err="1" smtClean="0"/>
+              <a:t>maxkmNS</a:t>
+            </a:r>
+            <a:r>
+              <a:rPr lang="en-US" baseline="0" dirty="0" smtClean="0"/>
+              <a:t> and 2 pcs</a:t>
+            </a:r>
+            <a:endParaRPr lang="en-US" dirty="0"/>
+          </a:p>
+        </p:txBody>
+      </p:sp>
+      <p:sp>
+        <p:nvSpPr>
+          <p:cNvPr id="4" name="Slide Number Placeholder 3"/>
+          <p:cNvSpPr>
+            <a:spLocks noGrp="1"/>
+          </p:cNvSpPr>
+          <p:nvPr>
+            <p:ph type="sldNum" sz="quarter" idx="10"/>
+          </p:nvPr>
+        </p:nvSpPr>
+        <p:spPr/>
+        <p:txBody>
+          <a:bodyPr/>
+          <a:lstStyle/>
+          <a:p>
+            <a:fld id="{EFDBF8D5-4350-463B-A2B4-1E2606131506}" type="slidenum">
+              <a:rPr lang="en-US" smtClean="0"/>
+              <a:t>7</a:t>
+            </a:fld>
+            <a:endParaRPr lang="en-US"/>
+          </a:p>
+        </p:txBody>
+      </p:sp>
+    </p:spTree>
+    <p:extLst>
+      <p:ext uri="{BB962C8B-B14F-4D97-AF65-F5344CB8AC3E}">
+        <p14:creationId xmlns:p14="http://schemas.microsoft.com/office/powerpoint/2010/main" val="3324086059"/>
+      </p:ext>
+    </p:extLst>
+  </p:cSld>
+  <p:clrMapOvr>
+    <a:masterClrMapping/>
+  </p:clrMapOvr>
+</p:notes>
+</file>
+
+<file path=ppt/notesSlides/notesSlide4.xml><?xml version="1.0" encoding="utf-8"?>
+<p:notes xmlns:a="http://schemas.openxmlformats.org/drawingml/2006/main" xmlns:r="http://schemas.openxmlformats.org/officeDocument/2006/relationships" xmlns:p="http://schemas.openxmlformats.org/presentationml/2006/main">
+  <p:cSld>
+    <p:spTree>
+      <p:nvGrpSpPr>
+        <p:cNvPr id="1" name=""/>
+        <p:cNvGrpSpPr/>
+        <p:nvPr/>
+      </p:nvGrpSpPr>
+      <p:grpSpPr>
+        <a:xfrm>
+          <a:off x="0" y="0"/>
+          <a:ext cx="0" cy="0"/>
+          <a:chOff x="0" y="0"/>
+          <a:chExt cx="0" cy="0"/>
+        </a:xfrm>
+      </p:grpSpPr>
+      <p:sp>
+        <p:nvSpPr>
+          <p:cNvPr id="2" name="Slide Image Placeholder 1"/>
+          <p:cNvSpPr>
+            <a:spLocks noGrp="1" noRot="1" noChangeAspect="1"/>
+          </p:cNvSpPr>
+          <p:nvPr>
+            <p:ph type="sldImg"/>
+          </p:nvPr>
+        </p:nvSpPr>
+        <p:spPr/>
+      </p:sp>
+      <p:sp>
+        <p:nvSpPr>
+          <p:cNvPr id="3" name="Notes Placeholder 2"/>
+          <p:cNvSpPr>
+            <a:spLocks noGrp="1"/>
+          </p:cNvSpPr>
+          <p:nvPr>
+            <p:ph type="body" idx="1"/>
+          </p:nvPr>
+        </p:nvSpPr>
+        <p:spPr/>
+        <p:txBody>
+          <a:bodyPr/>
+          <a:lstStyle/>
+          <a:p>
+            <a:r>
+              <a:rPr lang="en-US" dirty="0" smtClean="0"/>
+              <a:t>With dam rate and </a:t>
+            </a:r>
+            <a:r>
+              <a:rPr lang="en-US" dirty="0" err="1" smtClean="0"/>
+              <a:t>maxkmNS</a:t>
+            </a:r>
+            <a:r>
+              <a:rPr lang="en-US" baseline="0" smtClean="0"/>
+              <a:t> and 2 pcs</a:t>
+            </a:r>
+            <a:endParaRPr lang="en-US"/>
+          </a:p>
+        </p:txBody>
+      </p:sp>
+      <p:sp>
+        <p:nvSpPr>
+          <p:cNvPr id="4" name="Slide Number Placeholder 3"/>
+          <p:cNvSpPr>
+            <a:spLocks noGrp="1"/>
+          </p:cNvSpPr>
+          <p:nvPr>
+            <p:ph type="sldNum" sz="quarter" idx="10"/>
+          </p:nvPr>
+        </p:nvSpPr>
+        <p:spPr/>
+        <p:txBody>
+          <a:bodyPr/>
+          <a:lstStyle/>
+          <a:p>
+            <a:fld id="{EFDBF8D5-4350-463B-A2B4-1E2606131506}" type="slidenum">
+              <a:rPr lang="en-US" smtClean="0"/>
+              <a:t>8</a:t>
+            </a:fld>
+            <a:endParaRPr lang="en-US"/>
+          </a:p>
+        </p:txBody>
+      </p:sp>
+    </p:spTree>
+    <p:extLst>
+      <p:ext uri="{BB962C8B-B14F-4D97-AF65-F5344CB8AC3E}">
+        <p14:creationId xmlns:p14="http://schemas.microsoft.com/office/powerpoint/2010/main" val="2174517086"/>
       </p:ext>
     </p:extLst>
   </p:cSld>
@@ -777,7 +983,7 @@
           <a:p>
             <a:fld id="{24F71ACE-7A2E-44C7-BEB0-E2DBFE9F86D8}" type="datetimeFigureOut">
               <a:rPr lang="en-US" smtClean="0"/>
-              <a:t>6/4/2021</a:t>
+              <a:t>6/7/2021</a:t>
             </a:fld>
             <a:endParaRPr lang="en-US"/>
           </a:p>
@@ -947,7 +1153,7 @@
           <a:p>
             <a:fld id="{24F71ACE-7A2E-44C7-BEB0-E2DBFE9F86D8}" type="datetimeFigureOut">
               <a:rPr lang="en-US" smtClean="0"/>
-              <a:t>6/4/2021</a:t>
+              <a:t>6/7/2021</a:t>
             </a:fld>
             <a:endParaRPr lang="en-US"/>
           </a:p>
@@ -1127,7 +1333,7 @@
           <a:p>
             <a:fld id="{24F71ACE-7A2E-44C7-BEB0-E2DBFE9F86D8}" type="datetimeFigureOut">
               <a:rPr lang="en-US" smtClean="0"/>
-              <a:t>6/4/2021</a:t>
+              <a:t>6/7/2021</a:t>
             </a:fld>
             <a:endParaRPr lang="en-US"/>
           </a:p>
@@ -1297,7 +1503,7 @@
           <a:p>
             <a:fld id="{24F71ACE-7A2E-44C7-BEB0-E2DBFE9F86D8}" type="datetimeFigureOut">
               <a:rPr lang="en-US" smtClean="0"/>
-              <a:t>6/4/2021</a:t>
+              <a:t>6/7/2021</a:t>
             </a:fld>
             <a:endParaRPr lang="en-US"/>
           </a:p>
@@ -1543,7 +1749,7 @@
           <a:p>
             <a:fld id="{24F71ACE-7A2E-44C7-BEB0-E2DBFE9F86D8}" type="datetimeFigureOut">
               <a:rPr lang="en-US" smtClean="0"/>
-              <a:t>6/4/2021</a:t>
+              <a:t>6/7/2021</a:t>
             </a:fld>
             <a:endParaRPr lang="en-US"/>
           </a:p>
@@ -1775,7 +1981,7 @@
           <a:p>
             <a:fld id="{24F71ACE-7A2E-44C7-BEB0-E2DBFE9F86D8}" type="datetimeFigureOut">
               <a:rPr lang="en-US" smtClean="0"/>
-              <a:t>6/4/2021</a:t>
+              <a:t>6/7/2021</a:t>
             </a:fld>
             <a:endParaRPr lang="en-US"/>
           </a:p>
@@ -2142,7 +2348,7 @@
           <a:p>
             <a:fld id="{24F71ACE-7A2E-44C7-BEB0-E2DBFE9F86D8}" type="datetimeFigureOut">
               <a:rPr lang="en-US" smtClean="0"/>
-              <a:t>6/4/2021</a:t>
+              <a:t>6/7/2021</a:t>
             </a:fld>
             <a:endParaRPr lang="en-US"/>
           </a:p>
@@ -2260,7 +2466,7 @@
           <a:p>
             <a:fld id="{24F71ACE-7A2E-44C7-BEB0-E2DBFE9F86D8}" type="datetimeFigureOut">
               <a:rPr lang="en-US" smtClean="0"/>
-              <a:t>6/4/2021</a:t>
+              <a:t>6/7/2021</a:t>
             </a:fld>
             <a:endParaRPr lang="en-US"/>
           </a:p>
@@ -2355,7 +2561,7 @@
           <a:p>
             <a:fld id="{24F71ACE-7A2E-44C7-BEB0-E2DBFE9F86D8}" type="datetimeFigureOut">
               <a:rPr lang="en-US" smtClean="0"/>
-              <a:t>6/4/2021</a:t>
+              <a:t>6/7/2021</a:t>
             </a:fld>
             <a:endParaRPr lang="en-US"/>
           </a:p>
@@ -2632,7 +2838,7 @@
           <a:p>
             <a:fld id="{24F71ACE-7A2E-44C7-BEB0-E2DBFE9F86D8}" type="datetimeFigureOut">
               <a:rPr lang="en-US" smtClean="0"/>
-              <a:t>6/4/2021</a:t>
+              <a:t>6/7/2021</a:t>
             </a:fld>
             <a:endParaRPr lang="en-US"/>
           </a:p>
@@ -2885,7 +3091,7 @@
           <a:p>
             <a:fld id="{24F71ACE-7A2E-44C7-BEB0-E2DBFE9F86D8}" type="datetimeFigureOut">
               <a:rPr lang="en-US" smtClean="0"/>
-              <a:t>6/4/2021</a:t>
+              <a:t>6/7/2021</a:t>
             </a:fld>
             <a:endParaRPr lang="en-US"/>
           </a:p>
@@ -3098,7 +3304,7 @@
           <a:p>
             <a:fld id="{24F71ACE-7A2E-44C7-BEB0-E2DBFE9F86D8}" type="datetimeFigureOut">
               <a:rPr lang="en-US" smtClean="0"/>
-              <a:t>6/4/2021</a:t>
+              <a:t>6/7/2021</a:t>
             </a:fld>
             <a:endParaRPr lang="en-US"/>
           </a:p>
@@ -10173,6 +10379,4276 @@
     <p:extLst>
       <p:ext uri="{BB962C8B-B14F-4D97-AF65-F5344CB8AC3E}">
         <p14:creationId xmlns:p14="http://schemas.microsoft.com/office/powerpoint/2010/main" val="3930363686"/>
+      </p:ext>
+    </p:extLst>
+  </p:cSld>
+  <p:clrMapOvr>
+    <a:masterClrMapping/>
+  </p:clrMapOvr>
+</p:sld>
+</file>
+
+<file path=ppt/slides/slide7.xml><?xml version="1.0" encoding="utf-8"?>
+<p:sld xmlns:a="http://schemas.openxmlformats.org/drawingml/2006/main" xmlns:r="http://schemas.openxmlformats.org/officeDocument/2006/relationships" xmlns:p="http://schemas.openxmlformats.org/presentationml/2006/main">
+  <p:cSld>
+    <p:spTree>
+      <p:nvGrpSpPr>
+        <p:cNvPr id="1" name=""/>
+        <p:cNvGrpSpPr/>
+        <p:nvPr/>
+      </p:nvGrpSpPr>
+      <p:grpSpPr>
+        <a:xfrm>
+          <a:off x="0" y="0"/>
+          <a:ext cx="0" cy="0"/>
+          <a:chOff x="0" y="0"/>
+          <a:chExt cx="0" cy="0"/>
+        </a:xfrm>
+      </p:grpSpPr>
+      <p:pic>
+        <p:nvPicPr>
+          <p:cNvPr id="58" name="Picture 57"/>
+          <p:cNvPicPr>
+            <a:picLocks noChangeAspect="1"/>
+          </p:cNvPicPr>
+          <p:nvPr/>
+        </p:nvPicPr>
+        <p:blipFill>
+          <a:blip r:embed="rId3" cstate="print">
+            <a:extLst>
+              <a:ext uri="{28A0092B-C50C-407E-A947-70E740481C1C}">
+                <a14:useLocalDpi xmlns:a14="http://schemas.microsoft.com/office/drawing/2010/main" val="0"/>
+              </a:ext>
+            </a:extLst>
+          </a:blip>
+          <a:stretch>
+            <a:fillRect/>
+          </a:stretch>
+        </p:blipFill>
+        <p:spPr>
+          <a:xfrm>
+            <a:off x="3446318" y="0"/>
+            <a:ext cx="5299364" cy="6858000"/>
+          </a:xfrm>
+          <a:prstGeom prst="rect">
+            <a:avLst/>
+          </a:prstGeom>
+        </p:spPr>
+      </p:pic>
+      <p:sp>
+        <p:nvSpPr>
+          <p:cNvPr id="6" name="Oval 5"/>
+          <p:cNvSpPr/>
+          <p:nvPr/>
+        </p:nvSpPr>
+        <p:spPr>
+          <a:xfrm>
+            <a:off x="4901561" y="3997562"/>
+            <a:ext cx="228600" cy="228600"/>
+          </a:xfrm>
+          <a:prstGeom prst="ellipse">
+            <a:avLst/>
+          </a:prstGeom>
+          <a:solidFill>
+            <a:schemeClr val="bg1"/>
+          </a:solidFill>
+          <a:ln>
+            <a:solidFill>
+              <a:schemeClr val="tx1"/>
+            </a:solidFill>
+          </a:ln>
+        </p:spPr>
+        <p:style>
+          <a:lnRef idx="2">
+            <a:schemeClr val="accent1">
+              <a:shade val="50000"/>
+            </a:schemeClr>
+          </a:lnRef>
+          <a:fillRef idx="1">
+            <a:schemeClr val="accent1"/>
+          </a:fillRef>
+          <a:effectRef idx="0">
+            <a:schemeClr val="accent1"/>
+          </a:effectRef>
+          <a:fontRef idx="minor">
+            <a:schemeClr val="lt1"/>
+          </a:fontRef>
+        </p:style>
+        <p:txBody>
+          <a:bodyPr rtlCol="0" anchor="ctr"/>
+          <a:lstStyle/>
+          <a:p>
+            <a:pPr algn="ctr"/>
+            <a:r>
+              <a:rPr lang="en-US" sz="1600" dirty="0" smtClean="0">
+                <a:solidFill>
+                  <a:schemeClr val="tx1"/>
+                </a:solidFill>
+                <a:latin typeface="Arial" panose="020B0604020202020204" pitchFamily="34" charset="0"/>
+                <a:cs typeface="Arial" panose="020B0604020202020204" pitchFamily="34" charset="0"/>
+              </a:rPr>
+              <a:t>1</a:t>
+            </a:r>
+            <a:endParaRPr lang="en-US" sz="1600" dirty="0">
+              <a:solidFill>
+                <a:schemeClr val="tx1"/>
+              </a:solidFill>
+              <a:latin typeface="Arial" panose="020B0604020202020204" pitchFamily="34" charset="0"/>
+              <a:cs typeface="Arial" panose="020B0604020202020204" pitchFamily="34" charset="0"/>
+            </a:endParaRPr>
+          </a:p>
+        </p:txBody>
+      </p:sp>
+      <p:sp>
+        <p:nvSpPr>
+          <p:cNvPr id="9" name="Oval 8"/>
+          <p:cNvSpPr/>
+          <p:nvPr/>
+        </p:nvSpPr>
+        <p:spPr>
+          <a:xfrm>
+            <a:off x="7663966" y="4621808"/>
+            <a:ext cx="228600" cy="228600"/>
+          </a:xfrm>
+          <a:prstGeom prst="ellipse">
+            <a:avLst/>
+          </a:prstGeom>
+          <a:solidFill>
+            <a:schemeClr val="bg1"/>
+          </a:solidFill>
+          <a:ln>
+            <a:solidFill>
+              <a:schemeClr val="tx1"/>
+            </a:solidFill>
+          </a:ln>
+        </p:spPr>
+        <p:style>
+          <a:lnRef idx="2">
+            <a:schemeClr val="accent1">
+              <a:shade val="50000"/>
+            </a:schemeClr>
+          </a:lnRef>
+          <a:fillRef idx="1">
+            <a:schemeClr val="accent1"/>
+          </a:fillRef>
+          <a:effectRef idx="0">
+            <a:schemeClr val="accent1"/>
+          </a:effectRef>
+          <a:fontRef idx="minor">
+            <a:schemeClr val="lt1"/>
+          </a:fontRef>
+        </p:style>
+        <p:txBody>
+          <a:bodyPr rtlCol="0" anchor="ctr"/>
+          <a:lstStyle/>
+          <a:p>
+            <a:pPr algn="ctr"/>
+            <a:endParaRPr lang="en-US" sz="1600" dirty="0">
+              <a:solidFill>
+                <a:schemeClr val="tx1"/>
+              </a:solidFill>
+              <a:latin typeface="Arial" panose="020B0604020202020204" pitchFamily="34" charset="0"/>
+              <a:cs typeface="Arial" panose="020B0604020202020204" pitchFamily="34" charset="0"/>
+            </a:endParaRPr>
+          </a:p>
+        </p:txBody>
+      </p:sp>
+      <p:cxnSp>
+        <p:nvCxnSpPr>
+          <p:cNvPr id="10" name="Straight Connector 9"/>
+          <p:cNvCxnSpPr>
+            <a:stCxn id="9" idx="2"/>
+          </p:cNvCxnSpPr>
+          <p:nvPr/>
+        </p:nvCxnSpPr>
+        <p:spPr>
+          <a:xfrm flipH="1" flipV="1">
+            <a:off x="7280031" y="4617406"/>
+            <a:ext cx="383935" cy="118702"/>
+          </a:xfrm>
+          <a:prstGeom prst="line">
+            <a:avLst/>
+          </a:prstGeom>
+          <a:ln w="28575">
+            <a:solidFill>
+              <a:schemeClr val="tx1"/>
+            </a:solidFill>
+          </a:ln>
+        </p:spPr>
+        <p:style>
+          <a:lnRef idx="1">
+            <a:schemeClr val="accent1"/>
+          </a:lnRef>
+          <a:fillRef idx="0">
+            <a:schemeClr val="accent1"/>
+          </a:fillRef>
+          <a:effectRef idx="0">
+            <a:schemeClr val="accent1"/>
+          </a:effectRef>
+          <a:fontRef idx="minor">
+            <a:schemeClr val="tx1"/>
+          </a:fontRef>
+        </p:style>
+      </p:cxnSp>
+      <p:sp>
+        <p:nvSpPr>
+          <p:cNvPr id="11" name="Oval 10"/>
+          <p:cNvSpPr/>
+          <p:nvPr/>
+        </p:nvSpPr>
+        <p:spPr>
+          <a:xfrm>
+            <a:off x="7488116" y="5105386"/>
+            <a:ext cx="228600" cy="228600"/>
+          </a:xfrm>
+          <a:prstGeom prst="ellipse">
+            <a:avLst/>
+          </a:prstGeom>
+          <a:solidFill>
+            <a:schemeClr val="bg1"/>
+          </a:solidFill>
+          <a:ln>
+            <a:solidFill>
+              <a:schemeClr val="tx1"/>
+            </a:solidFill>
+          </a:ln>
+        </p:spPr>
+        <p:style>
+          <a:lnRef idx="2">
+            <a:schemeClr val="accent1">
+              <a:shade val="50000"/>
+            </a:schemeClr>
+          </a:lnRef>
+          <a:fillRef idx="1">
+            <a:schemeClr val="accent1"/>
+          </a:fillRef>
+          <a:effectRef idx="0">
+            <a:schemeClr val="accent1"/>
+          </a:effectRef>
+          <a:fontRef idx="minor">
+            <a:schemeClr val="lt1"/>
+          </a:fontRef>
+        </p:style>
+        <p:txBody>
+          <a:bodyPr rtlCol="0" anchor="ctr"/>
+          <a:lstStyle/>
+          <a:p>
+            <a:pPr algn="ctr"/>
+            <a:r>
+              <a:rPr lang="en-US" sz="1600" dirty="0" smtClean="0">
+                <a:solidFill>
+                  <a:schemeClr val="tx1"/>
+                </a:solidFill>
+                <a:latin typeface="Arial" panose="020B0604020202020204" pitchFamily="34" charset="0"/>
+                <a:cs typeface="Arial" panose="020B0604020202020204" pitchFamily="34" charset="0"/>
+              </a:rPr>
+              <a:t>3</a:t>
+            </a:r>
+            <a:endParaRPr lang="en-US" sz="1600" dirty="0">
+              <a:solidFill>
+                <a:schemeClr val="tx1"/>
+              </a:solidFill>
+              <a:latin typeface="Arial" panose="020B0604020202020204" pitchFamily="34" charset="0"/>
+              <a:cs typeface="Arial" panose="020B0604020202020204" pitchFamily="34" charset="0"/>
+            </a:endParaRPr>
+          </a:p>
+        </p:txBody>
+      </p:sp>
+      <p:cxnSp>
+        <p:nvCxnSpPr>
+          <p:cNvPr id="12" name="Straight Connector 11"/>
+          <p:cNvCxnSpPr>
+            <a:stCxn id="11" idx="2"/>
+          </p:cNvCxnSpPr>
+          <p:nvPr/>
+        </p:nvCxnSpPr>
+        <p:spPr>
+          <a:xfrm flipH="1" flipV="1">
+            <a:off x="7139349" y="5105386"/>
+            <a:ext cx="348767" cy="114300"/>
+          </a:xfrm>
+          <a:prstGeom prst="line">
+            <a:avLst/>
+          </a:prstGeom>
+          <a:ln w="28575">
+            <a:solidFill>
+              <a:schemeClr val="tx1"/>
+            </a:solidFill>
+          </a:ln>
+        </p:spPr>
+        <p:style>
+          <a:lnRef idx="1">
+            <a:schemeClr val="accent1"/>
+          </a:lnRef>
+          <a:fillRef idx="0">
+            <a:schemeClr val="accent1"/>
+          </a:fillRef>
+          <a:effectRef idx="0">
+            <a:schemeClr val="accent1"/>
+          </a:effectRef>
+          <a:fontRef idx="minor">
+            <a:schemeClr val="tx1"/>
+          </a:fontRef>
+        </p:style>
+      </p:cxnSp>
+      <p:sp>
+        <p:nvSpPr>
+          <p:cNvPr id="13" name="Oval 12"/>
+          <p:cNvSpPr/>
+          <p:nvPr/>
+        </p:nvSpPr>
+        <p:spPr>
+          <a:xfrm>
+            <a:off x="6353912" y="5650512"/>
+            <a:ext cx="228600" cy="228600"/>
+          </a:xfrm>
+          <a:prstGeom prst="ellipse">
+            <a:avLst/>
+          </a:prstGeom>
+          <a:solidFill>
+            <a:schemeClr val="bg1"/>
+          </a:solidFill>
+          <a:ln>
+            <a:solidFill>
+              <a:schemeClr val="tx1"/>
+            </a:solidFill>
+          </a:ln>
+        </p:spPr>
+        <p:style>
+          <a:lnRef idx="2">
+            <a:schemeClr val="accent1">
+              <a:shade val="50000"/>
+            </a:schemeClr>
+          </a:lnRef>
+          <a:fillRef idx="1">
+            <a:schemeClr val="accent1"/>
+          </a:fillRef>
+          <a:effectRef idx="0">
+            <a:schemeClr val="accent1"/>
+          </a:effectRef>
+          <a:fontRef idx="minor">
+            <a:schemeClr val="lt1"/>
+          </a:fontRef>
+        </p:style>
+        <p:txBody>
+          <a:bodyPr rtlCol="0" anchor="ctr"/>
+          <a:lstStyle/>
+          <a:p>
+            <a:pPr algn="ctr"/>
+            <a:r>
+              <a:rPr lang="en-US" sz="1600" dirty="0">
+                <a:solidFill>
+                  <a:schemeClr val="tx1"/>
+                </a:solidFill>
+                <a:latin typeface="Arial" panose="020B0604020202020204" pitchFamily="34" charset="0"/>
+                <a:cs typeface="Arial" panose="020B0604020202020204" pitchFamily="34" charset="0"/>
+              </a:rPr>
+              <a:t>5</a:t>
+            </a:r>
+            <a:endParaRPr lang="en-US" sz="1600" dirty="0">
+              <a:solidFill>
+                <a:schemeClr val="tx1"/>
+              </a:solidFill>
+              <a:latin typeface="Arial" panose="020B0604020202020204" pitchFamily="34" charset="0"/>
+              <a:cs typeface="Arial" panose="020B0604020202020204" pitchFamily="34" charset="0"/>
+            </a:endParaRPr>
+          </a:p>
+        </p:txBody>
+      </p:sp>
+      <p:cxnSp>
+        <p:nvCxnSpPr>
+          <p:cNvPr id="14" name="Straight Connector 13"/>
+          <p:cNvCxnSpPr/>
+          <p:nvPr/>
+        </p:nvCxnSpPr>
+        <p:spPr>
+          <a:xfrm flipV="1">
+            <a:off x="6450624" y="5219686"/>
+            <a:ext cx="131888" cy="430830"/>
+          </a:xfrm>
+          <a:prstGeom prst="line">
+            <a:avLst/>
+          </a:prstGeom>
+          <a:ln w="28575">
+            <a:solidFill>
+              <a:schemeClr val="tx1"/>
+            </a:solidFill>
+          </a:ln>
+        </p:spPr>
+        <p:style>
+          <a:lnRef idx="1">
+            <a:schemeClr val="accent1"/>
+          </a:lnRef>
+          <a:fillRef idx="0">
+            <a:schemeClr val="accent1"/>
+          </a:fillRef>
+          <a:effectRef idx="0">
+            <a:schemeClr val="accent1"/>
+          </a:effectRef>
+          <a:fontRef idx="minor">
+            <a:schemeClr val="tx1"/>
+          </a:fontRef>
+        </p:style>
+      </p:cxnSp>
+      <p:sp>
+        <p:nvSpPr>
+          <p:cNvPr id="15" name="Oval 14"/>
+          <p:cNvSpPr/>
+          <p:nvPr/>
+        </p:nvSpPr>
+        <p:spPr>
+          <a:xfrm>
+            <a:off x="7681552" y="3883262"/>
+            <a:ext cx="228600" cy="228600"/>
+          </a:xfrm>
+          <a:prstGeom prst="ellipse">
+            <a:avLst/>
+          </a:prstGeom>
+          <a:solidFill>
+            <a:schemeClr val="bg1"/>
+          </a:solidFill>
+          <a:ln>
+            <a:solidFill>
+              <a:schemeClr val="tx1"/>
+            </a:solidFill>
+          </a:ln>
+        </p:spPr>
+        <p:style>
+          <a:lnRef idx="2">
+            <a:schemeClr val="accent1">
+              <a:shade val="50000"/>
+            </a:schemeClr>
+          </a:lnRef>
+          <a:fillRef idx="1">
+            <a:schemeClr val="accent1"/>
+          </a:fillRef>
+          <a:effectRef idx="0">
+            <a:schemeClr val="accent1"/>
+          </a:effectRef>
+          <a:fontRef idx="minor">
+            <a:schemeClr val="lt1"/>
+          </a:fontRef>
+        </p:style>
+        <p:txBody>
+          <a:bodyPr rtlCol="0" anchor="ctr"/>
+          <a:lstStyle/>
+          <a:p>
+            <a:pPr algn="ctr"/>
+            <a:r>
+              <a:rPr lang="en-US" sz="1600" dirty="0" smtClean="0">
+                <a:solidFill>
+                  <a:schemeClr val="tx1"/>
+                </a:solidFill>
+                <a:latin typeface="Arial" panose="020B0604020202020204" pitchFamily="34" charset="0"/>
+                <a:cs typeface="Arial" panose="020B0604020202020204" pitchFamily="34" charset="0"/>
+              </a:rPr>
+              <a:t>6</a:t>
+            </a:r>
+            <a:endParaRPr lang="en-US" sz="1600" dirty="0">
+              <a:solidFill>
+                <a:schemeClr val="tx1"/>
+              </a:solidFill>
+              <a:latin typeface="Arial" panose="020B0604020202020204" pitchFamily="34" charset="0"/>
+              <a:cs typeface="Arial" panose="020B0604020202020204" pitchFamily="34" charset="0"/>
+            </a:endParaRPr>
+          </a:p>
+        </p:txBody>
+      </p:sp>
+      <p:cxnSp>
+        <p:nvCxnSpPr>
+          <p:cNvPr id="16" name="Straight Connector 15"/>
+          <p:cNvCxnSpPr>
+            <a:stCxn id="15" idx="2"/>
+          </p:cNvCxnSpPr>
+          <p:nvPr/>
+        </p:nvCxnSpPr>
+        <p:spPr>
+          <a:xfrm flipH="1">
+            <a:off x="7447082" y="3997562"/>
+            <a:ext cx="234470" cy="45064"/>
+          </a:xfrm>
+          <a:prstGeom prst="line">
+            <a:avLst/>
+          </a:prstGeom>
+          <a:ln w="28575">
+            <a:solidFill>
+              <a:schemeClr val="tx1"/>
+            </a:solidFill>
+          </a:ln>
+        </p:spPr>
+        <p:style>
+          <a:lnRef idx="1">
+            <a:schemeClr val="accent1"/>
+          </a:lnRef>
+          <a:fillRef idx="0">
+            <a:schemeClr val="accent1"/>
+          </a:fillRef>
+          <a:effectRef idx="0">
+            <a:schemeClr val="accent1"/>
+          </a:effectRef>
+          <a:fontRef idx="minor">
+            <a:schemeClr val="tx1"/>
+          </a:fontRef>
+        </p:style>
+      </p:cxnSp>
+      <p:sp>
+        <p:nvSpPr>
+          <p:cNvPr id="17" name="Oval 16"/>
+          <p:cNvSpPr/>
+          <p:nvPr/>
+        </p:nvSpPr>
+        <p:spPr>
+          <a:xfrm>
+            <a:off x="4700960" y="3452436"/>
+            <a:ext cx="228600" cy="228600"/>
+          </a:xfrm>
+          <a:prstGeom prst="ellipse">
+            <a:avLst/>
+          </a:prstGeom>
+          <a:solidFill>
+            <a:schemeClr val="bg1"/>
+          </a:solidFill>
+          <a:ln>
+            <a:solidFill>
+              <a:schemeClr val="tx1"/>
+            </a:solidFill>
+          </a:ln>
+        </p:spPr>
+        <p:style>
+          <a:lnRef idx="2">
+            <a:schemeClr val="accent1">
+              <a:shade val="50000"/>
+            </a:schemeClr>
+          </a:lnRef>
+          <a:fillRef idx="1">
+            <a:schemeClr val="accent1"/>
+          </a:fillRef>
+          <a:effectRef idx="0">
+            <a:schemeClr val="accent1"/>
+          </a:effectRef>
+          <a:fontRef idx="minor">
+            <a:schemeClr val="lt1"/>
+          </a:fontRef>
+        </p:style>
+        <p:txBody>
+          <a:bodyPr rtlCol="0" anchor="ctr"/>
+          <a:lstStyle/>
+          <a:p>
+            <a:pPr algn="ctr"/>
+            <a:r>
+              <a:rPr lang="en-US" sz="1600" dirty="0">
+                <a:solidFill>
+                  <a:schemeClr val="tx1"/>
+                </a:solidFill>
+                <a:latin typeface="Arial" panose="020B0604020202020204" pitchFamily="34" charset="0"/>
+                <a:cs typeface="Arial" panose="020B0604020202020204" pitchFamily="34" charset="0"/>
+              </a:rPr>
+              <a:t>2</a:t>
+            </a:r>
+            <a:endParaRPr lang="en-US" sz="1600" dirty="0">
+              <a:solidFill>
+                <a:schemeClr val="tx1"/>
+              </a:solidFill>
+              <a:latin typeface="Arial" panose="020B0604020202020204" pitchFamily="34" charset="0"/>
+              <a:cs typeface="Arial" panose="020B0604020202020204" pitchFamily="34" charset="0"/>
+            </a:endParaRPr>
+          </a:p>
+        </p:txBody>
+      </p:sp>
+      <p:sp>
+        <p:nvSpPr>
+          <p:cNvPr id="18" name="Oval 17"/>
+          <p:cNvSpPr/>
+          <p:nvPr/>
+        </p:nvSpPr>
+        <p:spPr>
+          <a:xfrm>
+            <a:off x="6629401" y="5732576"/>
+            <a:ext cx="228600" cy="228600"/>
+          </a:xfrm>
+          <a:prstGeom prst="ellipse">
+            <a:avLst/>
+          </a:prstGeom>
+          <a:solidFill>
+            <a:schemeClr val="bg1"/>
+          </a:solidFill>
+          <a:ln>
+            <a:solidFill>
+              <a:schemeClr val="tx1"/>
+            </a:solidFill>
+          </a:ln>
+        </p:spPr>
+        <p:style>
+          <a:lnRef idx="2">
+            <a:schemeClr val="accent1">
+              <a:shade val="50000"/>
+            </a:schemeClr>
+          </a:lnRef>
+          <a:fillRef idx="1">
+            <a:schemeClr val="accent1"/>
+          </a:fillRef>
+          <a:effectRef idx="0">
+            <a:schemeClr val="accent1"/>
+          </a:effectRef>
+          <a:fontRef idx="minor">
+            <a:schemeClr val="lt1"/>
+          </a:fontRef>
+        </p:style>
+        <p:txBody>
+          <a:bodyPr rtlCol="0" anchor="ctr"/>
+          <a:lstStyle/>
+          <a:p>
+            <a:pPr algn="ctr"/>
+            <a:endParaRPr lang="en-US" sz="1600" dirty="0">
+              <a:solidFill>
+                <a:schemeClr val="tx1"/>
+              </a:solidFill>
+              <a:latin typeface="Arial" panose="020B0604020202020204" pitchFamily="34" charset="0"/>
+              <a:cs typeface="Arial" panose="020B0604020202020204" pitchFamily="34" charset="0"/>
+            </a:endParaRPr>
+          </a:p>
+        </p:txBody>
+      </p:sp>
+      <p:cxnSp>
+        <p:nvCxnSpPr>
+          <p:cNvPr id="19" name="Straight Connector 18"/>
+          <p:cNvCxnSpPr/>
+          <p:nvPr/>
+        </p:nvCxnSpPr>
+        <p:spPr>
+          <a:xfrm flipV="1">
+            <a:off x="6726113" y="5386739"/>
+            <a:ext cx="52756" cy="345841"/>
+          </a:xfrm>
+          <a:prstGeom prst="line">
+            <a:avLst/>
+          </a:prstGeom>
+          <a:ln w="28575">
+            <a:solidFill>
+              <a:schemeClr val="tx1"/>
+            </a:solidFill>
+          </a:ln>
+        </p:spPr>
+        <p:style>
+          <a:lnRef idx="1">
+            <a:schemeClr val="accent1"/>
+          </a:lnRef>
+          <a:fillRef idx="0">
+            <a:schemeClr val="accent1"/>
+          </a:fillRef>
+          <a:effectRef idx="0">
+            <a:schemeClr val="accent1"/>
+          </a:effectRef>
+          <a:fontRef idx="minor">
+            <a:schemeClr val="tx1"/>
+          </a:fontRef>
+        </p:style>
+      </p:cxnSp>
+      <p:sp>
+        <p:nvSpPr>
+          <p:cNvPr id="20" name="Oval 19"/>
+          <p:cNvSpPr/>
+          <p:nvPr/>
+        </p:nvSpPr>
+        <p:spPr>
+          <a:xfrm>
+            <a:off x="7640516" y="4879723"/>
+            <a:ext cx="228600" cy="228600"/>
+          </a:xfrm>
+          <a:prstGeom prst="ellipse">
+            <a:avLst/>
+          </a:prstGeom>
+          <a:solidFill>
+            <a:schemeClr val="bg1"/>
+          </a:solidFill>
+          <a:ln>
+            <a:solidFill>
+              <a:schemeClr val="tx1"/>
+            </a:solidFill>
+          </a:ln>
+        </p:spPr>
+        <p:style>
+          <a:lnRef idx="2">
+            <a:schemeClr val="accent1">
+              <a:shade val="50000"/>
+            </a:schemeClr>
+          </a:lnRef>
+          <a:fillRef idx="1">
+            <a:schemeClr val="accent1"/>
+          </a:fillRef>
+          <a:effectRef idx="0">
+            <a:schemeClr val="accent1"/>
+          </a:effectRef>
+          <a:fontRef idx="minor">
+            <a:schemeClr val="lt1"/>
+          </a:fontRef>
+        </p:style>
+        <p:txBody>
+          <a:bodyPr rtlCol="0" anchor="ctr"/>
+          <a:lstStyle/>
+          <a:p>
+            <a:pPr algn="ctr"/>
+            <a:endParaRPr lang="en-US" sz="1600" dirty="0">
+              <a:solidFill>
+                <a:schemeClr val="tx1"/>
+              </a:solidFill>
+              <a:latin typeface="Arial" panose="020B0604020202020204" pitchFamily="34" charset="0"/>
+              <a:cs typeface="Arial" panose="020B0604020202020204" pitchFamily="34" charset="0"/>
+            </a:endParaRPr>
+          </a:p>
+        </p:txBody>
+      </p:sp>
+      <p:cxnSp>
+        <p:nvCxnSpPr>
+          <p:cNvPr id="21" name="Straight Connector 20"/>
+          <p:cNvCxnSpPr>
+            <a:stCxn id="20" idx="2"/>
+          </p:cNvCxnSpPr>
+          <p:nvPr/>
+        </p:nvCxnSpPr>
+        <p:spPr>
+          <a:xfrm flipH="1" flipV="1">
+            <a:off x="7291749" y="4879723"/>
+            <a:ext cx="348767" cy="114300"/>
+          </a:xfrm>
+          <a:prstGeom prst="line">
+            <a:avLst/>
+          </a:prstGeom>
+          <a:ln w="28575">
+            <a:solidFill>
+              <a:schemeClr val="tx1"/>
+            </a:solidFill>
+          </a:ln>
+        </p:spPr>
+        <p:style>
+          <a:lnRef idx="1">
+            <a:schemeClr val="accent1"/>
+          </a:lnRef>
+          <a:fillRef idx="0">
+            <a:schemeClr val="accent1"/>
+          </a:fillRef>
+          <a:effectRef idx="0">
+            <a:schemeClr val="accent1"/>
+          </a:effectRef>
+          <a:fontRef idx="minor">
+            <a:schemeClr val="tx1"/>
+          </a:fontRef>
+        </p:style>
+      </p:cxnSp>
+      <p:sp>
+        <p:nvSpPr>
+          <p:cNvPr id="22" name="Oval 21"/>
+          <p:cNvSpPr/>
+          <p:nvPr/>
+        </p:nvSpPr>
+        <p:spPr>
+          <a:xfrm>
+            <a:off x="5152417" y="4668690"/>
+            <a:ext cx="228600" cy="228600"/>
+          </a:xfrm>
+          <a:prstGeom prst="ellipse">
+            <a:avLst/>
+          </a:prstGeom>
+          <a:solidFill>
+            <a:schemeClr val="bg1"/>
+          </a:solidFill>
+          <a:ln>
+            <a:solidFill>
+              <a:schemeClr val="tx1"/>
+            </a:solidFill>
+          </a:ln>
+        </p:spPr>
+        <p:style>
+          <a:lnRef idx="2">
+            <a:schemeClr val="accent1">
+              <a:shade val="50000"/>
+            </a:schemeClr>
+          </a:lnRef>
+          <a:fillRef idx="1">
+            <a:schemeClr val="accent1"/>
+          </a:fillRef>
+          <a:effectRef idx="0">
+            <a:schemeClr val="accent1"/>
+          </a:effectRef>
+          <a:fontRef idx="minor">
+            <a:schemeClr val="lt1"/>
+          </a:fontRef>
+        </p:style>
+        <p:txBody>
+          <a:bodyPr rtlCol="0" anchor="ctr"/>
+          <a:lstStyle/>
+          <a:p>
+            <a:pPr algn="ctr"/>
+            <a:endParaRPr lang="en-US" sz="1600" dirty="0">
+              <a:solidFill>
+                <a:schemeClr val="tx1"/>
+              </a:solidFill>
+              <a:latin typeface="Arial" panose="020B0604020202020204" pitchFamily="34" charset="0"/>
+              <a:cs typeface="Arial" panose="020B0604020202020204" pitchFamily="34" charset="0"/>
+            </a:endParaRPr>
+          </a:p>
+        </p:txBody>
+      </p:sp>
+      <p:sp>
+        <p:nvSpPr>
+          <p:cNvPr id="23" name="TextBox 22"/>
+          <p:cNvSpPr txBox="1"/>
+          <p:nvPr/>
+        </p:nvSpPr>
+        <p:spPr>
+          <a:xfrm>
+            <a:off x="5013092" y="4632804"/>
+            <a:ext cx="509953" cy="338554"/>
+          </a:xfrm>
+          <a:prstGeom prst="rect">
+            <a:avLst/>
+          </a:prstGeom>
+          <a:noFill/>
+        </p:spPr>
+        <p:txBody>
+          <a:bodyPr wrap="square" rtlCol="0">
+            <a:spAutoFit/>
+          </a:bodyPr>
+          <a:lstStyle/>
+          <a:p>
+            <a:pPr algn="ctr"/>
+            <a:r>
+              <a:rPr lang="en-US" sz="1600" dirty="0" smtClean="0">
+                <a:latin typeface="Arial" panose="020B0604020202020204" pitchFamily="34" charset="0"/>
+                <a:cs typeface="Arial" panose="020B0604020202020204" pitchFamily="34" charset="0"/>
+              </a:rPr>
+              <a:t>4</a:t>
+            </a:r>
+            <a:endParaRPr lang="en-US" dirty="0">
+              <a:latin typeface="Arial" panose="020B0604020202020204" pitchFamily="34" charset="0"/>
+              <a:cs typeface="Arial" panose="020B0604020202020204" pitchFamily="34" charset="0"/>
+            </a:endParaRPr>
+          </a:p>
+        </p:txBody>
+      </p:sp>
+      <p:sp>
+        <p:nvSpPr>
+          <p:cNvPr id="24" name="Oval 23"/>
+          <p:cNvSpPr/>
+          <p:nvPr/>
+        </p:nvSpPr>
+        <p:spPr>
+          <a:xfrm>
+            <a:off x="7218482" y="5272439"/>
+            <a:ext cx="228600" cy="228600"/>
+          </a:xfrm>
+          <a:prstGeom prst="ellipse">
+            <a:avLst/>
+          </a:prstGeom>
+          <a:solidFill>
+            <a:schemeClr val="bg1"/>
+          </a:solidFill>
+          <a:ln>
+            <a:solidFill>
+              <a:schemeClr val="tx1"/>
+            </a:solidFill>
+          </a:ln>
+        </p:spPr>
+        <p:style>
+          <a:lnRef idx="2">
+            <a:schemeClr val="accent1">
+              <a:shade val="50000"/>
+            </a:schemeClr>
+          </a:lnRef>
+          <a:fillRef idx="1">
+            <a:schemeClr val="accent1"/>
+          </a:fillRef>
+          <a:effectRef idx="0">
+            <a:schemeClr val="accent1"/>
+          </a:effectRef>
+          <a:fontRef idx="minor">
+            <a:schemeClr val="lt1"/>
+          </a:fontRef>
+        </p:style>
+        <p:txBody>
+          <a:bodyPr rtlCol="0" anchor="ctr"/>
+          <a:lstStyle/>
+          <a:p>
+            <a:pPr algn="ctr"/>
+            <a:endParaRPr lang="en-US" sz="1600" dirty="0">
+              <a:solidFill>
+                <a:schemeClr val="tx1"/>
+              </a:solidFill>
+              <a:latin typeface="Arial" panose="020B0604020202020204" pitchFamily="34" charset="0"/>
+              <a:cs typeface="Arial" panose="020B0604020202020204" pitchFamily="34" charset="0"/>
+            </a:endParaRPr>
+          </a:p>
+        </p:txBody>
+      </p:sp>
+      <p:cxnSp>
+        <p:nvCxnSpPr>
+          <p:cNvPr id="25" name="Straight Connector 24"/>
+          <p:cNvCxnSpPr>
+            <a:stCxn id="24" idx="2"/>
+          </p:cNvCxnSpPr>
+          <p:nvPr/>
+        </p:nvCxnSpPr>
+        <p:spPr>
+          <a:xfrm flipH="1" flipV="1">
+            <a:off x="6910749" y="5169869"/>
+            <a:ext cx="307733" cy="216870"/>
+          </a:xfrm>
+          <a:prstGeom prst="line">
+            <a:avLst/>
+          </a:prstGeom>
+          <a:ln w="28575">
+            <a:solidFill>
+              <a:schemeClr val="tx1"/>
+            </a:solidFill>
+          </a:ln>
+        </p:spPr>
+        <p:style>
+          <a:lnRef idx="1">
+            <a:schemeClr val="accent1"/>
+          </a:lnRef>
+          <a:fillRef idx="0">
+            <a:schemeClr val="accent1"/>
+          </a:fillRef>
+          <a:effectRef idx="0">
+            <a:schemeClr val="accent1"/>
+          </a:effectRef>
+          <a:fontRef idx="minor">
+            <a:schemeClr val="tx1"/>
+          </a:fontRef>
+        </p:style>
+      </p:cxnSp>
+      <p:sp>
+        <p:nvSpPr>
+          <p:cNvPr id="26" name="TextBox 25"/>
+          <p:cNvSpPr txBox="1"/>
+          <p:nvPr/>
+        </p:nvSpPr>
+        <p:spPr>
+          <a:xfrm>
+            <a:off x="7127631" y="5224788"/>
+            <a:ext cx="509953" cy="338554"/>
+          </a:xfrm>
+          <a:prstGeom prst="rect">
+            <a:avLst/>
+          </a:prstGeom>
+          <a:noFill/>
+        </p:spPr>
+        <p:txBody>
+          <a:bodyPr wrap="square" rtlCol="0">
+            <a:spAutoFit/>
+          </a:bodyPr>
+          <a:lstStyle/>
+          <a:p>
+            <a:r>
+              <a:rPr lang="en-US" sz="1600" dirty="0" smtClean="0">
+                <a:latin typeface="Arial" panose="020B0604020202020204" pitchFamily="34" charset="0"/>
+                <a:cs typeface="Arial" panose="020B0604020202020204" pitchFamily="34" charset="0"/>
+              </a:rPr>
+              <a:t>14</a:t>
+            </a:r>
+            <a:endParaRPr lang="en-US" dirty="0">
+              <a:latin typeface="Arial" panose="020B0604020202020204" pitchFamily="34" charset="0"/>
+              <a:cs typeface="Arial" panose="020B0604020202020204" pitchFamily="34" charset="0"/>
+            </a:endParaRPr>
+          </a:p>
+        </p:txBody>
+      </p:sp>
+      <p:sp>
+        <p:nvSpPr>
+          <p:cNvPr id="27" name="Oval 26"/>
+          <p:cNvSpPr/>
+          <p:nvPr/>
+        </p:nvSpPr>
+        <p:spPr>
+          <a:xfrm>
+            <a:off x="7367959" y="3349859"/>
+            <a:ext cx="228600" cy="228600"/>
+          </a:xfrm>
+          <a:prstGeom prst="ellipse">
+            <a:avLst/>
+          </a:prstGeom>
+          <a:solidFill>
+            <a:schemeClr val="bg1"/>
+          </a:solidFill>
+          <a:ln>
+            <a:solidFill>
+              <a:schemeClr val="tx1"/>
+            </a:solidFill>
+          </a:ln>
+        </p:spPr>
+        <p:style>
+          <a:lnRef idx="2">
+            <a:schemeClr val="accent1">
+              <a:shade val="50000"/>
+            </a:schemeClr>
+          </a:lnRef>
+          <a:fillRef idx="1">
+            <a:schemeClr val="accent1"/>
+          </a:fillRef>
+          <a:effectRef idx="0">
+            <a:schemeClr val="accent1"/>
+          </a:effectRef>
+          <a:fontRef idx="minor">
+            <a:schemeClr val="lt1"/>
+          </a:fontRef>
+        </p:style>
+        <p:txBody>
+          <a:bodyPr rtlCol="0" anchor="ctr"/>
+          <a:lstStyle/>
+          <a:p>
+            <a:pPr algn="ctr"/>
+            <a:endParaRPr lang="en-US" sz="1600" dirty="0">
+              <a:solidFill>
+                <a:schemeClr val="tx1"/>
+              </a:solidFill>
+              <a:latin typeface="Arial" panose="020B0604020202020204" pitchFamily="34" charset="0"/>
+              <a:cs typeface="Arial" panose="020B0604020202020204" pitchFamily="34" charset="0"/>
+            </a:endParaRPr>
+          </a:p>
+        </p:txBody>
+      </p:sp>
+      <p:sp>
+        <p:nvSpPr>
+          <p:cNvPr id="28" name="TextBox 27"/>
+          <p:cNvSpPr txBox="1"/>
+          <p:nvPr/>
+        </p:nvSpPr>
+        <p:spPr>
+          <a:xfrm>
+            <a:off x="7274182" y="3300743"/>
+            <a:ext cx="509953" cy="338554"/>
+          </a:xfrm>
+          <a:prstGeom prst="rect">
+            <a:avLst/>
+          </a:prstGeom>
+          <a:noFill/>
+        </p:spPr>
+        <p:txBody>
+          <a:bodyPr wrap="square" rtlCol="0">
+            <a:spAutoFit/>
+          </a:bodyPr>
+          <a:lstStyle/>
+          <a:p>
+            <a:r>
+              <a:rPr lang="en-US" sz="1600" dirty="0" smtClean="0">
+                <a:latin typeface="Arial" panose="020B0604020202020204" pitchFamily="34" charset="0"/>
+                <a:cs typeface="Arial" panose="020B0604020202020204" pitchFamily="34" charset="0"/>
+              </a:rPr>
+              <a:t>13</a:t>
+            </a:r>
+            <a:endParaRPr lang="en-US" dirty="0">
+              <a:latin typeface="Arial" panose="020B0604020202020204" pitchFamily="34" charset="0"/>
+              <a:cs typeface="Arial" panose="020B0604020202020204" pitchFamily="34" charset="0"/>
+            </a:endParaRPr>
+          </a:p>
+        </p:txBody>
+      </p:sp>
+      <p:sp>
+        <p:nvSpPr>
+          <p:cNvPr id="32" name="Oval 31"/>
+          <p:cNvSpPr/>
+          <p:nvPr/>
+        </p:nvSpPr>
+        <p:spPr>
+          <a:xfrm>
+            <a:off x="4563216" y="3147635"/>
+            <a:ext cx="228600" cy="228600"/>
+          </a:xfrm>
+          <a:prstGeom prst="ellipse">
+            <a:avLst/>
+          </a:prstGeom>
+          <a:solidFill>
+            <a:schemeClr val="bg1"/>
+          </a:solidFill>
+          <a:ln>
+            <a:solidFill>
+              <a:schemeClr val="tx1"/>
+            </a:solidFill>
+          </a:ln>
+        </p:spPr>
+        <p:style>
+          <a:lnRef idx="2">
+            <a:schemeClr val="accent1">
+              <a:shade val="50000"/>
+            </a:schemeClr>
+          </a:lnRef>
+          <a:fillRef idx="1">
+            <a:schemeClr val="accent1"/>
+          </a:fillRef>
+          <a:effectRef idx="0">
+            <a:schemeClr val="accent1"/>
+          </a:effectRef>
+          <a:fontRef idx="minor">
+            <a:schemeClr val="lt1"/>
+          </a:fontRef>
+        </p:style>
+        <p:txBody>
+          <a:bodyPr rtlCol="0" anchor="ctr"/>
+          <a:lstStyle/>
+          <a:p>
+            <a:pPr algn="ctr"/>
+            <a:endParaRPr lang="en-US" sz="1600" dirty="0">
+              <a:solidFill>
+                <a:schemeClr val="tx1"/>
+              </a:solidFill>
+              <a:latin typeface="Arial" panose="020B0604020202020204" pitchFamily="34" charset="0"/>
+              <a:cs typeface="Arial" panose="020B0604020202020204" pitchFamily="34" charset="0"/>
+            </a:endParaRPr>
+          </a:p>
+        </p:txBody>
+      </p:sp>
+      <p:sp>
+        <p:nvSpPr>
+          <p:cNvPr id="33" name="TextBox 32"/>
+          <p:cNvSpPr txBox="1"/>
+          <p:nvPr/>
+        </p:nvSpPr>
+        <p:spPr>
+          <a:xfrm>
+            <a:off x="4457705" y="3108010"/>
+            <a:ext cx="509953" cy="338554"/>
+          </a:xfrm>
+          <a:prstGeom prst="rect">
+            <a:avLst/>
+          </a:prstGeom>
+          <a:noFill/>
+        </p:spPr>
+        <p:txBody>
+          <a:bodyPr wrap="square" rtlCol="0">
+            <a:spAutoFit/>
+          </a:bodyPr>
+          <a:lstStyle/>
+          <a:p>
+            <a:r>
+              <a:rPr lang="en-US" sz="1600" dirty="0" smtClean="0">
+                <a:latin typeface="Arial" panose="020B0604020202020204" pitchFamily="34" charset="0"/>
+                <a:cs typeface="Arial" panose="020B0604020202020204" pitchFamily="34" charset="0"/>
+              </a:rPr>
+              <a:t>16</a:t>
+            </a:r>
+            <a:endParaRPr lang="en-US" dirty="0">
+              <a:latin typeface="Arial" panose="020B0604020202020204" pitchFamily="34" charset="0"/>
+              <a:cs typeface="Arial" panose="020B0604020202020204" pitchFamily="34" charset="0"/>
+            </a:endParaRPr>
+          </a:p>
+        </p:txBody>
+      </p:sp>
+      <p:cxnSp>
+        <p:nvCxnSpPr>
+          <p:cNvPr id="34" name="Straight Connector 33"/>
+          <p:cNvCxnSpPr/>
+          <p:nvPr/>
+        </p:nvCxnSpPr>
+        <p:spPr>
+          <a:xfrm flipV="1">
+            <a:off x="4298584" y="3349860"/>
+            <a:ext cx="304321" cy="136329"/>
+          </a:xfrm>
+          <a:prstGeom prst="line">
+            <a:avLst/>
+          </a:prstGeom>
+          <a:ln w="28575">
+            <a:solidFill>
+              <a:schemeClr val="tx1"/>
+            </a:solidFill>
+          </a:ln>
+        </p:spPr>
+        <p:style>
+          <a:lnRef idx="1">
+            <a:schemeClr val="accent1"/>
+          </a:lnRef>
+          <a:fillRef idx="0">
+            <a:schemeClr val="accent1"/>
+          </a:fillRef>
+          <a:effectRef idx="0">
+            <a:schemeClr val="accent1"/>
+          </a:effectRef>
+          <a:fontRef idx="minor">
+            <a:schemeClr val="tx1"/>
+          </a:fontRef>
+        </p:style>
+      </p:cxnSp>
+      <p:sp>
+        <p:nvSpPr>
+          <p:cNvPr id="35" name="TextBox 34"/>
+          <p:cNvSpPr txBox="1"/>
+          <p:nvPr/>
+        </p:nvSpPr>
+        <p:spPr>
+          <a:xfrm>
+            <a:off x="3569676" y="114300"/>
+            <a:ext cx="395654" cy="307777"/>
+          </a:xfrm>
+          <a:prstGeom prst="rect">
+            <a:avLst/>
+          </a:prstGeom>
+          <a:noFill/>
+        </p:spPr>
+        <p:txBody>
+          <a:bodyPr wrap="square" rtlCol="0">
+            <a:spAutoFit/>
+          </a:bodyPr>
+          <a:lstStyle/>
+          <a:p>
+            <a:r>
+              <a:rPr lang="en-US" sz="1400" b="1" dirty="0" smtClean="0">
+                <a:latin typeface="Arial" panose="020B0604020202020204" pitchFamily="34" charset="0"/>
+                <a:cs typeface="Arial" panose="020B0604020202020204" pitchFamily="34" charset="0"/>
+              </a:rPr>
+              <a:t>A)</a:t>
+            </a:r>
+            <a:endParaRPr lang="en-US" sz="1400" b="1" dirty="0">
+              <a:latin typeface="Arial" panose="020B0604020202020204" pitchFamily="34" charset="0"/>
+              <a:cs typeface="Arial" panose="020B0604020202020204" pitchFamily="34" charset="0"/>
+            </a:endParaRPr>
+          </a:p>
+        </p:txBody>
+      </p:sp>
+      <p:sp>
+        <p:nvSpPr>
+          <p:cNvPr id="36" name="TextBox 35"/>
+          <p:cNvSpPr txBox="1"/>
+          <p:nvPr/>
+        </p:nvSpPr>
+        <p:spPr>
+          <a:xfrm>
+            <a:off x="3569676" y="3134458"/>
+            <a:ext cx="395654" cy="307777"/>
+          </a:xfrm>
+          <a:prstGeom prst="rect">
+            <a:avLst/>
+          </a:prstGeom>
+          <a:noFill/>
+        </p:spPr>
+        <p:txBody>
+          <a:bodyPr wrap="square" rtlCol="0">
+            <a:spAutoFit/>
+          </a:bodyPr>
+          <a:lstStyle/>
+          <a:p>
+            <a:r>
+              <a:rPr lang="en-US" sz="1400" b="1" dirty="0" smtClean="0">
+                <a:latin typeface="Arial" panose="020B0604020202020204" pitchFamily="34" charset="0"/>
+                <a:cs typeface="Arial" panose="020B0604020202020204" pitchFamily="34" charset="0"/>
+              </a:rPr>
+              <a:t>B)</a:t>
+            </a:r>
+            <a:endParaRPr lang="en-US" sz="1400" b="1" dirty="0">
+              <a:latin typeface="Arial" panose="020B0604020202020204" pitchFamily="34" charset="0"/>
+              <a:cs typeface="Arial" panose="020B0604020202020204" pitchFamily="34" charset="0"/>
+            </a:endParaRPr>
+          </a:p>
+        </p:txBody>
+      </p:sp>
+      <p:cxnSp>
+        <p:nvCxnSpPr>
+          <p:cNvPr id="37" name="Straight Connector 36"/>
+          <p:cNvCxnSpPr/>
+          <p:nvPr/>
+        </p:nvCxnSpPr>
+        <p:spPr>
+          <a:xfrm flipV="1">
+            <a:off x="4925833" y="4217962"/>
+            <a:ext cx="83649" cy="151826"/>
+          </a:xfrm>
+          <a:prstGeom prst="line">
+            <a:avLst/>
+          </a:prstGeom>
+          <a:ln w="28575">
+            <a:solidFill>
+              <a:schemeClr val="tx1"/>
+            </a:solidFill>
+          </a:ln>
+        </p:spPr>
+        <p:style>
+          <a:lnRef idx="1">
+            <a:schemeClr val="accent1"/>
+          </a:lnRef>
+          <a:fillRef idx="0">
+            <a:schemeClr val="accent1"/>
+          </a:fillRef>
+          <a:effectRef idx="0">
+            <a:schemeClr val="accent1"/>
+          </a:effectRef>
+          <a:fontRef idx="minor">
+            <a:schemeClr val="tx1"/>
+          </a:fontRef>
+        </p:style>
+      </p:cxnSp>
+      <p:sp>
+        <p:nvSpPr>
+          <p:cNvPr id="43" name="TextBox 42"/>
+          <p:cNvSpPr txBox="1"/>
+          <p:nvPr/>
+        </p:nvSpPr>
+        <p:spPr>
+          <a:xfrm>
+            <a:off x="6532679" y="5686393"/>
+            <a:ext cx="509953" cy="338554"/>
+          </a:xfrm>
+          <a:prstGeom prst="rect">
+            <a:avLst/>
+          </a:prstGeom>
+          <a:noFill/>
+        </p:spPr>
+        <p:txBody>
+          <a:bodyPr wrap="square" rtlCol="0">
+            <a:spAutoFit/>
+          </a:bodyPr>
+          <a:lstStyle/>
+          <a:p>
+            <a:r>
+              <a:rPr lang="en-US" sz="1600" dirty="0" smtClean="0">
+                <a:latin typeface="Arial" panose="020B0604020202020204" pitchFamily="34" charset="0"/>
+                <a:cs typeface="Arial" panose="020B0604020202020204" pitchFamily="34" charset="0"/>
+              </a:rPr>
+              <a:t>10</a:t>
+            </a:r>
+            <a:endParaRPr lang="en-US" dirty="0">
+              <a:latin typeface="Arial" panose="020B0604020202020204" pitchFamily="34" charset="0"/>
+              <a:cs typeface="Arial" panose="020B0604020202020204" pitchFamily="34" charset="0"/>
+            </a:endParaRPr>
+          </a:p>
+        </p:txBody>
+      </p:sp>
+      <p:sp>
+        <p:nvSpPr>
+          <p:cNvPr id="44" name="Oval 43"/>
+          <p:cNvSpPr/>
+          <p:nvPr/>
+        </p:nvSpPr>
+        <p:spPr>
+          <a:xfrm>
+            <a:off x="3601924" y="4619576"/>
+            <a:ext cx="228600" cy="228600"/>
+          </a:xfrm>
+          <a:prstGeom prst="ellipse">
+            <a:avLst/>
+          </a:prstGeom>
+          <a:solidFill>
+            <a:schemeClr val="bg1"/>
+          </a:solidFill>
+          <a:ln>
+            <a:solidFill>
+              <a:schemeClr val="tx1"/>
+            </a:solidFill>
+          </a:ln>
+        </p:spPr>
+        <p:style>
+          <a:lnRef idx="2">
+            <a:schemeClr val="accent1">
+              <a:shade val="50000"/>
+            </a:schemeClr>
+          </a:lnRef>
+          <a:fillRef idx="1">
+            <a:schemeClr val="accent1"/>
+          </a:fillRef>
+          <a:effectRef idx="0">
+            <a:schemeClr val="accent1"/>
+          </a:effectRef>
+          <a:fontRef idx="minor">
+            <a:schemeClr val="lt1"/>
+          </a:fontRef>
+        </p:style>
+        <p:txBody>
+          <a:bodyPr rtlCol="0" anchor="ctr"/>
+          <a:lstStyle/>
+          <a:p>
+            <a:pPr algn="ctr"/>
+            <a:endParaRPr lang="en-US" sz="1600" dirty="0">
+              <a:solidFill>
+                <a:schemeClr val="tx1"/>
+              </a:solidFill>
+              <a:latin typeface="Arial" panose="020B0604020202020204" pitchFamily="34" charset="0"/>
+              <a:cs typeface="Arial" panose="020B0604020202020204" pitchFamily="34" charset="0"/>
+            </a:endParaRPr>
+          </a:p>
+        </p:txBody>
+      </p:sp>
+      <p:sp>
+        <p:nvSpPr>
+          <p:cNvPr id="45" name="TextBox 44"/>
+          <p:cNvSpPr txBox="1"/>
+          <p:nvPr/>
+        </p:nvSpPr>
+        <p:spPr>
+          <a:xfrm>
+            <a:off x="3584335" y="4568269"/>
+            <a:ext cx="509953" cy="338554"/>
+          </a:xfrm>
+          <a:prstGeom prst="rect">
+            <a:avLst/>
+          </a:prstGeom>
+          <a:noFill/>
+        </p:spPr>
+        <p:txBody>
+          <a:bodyPr wrap="square" rtlCol="0">
+            <a:spAutoFit/>
+          </a:bodyPr>
+          <a:lstStyle/>
+          <a:p>
+            <a:r>
+              <a:rPr lang="en-US" sz="1600" dirty="0" smtClean="0">
+                <a:latin typeface="Arial" panose="020B0604020202020204" pitchFamily="34" charset="0"/>
+                <a:cs typeface="Arial" panose="020B0604020202020204" pitchFamily="34" charset="0"/>
+              </a:rPr>
+              <a:t>7</a:t>
+            </a:r>
+            <a:endParaRPr lang="en-US" dirty="0">
+              <a:latin typeface="Arial" panose="020B0604020202020204" pitchFamily="34" charset="0"/>
+              <a:cs typeface="Arial" panose="020B0604020202020204" pitchFamily="34" charset="0"/>
+            </a:endParaRPr>
+          </a:p>
+        </p:txBody>
+      </p:sp>
+      <p:cxnSp>
+        <p:nvCxnSpPr>
+          <p:cNvPr id="46" name="Straight Connector 45"/>
+          <p:cNvCxnSpPr>
+            <a:endCxn id="17" idx="3"/>
+          </p:cNvCxnSpPr>
+          <p:nvPr/>
+        </p:nvCxnSpPr>
+        <p:spPr>
+          <a:xfrm flipV="1">
+            <a:off x="4418895" y="3647558"/>
+            <a:ext cx="315543" cy="84805"/>
+          </a:xfrm>
+          <a:prstGeom prst="line">
+            <a:avLst/>
+          </a:prstGeom>
+          <a:ln w="28575">
+            <a:solidFill>
+              <a:schemeClr val="tx1"/>
+            </a:solidFill>
+          </a:ln>
+        </p:spPr>
+        <p:style>
+          <a:lnRef idx="1">
+            <a:schemeClr val="accent1"/>
+          </a:lnRef>
+          <a:fillRef idx="0">
+            <a:schemeClr val="accent1"/>
+          </a:fillRef>
+          <a:effectRef idx="0">
+            <a:schemeClr val="accent1"/>
+          </a:effectRef>
+          <a:fontRef idx="minor">
+            <a:schemeClr val="tx1"/>
+          </a:fontRef>
+        </p:style>
+      </p:cxnSp>
+      <p:sp>
+        <p:nvSpPr>
+          <p:cNvPr id="47" name="Oval 46"/>
+          <p:cNvSpPr/>
+          <p:nvPr/>
+        </p:nvSpPr>
+        <p:spPr>
+          <a:xfrm>
+            <a:off x="7051433" y="5576502"/>
+            <a:ext cx="228600" cy="228600"/>
+          </a:xfrm>
+          <a:prstGeom prst="ellipse">
+            <a:avLst/>
+          </a:prstGeom>
+          <a:solidFill>
+            <a:schemeClr val="bg1"/>
+          </a:solidFill>
+          <a:ln>
+            <a:solidFill>
+              <a:schemeClr val="tx1"/>
+            </a:solidFill>
+          </a:ln>
+        </p:spPr>
+        <p:style>
+          <a:lnRef idx="2">
+            <a:schemeClr val="accent1">
+              <a:shade val="50000"/>
+            </a:schemeClr>
+          </a:lnRef>
+          <a:fillRef idx="1">
+            <a:schemeClr val="accent1"/>
+          </a:fillRef>
+          <a:effectRef idx="0">
+            <a:schemeClr val="accent1"/>
+          </a:effectRef>
+          <a:fontRef idx="minor">
+            <a:schemeClr val="lt1"/>
+          </a:fontRef>
+        </p:style>
+        <p:txBody>
+          <a:bodyPr rtlCol="0" anchor="ctr"/>
+          <a:lstStyle/>
+          <a:p>
+            <a:pPr algn="ctr"/>
+            <a:endParaRPr lang="en-US" sz="1600" dirty="0">
+              <a:solidFill>
+                <a:schemeClr val="tx1"/>
+              </a:solidFill>
+              <a:latin typeface="Arial" panose="020B0604020202020204" pitchFamily="34" charset="0"/>
+              <a:cs typeface="Arial" panose="020B0604020202020204" pitchFamily="34" charset="0"/>
+            </a:endParaRPr>
+          </a:p>
+        </p:txBody>
+      </p:sp>
+      <p:sp>
+        <p:nvSpPr>
+          <p:cNvPr id="48" name="TextBox 47"/>
+          <p:cNvSpPr txBox="1"/>
+          <p:nvPr/>
+        </p:nvSpPr>
+        <p:spPr>
+          <a:xfrm>
+            <a:off x="7025049" y="5527111"/>
+            <a:ext cx="509953" cy="338554"/>
+          </a:xfrm>
+          <a:prstGeom prst="rect">
+            <a:avLst/>
+          </a:prstGeom>
+          <a:noFill/>
+        </p:spPr>
+        <p:txBody>
+          <a:bodyPr wrap="square" rtlCol="0">
+            <a:spAutoFit/>
+          </a:bodyPr>
+          <a:lstStyle/>
+          <a:p>
+            <a:r>
+              <a:rPr lang="en-US" sz="1600" dirty="0" smtClean="0">
+                <a:latin typeface="Arial" panose="020B0604020202020204" pitchFamily="34" charset="0"/>
+                <a:cs typeface="Arial" panose="020B0604020202020204" pitchFamily="34" charset="0"/>
+              </a:rPr>
+              <a:t>8</a:t>
+            </a:r>
+            <a:endParaRPr lang="en-US" dirty="0">
+              <a:latin typeface="Arial" panose="020B0604020202020204" pitchFamily="34" charset="0"/>
+              <a:cs typeface="Arial" panose="020B0604020202020204" pitchFamily="34" charset="0"/>
+            </a:endParaRPr>
+          </a:p>
+        </p:txBody>
+      </p:sp>
+      <p:cxnSp>
+        <p:nvCxnSpPr>
+          <p:cNvPr id="49" name="Straight Connector 48"/>
+          <p:cNvCxnSpPr>
+            <a:stCxn id="47" idx="1"/>
+          </p:cNvCxnSpPr>
+          <p:nvPr/>
+        </p:nvCxnSpPr>
+        <p:spPr>
+          <a:xfrm flipH="1" flipV="1">
+            <a:off x="7019619" y="5412702"/>
+            <a:ext cx="65292" cy="197278"/>
+          </a:xfrm>
+          <a:prstGeom prst="line">
+            <a:avLst/>
+          </a:prstGeom>
+          <a:ln w="28575">
+            <a:solidFill>
+              <a:schemeClr val="tx1"/>
+            </a:solidFill>
+          </a:ln>
+        </p:spPr>
+        <p:style>
+          <a:lnRef idx="1">
+            <a:schemeClr val="accent1"/>
+          </a:lnRef>
+          <a:fillRef idx="0">
+            <a:schemeClr val="accent1"/>
+          </a:fillRef>
+          <a:effectRef idx="0">
+            <a:schemeClr val="accent1"/>
+          </a:effectRef>
+          <a:fontRef idx="minor">
+            <a:schemeClr val="tx1"/>
+          </a:fontRef>
+        </p:style>
+      </p:cxnSp>
+      <p:cxnSp>
+        <p:nvCxnSpPr>
+          <p:cNvPr id="50" name="Straight Connector 49"/>
+          <p:cNvCxnSpPr/>
+          <p:nvPr/>
+        </p:nvCxnSpPr>
+        <p:spPr>
+          <a:xfrm flipV="1">
+            <a:off x="3774413" y="4276291"/>
+            <a:ext cx="47319" cy="332301"/>
+          </a:xfrm>
+          <a:prstGeom prst="line">
+            <a:avLst/>
+          </a:prstGeom>
+          <a:ln w="28575">
+            <a:solidFill>
+              <a:schemeClr val="tx1"/>
+            </a:solidFill>
+          </a:ln>
+        </p:spPr>
+        <p:style>
+          <a:lnRef idx="1">
+            <a:schemeClr val="accent1"/>
+          </a:lnRef>
+          <a:fillRef idx="0">
+            <a:schemeClr val="accent1"/>
+          </a:fillRef>
+          <a:effectRef idx="0">
+            <a:schemeClr val="accent1"/>
+          </a:effectRef>
+          <a:fontRef idx="minor">
+            <a:schemeClr val="tx1"/>
+          </a:fontRef>
+        </p:style>
+      </p:cxnSp>
+      <p:sp>
+        <p:nvSpPr>
+          <p:cNvPr id="51" name="Oval 50"/>
+          <p:cNvSpPr/>
+          <p:nvPr/>
+        </p:nvSpPr>
+        <p:spPr>
+          <a:xfrm>
+            <a:off x="5820441" y="4917067"/>
+            <a:ext cx="228600" cy="228600"/>
+          </a:xfrm>
+          <a:prstGeom prst="ellipse">
+            <a:avLst/>
+          </a:prstGeom>
+          <a:solidFill>
+            <a:schemeClr val="bg1"/>
+          </a:solidFill>
+          <a:ln>
+            <a:solidFill>
+              <a:schemeClr val="tx1"/>
+            </a:solidFill>
+          </a:ln>
+        </p:spPr>
+        <p:style>
+          <a:lnRef idx="2">
+            <a:schemeClr val="accent1">
+              <a:shade val="50000"/>
+            </a:schemeClr>
+          </a:lnRef>
+          <a:fillRef idx="1">
+            <a:schemeClr val="accent1"/>
+          </a:fillRef>
+          <a:effectRef idx="0">
+            <a:schemeClr val="accent1"/>
+          </a:effectRef>
+          <a:fontRef idx="minor">
+            <a:schemeClr val="lt1"/>
+          </a:fontRef>
+        </p:style>
+        <p:txBody>
+          <a:bodyPr rtlCol="0" anchor="ctr"/>
+          <a:lstStyle/>
+          <a:p>
+            <a:pPr algn="ctr"/>
+            <a:endParaRPr lang="en-US" sz="1600" dirty="0">
+              <a:solidFill>
+                <a:schemeClr val="tx1"/>
+              </a:solidFill>
+              <a:latin typeface="Arial" panose="020B0604020202020204" pitchFamily="34" charset="0"/>
+              <a:cs typeface="Arial" panose="020B0604020202020204" pitchFamily="34" charset="0"/>
+            </a:endParaRPr>
+          </a:p>
+        </p:txBody>
+      </p:sp>
+      <p:sp>
+        <p:nvSpPr>
+          <p:cNvPr id="52" name="TextBox 51"/>
+          <p:cNvSpPr txBox="1"/>
+          <p:nvPr/>
+        </p:nvSpPr>
+        <p:spPr>
+          <a:xfrm>
+            <a:off x="5714932" y="4856968"/>
+            <a:ext cx="509953" cy="338554"/>
+          </a:xfrm>
+          <a:prstGeom prst="rect">
+            <a:avLst/>
+          </a:prstGeom>
+          <a:noFill/>
+        </p:spPr>
+        <p:txBody>
+          <a:bodyPr wrap="square" rtlCol="0">
+            <a:spAutoFit/>
+          </a:bodyPr>
+          <a:lstStyle/>
+          <a:p>
+            <a:r>
+              <a:rPr lang="en-US" sz="1600" dirty="0" smtClean="0">
+                <a:latin typeface="Arial" panose="020B0604020202020204" pitchFamily="34" charset="0"/>
+                <a:cs typeface="Arial" panose="020B0604020202020204" pitchFamily="34" charset="0"/>
+              </a:rPr>
+              <a:t>12</a:t>
+            </a:r>
+            <a:endParaRPr lang="en-US" dirty="0">
+              <a:latin typeface="Arial" panose="020B0604020202020204" pitchFamily="34" charset="0"/>
+              <a:cs typeface="Arial" panose="020B0604020202020204" pitchFamily="34" charset="0"/>
+            </a:endParaRPr>
+          </a:p>
+        </p:txBody>
+      </p:sp>
+      <p:sp>
+        <p:nvSpPr>
+          <p:cNvPr id="53" name="Oval 52"/>
+          <p:cNvSpPr/>
+          <p:nvPr/>
+        </p:nvSpPr>
+        <p:spPr>
+          <a:xfrm>
+            <a:off x="5424788" y="4797645"/>
+            <a:ext cx="228600" cy="228600"/>
+          </a:xfrm>
+          <a:prstGeom prst="ellipse">
+            <a:avLst/>
+          </a:prstGeom>
+          <a:solidFill>
+            <a:schemeClr val="bg1"/>
+          </a:solidFill>
+          <a:ln>
+            <a:solidFill>
+              <a:schemeClr val="tx1"/>
+            </a:solidFill>
+          </a:ln>
+        </p:spPr>
+        <p:style>
+          <a:lnRef idx="2">
+            <a:schemeClr val="accent1">
+              <a:shade val="50000"/>
+            </a:schemeClr>
+          </a:lnRef>
+          <a:fillRef idx="1">
+            <a:schemeClr val="accent1"/>
+          </a:fillRef>
+          <a:effectRef idx="0">
+            <a:schemeClr val="accent1"/>
+          </a:effectRef>
+          <a:fontRef idx="minor">
+            <a:schemeClr val="lt1"/>
+          </a:fontRef>
+        </p:style>
+        <p:txBody>
+          <a:bodyPr rtlCol="0" anchor="ctr"/>
+          <a:lstStyle/>
+          <a:p>
+            <a:pPr algn="ctr"/>
+            <a:endParaRPr lang="en-US" sz="1600" dirty="0">
+              <a:solidFill>
+                <a:schemeClr val="tx1"/>
+              </a:solidFill>
+              <a:latin typeface="Arial" panose="020B0604020202020204" pitchFamily="34" charset="0"/>
+              <a:cs typeface="Arial" panose="020B0604020202020204" pitchFamily="34" charset="0"/>
+            </a:endParaRPr>
+          </a:p>
+        </p:txBody>
+      </p:sp>
+      <p:sp>
+        <p:nvSpPr>
+          <p:cNvPr id="54" name="TextBox 53"/>
+          <p:cNvSpPr txBox="1"/>
+          <p:nvPr/>
+        </p:nvSpPr>
+        <p:spPr>
+          <a:xfrm>
+            <a:off x="5395715" y="4742668"/>
+            <a:ext cx="509953" cy="338554"/>
+          </a:xfrm>
+          <a:prstGeom prst="rect">
+            <a:avLst/>
+          </a:prstGeom>
+          <a:noFill/>
+        </p:spPr>
+        <p:txBody>
+          <a:bodyPr wrap="square" rtlCol="0">
+            <a:spAutoFit/>
+          </a:bodyPr>
+          <a:lstStyle/>
+          <a:p>
+            <a:r>
+              <a:rPr lang="en-US" sz="1600" dirty="0" smtClean="0">
+                <a:latin typeface="Arial" panose="020B0604020202020204" pitchFamily="34" charset="0"/>
+                <a:cs typeface="Arial" panose="020B0604020202020204" pitchFamily="34" charset="0"/>
+              </a:rPr>
+              <a:t>9</a:t>
+            </a:r>
+            <a:endParaRPr lang="en-US" dirty="0">
+              <a:latin typeface="Arial" panose="020B0604020202020204" pitchFamily="34" charset="0"/>
+              <a:cs typeface="Arial" panose="020B0604020202020204" pitchFamily="34" charset="0"/>
+            </a:endParaRPr>
+          </a:p>
+        </p:txBody>
+      </p:sp>
+      <p:sp>
+        <p:nvSpPr>
+          <p:cNvPr id="55" name="TextBox 54"/>
+          <p:cNvSpPr txBox="1"/>
+          <p:nvPr/>
+        </p:nvSpPr>
+        <p:spPr>
+          <a:xfrm>
+            <a:off x="4365387" y="2275742"/>
+            <a:ext cx="1222131" cy="246221"/>
+          </a:xfrm>
+          <a:prstGeom prst="rect">
+            <a:avLst/>
+          </a:prstGeom>
+          <a:noFill/>
+        </p:spPr>
+        <p:txBody>
+          <a:bodyPr wrap="square" rtlCol="0">
+            <a:spAutoFit/>
+          </a:bodyPr>
+          <a:lstStyle/>
+          <a:p>
+            <a:r>
+              <a:rPr lang="en-US" sz="1000" dirty="0" smtClean="0">
+                <a:latin typeface="Arial" panose="020B0604020202020204" pitchFamily="34" charset="0"/>
+                <a:cs typeface="Arial" panose="020B0604020202020204" pitchFamily="34" charset="0"/>
+              </a:rPr>
+              <a:t>(</a:t>
+            </a:r>
+            <a:r>
+              <a:rPr lang="en-US" sz="1000" dirty="0" smtClean="0">
+                <a:latin typeface="Arial" panose="020B0604020202020204" pitchFamily="34" charset="0"/>
+                <a:cs typeface="Arial" panose="020B0604020202020204" pitchFamily="34" charset="0"/>
+              </a:rPr>
+              <a:t>74</a:t>
+            </a:r>
+            <a:r>
+              <a:rPr lang="en-US" sz="1000" dirty="0" smtClean="0">
+                <a:latin typeface="Arial" panose="020B0604020202020204" pitchFamily="34" charset="0"/>
+                <a:cs typeface="Arial" panose="020B0604020202020204" pitchFamily="34" charset="0"/>
+              </a:rPr>
+              <a:t>%)</a:t>
+            </a:r>
+            <a:endParaRPr lang="en-US" sz="1000" dirty="0">
+              <a:latin typeface="Arial" panose="020B0604020202020204" pitchFamily="34" charset="0"/>
+              <a:cs typeface="Arial" panose="020B0604020202020204" pitchFamily="34" charset="0"/>
+            </a:endParaRPr>
+          </a:p>
+        </p:txBody>
+      </p:sp>
+      <p:sp>
+        <p:nvSpPr>
+          <p:cNvPr id="56" name="TextBox 55"/>
+          <p:cNvSpPr txBox="1"/>
+          <p:nvPr/>
+        </p:nvSpPr>
+        <p:spPr>
+          <a:xfrm>
+            <a:off x="4642354" y="2454569"/>
+            <a:ext cx="1222131" cy="246221"/>
+          </a:xfrm>
+          <a:prstGeom prst="rect">
+            <a:avLst/>
+          </a:prstGeom>
+          <a:noFill/>
+        </p:spPr>
+        <p:txBody>
+          <a:bodyPr wrap="square" rtlCol="0">
+            <a:spAutoFit/>
+          </a:bodyPr>
+          <a:lstStyle/>
+          <a:p>
+            <a:r>
+              <a:rPr lang="en-US" sz="1000" dirty="0" smtClean="0">
+                <a:latin typeface="Arial" panose="020B0604020202020204" pitchFamily="34" charset="0"/>
+                <a:cs typeface="Arial" panose="020B0604020202020204" pitchFamily="34" charset="0"/>
+              </a:rPr>
+              <a:t>(</a:t>
+            </a:r>
+            <a:r>
+              <a:rPr lang="en-US" sz="1000" dirty="0" smtClean="0">
+                <a:latin typeface="Arial" panose="020B0604020202020204" pitchFamily="34" charset="0"/>
+                <a:cs typeface="Arial" panose="020B0604020202020204" pitchFamily="34" charset="0"/>
+              </a:rPr>
+              <a:t>22</a:t>
+            </a:r>
+            <a:r>
+              <a:rPr lang="en-US" sz="1000" dirty="0" smtClean="0">
+                <a:latin typeface="Arial" panose="020B0604020202020204" pitchFamily="34" charset="0"/>
+                <a:cs typeface="Arial" panose="020B0604020202020204" pitchFamily="34" charset="0"/>
+              </a:rPr>
+              <a:t>%)</a:t>
+            </a:r>
+            <a:endParaRPr lang="en-US" sz="1000" dirty="0">
+              <a:latin typeface="Arial" panose="020B0604020202020204" pitchFamily="34" charset="0"/>
+              <a:cs typeface="Arial" panose="020B0604020202020204" pitchFamily="34" charset="0"/>
+            </a:endParaRPr>
+          </a:p>
+        </p:txBody>
+      </p:sp>
+      <p:sp>
+        <p:nvSpPr>
+          <p:cNvPr id="57" name="TextBox 56"/>
+          <p:cNvSpPr txBox="1"/>
+          <p:nvPr/>
+        </p:nvSpPr>
+        <p:spPr>
+          <a:xfrm>
+            <a:off x="4382971" y="2631910"/>
+            <a:ext cx="1222131" cy="246221"/>
+          </a:xfrm>
+          <a:prstGeom prst="rect">
+            <a:avLst/>
+          </a:prstGeom>
+          <a:noFill/>
+        </p:spPr>
+        <p:txBody>
+          <a:bodyPr wrap="square" rtlCol="0">
+            <a:spAutoFit/>
+          </a:bodyPr>
+          <a:lstStyle/>
+          <a:p>
+            <a:r>
+              <a:rPr lang="en-US" sz="1000" dirty="0" smtClean="0">
+                <a:latin typeface="Arial" panose="020B0604020202020204" pitchFamily="34" charset="0"/>
+                <a:cs typeface="Arial" panose="020B0604020202020204" pitchFamily="34" charset="0"/>
+              </a:rPr>
+              <a:t>(4%)</a:t>
+            </a:r>
+            <a:endParaRPr lang="en-US" sz="1000" dirty="0">
+              <a:latin typeface="Arial" panose="020B0604020202020204" pitchFamily="34" charset="0"/>
+              <a:cs typeface="Arial" panose="020B0604020202020204" pitchFamily="34" charset="0"/>
+            </a:endParaRPr>
+          </a:p>
+        </p:txBody>
+      </p:sp>
+      <p:pic>
+        <p:nvPicPr>
+          <p:cNvPr id="61" name="Picture 60"/>
+          <p:cNvPicPr>
+            <a:picLocks noChangeAspect="1"/>
+          </p:cNvPicPr>
+          <p:nvPr/>
+        </p:nvPicPr>
+        <p:blipFill rotWithShape="1">
+          <a:blip r:embed="rId4" cstate="print">
+            <a:extLst>
+              <a:ext uri="{28A0092B-C50C-407E-A947-70E740481C1C}">
+                <a14:useLocalDpi xmlns:a14="http://schemas.microsoft.com/office/drawing/2010/main" val="0"/>
+              </a:ext>
+            </a:extLst>
+          </a:blip>
+          <a:srcRect t="4231" r="6640" b="3846"/>
+          <a:stretch/>
+        </p:blipFill>
+        <p:spPr>
+          <a:xfrm>
+            <a:off x="5143221" y="3154860"/>
+            <a:ext cx="1895150" cy="1332833"/>
+          </a:xfrm>
+          <a:prstGeom prst="rect">
+            <a:avLst/>
+          </a:prstGeom>
+          <a:ln>
+            <a:solidFill>
+              <a:schemeClr val="tx1"/>
+            </a:solidFill>
+          </a:ln>
+        </p:spPr>
+      </p:pic>
+      <p:cxnSp>
+        <p:nvCxnSpPr>
+          <p:cNvPr id="62" name="Straight Connector 61"/>
+          <p:cNvCxnSpPr/>
+          <p:nvPr/>
+        </p:nvCxnSpPr>
+        <p:spPr>
+          <a:xfrm flipV="1">
+            <a:off x="4990883" y="4815971"/>
+            <a:ext cx="178656" cy="63752"/>
+          </a:xfrm>
+          <a:prstGeom prst="line">
+            <a:avLst/>
+          </a:prstGeom>
+          <a:ln w="28575">
+            <a:solidFill>
+              <a:schemeClr val="tx1"/>
+            </a:solidFill>
+          </a:ln>
+        </p:spPr>
+        <p:style>
+          <a:lnRef idx="1">
+            <a:schemeClr val="accent1"/>
+          </a:lnRef>
+          <a:fillRef idx="0">
+            <a:schemeClr val="accent1"/>
+          </a:fillRef>
+          <a:effectRef idx="0">
+            <a:schemeClr val="accent1"/>
+          </a:effectRef>
+          <a:fontRef idx="minor">
+            <a:schemeClr val="tx1"/>
+          </a:fontRef>
+        </p:style>
+      </p:cxnSp>
+      <p:cxnSp>
+        <p:nvCxnSpPr>
+          <p:cNvPr id="67" name="Straight Connector 66"/>
+          <p:cNvCxnSpPr/>
+          <p:nvPr/>
+        </p:nvCxnSpPr>
+        <p:spPr>
+          <a:xfrm flipV="1">
+            <a:off x="5403473" y="5029473"/>
+            <a:ext cx="83649" cy="151826"/>
+          </a:xfrm>
+          <a:prstGeom prst="line">
+            <a:avLst/>
+          </a:prstGeom>
+          <a:ln w="28575">
+            <a:solidFill>
+              <a:schemeClr val="tx1"/>
+            </a:solidFill>
+          </a:ln>
+        </p:spPr>
+        <p:style>
+          <a:lnRef idx="1">
+            <a:schemeClr val="accent1"/>
+          </a:lnRef>
+          <a:fillRef idx="0">
+            <a:schemeClr val="accent1"/>
+          </a:fillRef>
+          <a:effectRef idx="0">
+            <a:schemeClr val="accent1"/>
+          </a:effectRef>
+          <a:fontRef idx="minor">
+            <a:schemeClr val="tx1"/>
+          </a:fontRef>
+        </p:style>
+      </p:cxnSp>
+      <p:sp>
+        <p:nvSpPr>
+          <p:cNvPr id="69" name="TextBox 68"/>
+          <p:cNvSpPr txBox="1"/>
+          <p:nvPr/>
+        </p:nvSpPr>
+        <p:spPr>
+          <a:xfrm>
+            <a:off x="7561685" y="4824763"/>
+            <a:ext cx="509953" cy="338554"/>
+          </a:xfrm>
+          <a:prstGeom prst="rect">
+            <a:avLst/>
+          </a:prstGeom>
+          <a:noFill/>
+        </p:spPr>
+        <p:txBody>
+          <a:bodyPr wrap="square" rtlCol="0">
+            <a:spAutoFit/>
+          </a:bodyPr>
+          <a:lstStyle/>
+          <a:p>
+            <a:r>
+              <a:rPr lang="en-US" sz="1600" dirty="0" smtClean="0">
+                <a:latin typeface="Arial" panose="020B0604020202020204" pitchFamily="34" charset="0"/>
+                <a:cs typeface="Arial" panose="020B0604020202020204" pitchFamily="34" charset="0"/>
+              </a:rPr>
+              <a:t>11</a:t>
+            </a:r>
+            <a:endParaRPr lang="en-US" dirty="0">
+              <a:latin typeface="Arial" panose="020B0604020202020204" pitchFamily="34" charset="0"/>
+              <a:cs typeface="Arial" panose="020B0604020202020204" pitchFamily="34" charset="0"/>
+            </a:endParaRPr>
+          </a:p>
+        </p:txBody>
+      </p:sp>
+      <p:cxnSp>
+        <p:nvCxnSpPr>
+          <p:cNvPr id="70" name="Straight Connector 69"/>
+          <p:cNvCxnSpPr/>
+          <p:nvPr/>
+        </p:nvCxnSpPr>
+        <p:spPr>
+          <a:xfrm flipV="1">
+            <a:off x="5881783" y="5155359"/>
+            <a:ext cx="83649" cy="151826"/>
+          </a:xfrm>
+          <a:prstGeom prst="line">
+            <a:avLst/>
+          </a:prstGeom>
+          <a:ln w="28575">
+            <a:solidFill>
+              <a:schemeClr val="tx1"/>
+            </a:solidFill>
+          </a:ln>
+        </p:spPr>
+        <p:style>
+          <a:lnRef idx="1">
+            <a:schemeClr val="accent1"/>
+          </a:lnRef>
+          <a:fillRef idx="0">
+            <a:schemeClr val="accent1"/>
+          </a:fillRef>
+          <a:effectRef idx="0">
+            <a:schemeClr val="accent1"/>
+          </a:effectRef>
+          <a:fontRef idx="minor">
+            <a:schemeClr val="tx1"/>
+          </a:fontRef>
+        </p:style>
+      </p:cxnSp>
+      <p:sp>
+        <p:nvSpPr>
+          <p:cNvPr id="72" name="TextBox 71"/>
+          <p:cNvSpPr txBox="1"/>
+          <p:nvPr/>
+        </p:nvSpPr>
+        <p:spPr>
+          <a:xfrm>
+            <a:off x="7584923" y="4577102"/>
+            <a:ext cx="509953" cy="338554"/>
+          </a:xfrm>
+          <a:prstGeom prst="rect">
+            <a:avLst/>
+          </a:prstGeom>
+          <a:noFill/>
+        </p:spPr>
+        <p:txBody>
+          <a:bodyPr wrap="square" rtlCol="0">
+            <a:spAutoFit/>
+          </a:bodyPr>
+          <a:lstStyle/>
+          <a:p>
+            <a:r>
+              <a:rPr lang="en-US" sz="1600" dirty="0" smtClean="0">
+                <a:latin typeface="Arial" panose="020B0604020202020204" pitchFamily="34" charset="0"/>
+                <a:cs typeface="Arial" panose="020B0604020202020204" pitchFamily="34" charset="0"/>
+              </a:rPr>
+              <a:t>15</a:t>
+            </a:r>
+            <a:endParaRPr lang="en-US" dirty="0">
+              <a:latin typeface="Arial" panose="020B0604020202020204" pitchFamily="34" charset="0"/>
+              <a:cs typeface="Arial" panose="020B0604020202020204" pitchFamily="34" charset="0"/>
+            </a:endParaRPr>
+          </a:p>
+        </p:txBody>
+      </p:sp>
+    </p:spTree>
+    <p:extLst>
+      <p:ext uri="{BB962C8B-B14F-4D97-AF65-F5344CB8AC3E}">
+        <p14:creationId xmlns:p14="http://schemas.microsoft.com/office/powerpoint/2010/main" val="1432862884"/>
+      </p:ext>
+    </p:extLst>
+  </p:cSld>
+  <p:clrMapOvr>
+    <a:masterClrMapping/>
+  </p:clrMapOvr>
+</p:sld>
+</file>
+
+<file path=ppt/slides/slide8.xml><?xml version="1.0" encoding="utf-8"?>
+<p:sld xmlns:a="http://schemas.openxmlformats.org/drawingml/2006/main" xmlns:r="http://schemas.openxmlformats.org/officeDocument/2006/relationships" xmlns:p="http://schemas.openxmlformats.org/presentationml/2006/main">
+  <p:cSld>
+    <p:spTree>
+      <p:nvGrpSpPr>
+        <p:cNvPr id="1" name=""/>
+        <p:cNvGrpSpPr/>
+        <p:nvPr/>
+      </p:nvGrpSpPr>
+      <p:grpSpPr>
+        <a:xfrm>
+          <a:off x="0" y="0"/>
+          <a:ext cx="0" cy="0"/>
+          <a:chOff x="0" y="0"/>
+          <a:chExt cx="0" cy="0"/>
+        </a:xfrm>
+      </p:grpSpPr>
+      <p:pic>
+        <p:nvPicPr>
+          <p:cNvPr id="58" name="Picture 57"/>
+          <p:cNvPicPr>
+            <a:picLocks noChangeAspect="1"/>
+          </p:cNvPicPr>
+          <p:nvPr/>
+        </p:nvPicPr>
+        <p:blipFill>
+          <a:blip r:embed="rId3" cstate="print">
+            <a:extLst>
+              <a:ext uri="{28A0092B-C50C-407E-A947-70E740481C1C}">
+                <a14:useLocalDpi xmlns:a14="http://schemas.microsoft.com/office/drawing/2010/main" val="0"/>
+              </a:ext>
+            </a:extLst>
+          </a:blip>
+          <a:stretch>
+            <a:fillRect/>
+          </a:stretch>
+        </p:blipFill>
+        <p:spPr>
+          <a:xfrm>
+            <a:off x="3446318" y="0"/>
+            <a:ext cx="5299364" cy="6858000"/>
+          </a:xfrm>
+          <a:prstGeom prst="rect">
+            <a:avLst/>
+          </a:prstGeom>
+        </p:spPr>
+      </p:pic>
+      <p:sp>
+        <p:nvSpPr>
+          <p:cNvPr id="6" name="Oval 5"/>
+          <p:cNvSpPr/>
+          <p:nvPr/>
+        </p:nvSpPr>
+        <p:spPr>
+          <a:xfrm>
+            <a:off x="4901561" y="3997562"/>
+            <a:ext cx="228600" cy="228600"/>
+          </a:xfrm>
+          <a:prstGeom prst="ellipse">
+            <a:avLst/>
+          </a:prstGeom>
+          <a:solidFill>
+            <a:schemeClr val="bg1"/>
+          </a:solidFill>
+          <a:ln>
+            <a:solidFill>
+              <a:schemeClr val="tx1"/>
+            </a:solidFill>
+          </a:ln>
+        </p:spPr>
+        <p:style>
+          <a:lnRef idx="2">
+            <a:schemeClr val="accent1">
+              <a:shade val="50000"/>
+            </a:schemeClr>
+          </a:lnRef>
+          <a:fillRef idx="1">
+            <a:schemeClr val="accent1"/>
+          </a:fillRef>
+          <a:effectRef idx="0">
+            <a:schemeClr val="accent1"/>
+          </a:effectRef>
+          <a:fontRef idx="minor">
+            <a:schemeClr val="lt1"/>
+          </a:fontRef>
+        </p:style>
+        <p:txBody>
+          <a:bodyPr rtlCol="0" anchor="ctr"/>
+          <a:lstStyle/>
+          <a:p>
+            <a:pPr algn="ctr"/>
+            <a:r>
+              <a:rPr lang="en-US" sz="1600" dirty="0" smtClean="0">
+                <a:solidFill>
+                  <a:schemeClr val="tx1"/>
+                </a:solidFill>
+                <a:latin typeface="Arial" panose="020B0604020202020204" pitchFamily="34" charset="0"/>
+                <a:cs typeface="Arial" panose="020B0604020202020204" pitchFamily="34" charset="0"/>
+              </a:rPr>
+              <a:t>1</a:t>
+            </a:r>
+            <a:endParaRPr lang="en-US" sz="1600" dirty="0">
+              <a:solidFill>
+                <a:schemeClr val="tx1"/>
+              </a:solidFill>
+              <a:latin typeface="Arial" panose="020B0604020202020204" pitchFamily="34" charset="0"/>
+              <a:cs typeface="Arial" panose="020B0604020202020204" pitchFamily="34" charset="0"/>
+            </a:endParaRPr>
+          </a:p>
+        </p:txBody>
+      </p:sp>
+      <p:sp>
+        <p:nvSpPr>
+          <p:cNvPr id="9" name="Oval 8"/>
+          <p:cNvSpPr/>
+          <p:nvPr/>
+        </p:nvSpPr>
+        <p:spPr>
+          <a:xfrm>
+            <a:off x="7663966" y="4621808"/>
+            <a:ext cx="228600" cy="228600"/>
+          </a:xfrm>
+          <a:prstGeom prst="ellipse">
+            <a:avLst/>
+          </a:prstGeom>
+          <a:solidFill>
+            <a:schemeClr val="bg1"/>
+          </a:solidFill>
+          <a:ln>
+            <a:solidFill>
+              <a:schemeClr val="tx1"/>
+            </a:solidFill>
+          </a:ln>
+        </p:spPr>
+        <p:style>
+          <a:lnRef idx="2">
+            <a:schemeClr val="accent1">
+              <a:shade val="50000"/>
+            </a:schemeClr>
+          </a:lnRef>
+          <a:fillRef idx="1">
+            <a:schemeClr val="accent1"/>
+          </a:fillRef>
+          <a:effectRef idx="0">
+            <a:schemeClr val="accent1"/>
+          </a:effectRef>
+          <a:fontRef idx="minor">
+            <a:schemeClr val="lt1"/>
+          </a:fontRef>
+        </p:style>
+        <p:txBody>
+          <a:bodyPr rtlCol="0" anchor="ctr"/>
+          <a:lstStyle/>
+          <a:p>
+            <a:pPr algn="ctr"/>
+            <a:endParaRPr lang="en-US" sz="1600" dirty="0">
+              <a:solidFill>
+                <a:schemeClr val="tx1"/>
+              </a:solidFill>
+              <a:latin typeface="Arial" panose="020B0604020202020204" pitchFamily="34" charset="0"/>
+              <a:cs typeface="Arial" panose="020B0604020202020204" pitchFamily="34" charset="0"/>
+            </a:endParaRPr>
+          </a:p>
+        </p:txBody>
+      </p:sp>
+      <p:cxnSp>
+        <p:nvCxnSpPr>
+          <p:cNvPr id="10" name="Straight Connector 9"/>
+          <p:cNvCxnSpPr>
+            <a:stCxn id="9" idx="2"/>
+          </p:cNvCxnSpPr>
+          <p:nvPr/>
+        </p:nvCxnSpPr>
+        <p:spPr>
+          <a:xfrm flipH="1" flipV="1">
+            <a:off x="7280031" y="4617406"/>
+            <a:ext cx="383935" cy="118702"/>
+          </a:xfrm>
+          <a:prstGeom prst="line">
+            <a:avLst/>
+          </a:prstGeom>
+          <a:ln w="28575">
+            <a:solidFill>
+              <a:schemeClr val="tx1"/>
+            </a:solidFill>
+          </a:ln>
+        </p:spPr>
+        <p:style>
+          <a:lnRef idx="1">
+            <a:schemeClr val="accent1"/>
+          </a:lnRef>
+          <a:fillRef idx="0">
+            <a:schemeClr val="accent1"/>
+          </a:fillRef>
+          <a:effectRef idx="0">
+            <a:schemeClr val="accent1"/>
+          </a:effectRef>
+          <a:fontRef idx="minor">
+            <a:schemeClr val="tx1"/>
+          </a:fontRef>
+        </p:style>
+      </p:cxnSp>
+      <p:sp>
+        <p:nvSpPr>
+          <p:cNvPr id="11" name="Oval 10"/>
+          <p:cNvSpPr/>
+          <p:nvPr/>
+        </p:nvSpPr>
+        <p:spPr>
+          <a:xfrm>
+            <a:off x="7488116" y="5105386"/>
+            <a:ext cx="228600" cy="228600"/>
+          </a:xfrm>
+          <a:prstGeom prst="ellipse">
+            <a:avLst/>
+          </a:prstGeom>
+          <a:solidFill>
+            <a:schemeClr val="bg1"/>
+          </a:solidFill>
+          <a:ln>
+            <a:solidFill>
+              <a:schemeClr val="tx1"/>
+            </a:solidFill>
+          </a:ln>
+        </p:spPr>
+        <p:style>
+          <a:lnRef idx="2">
+            <a:schemeClr val="accent1">
+              <a:shade val="50000"/>
+            </a:schemeClr>
+          </a:lnRef>
+          <a:fillRef idx="1">
+            <a:schemeClr val="accent1"/>
+          </a:fillRef>
+          <a:effectRef idx="0">
+            <a:schemeClr val="accent1"/>
+          </a:effectRef>
+          <a:fontRef idx="minor">
+            <a:schemeClr val="lt1"/>
+          </a:fontRef>
+        </p:style>
+        <p:txBody>
+          <a:bodyPr rtlCol="0" anchor="ctr"/>
+          <a:lstStyle/>
+          <a:p>
+            <a:pPr algn="ctr"/>
+            <a:r>
+              <a:rPr lang="en-US" sz="1600" dirty="0" smtClean="0">
+                <a:solidFill>
+                  <a:schemeClr val="tx1"/>
+                </a:solidFill>
+                <a:latin typeface="Arial" panose="020B0604020202020204" pitchFamily="34" charset="0"/>
+                <a:cs typeface="Arial" panose="020B0604020202020204" pitchFamily="34" charset="0"/>
+              </a:rPr>
+              <a:t>3</a:t>
+            </a:r>
+            <a:endParaRPr lang="en-US" sz="1600" dirty="0">
+              <a:solidFill>
+                <a:schemeClr val="tx1"/>
+              </a:solidFill>
+              <a:latin typeface="Arial" panose="020B0604020202020204" pitchFamily="34" charset="0"/>
+              <a:cs typeface="Arial" panose="020B0604020202020204" pitchFamily="34" charset="0"/>
+            </a:endParaRPr>
+          </a:p>
+        </p:txBody>
+      </p:sp>
+      <p:cxnSp>
+        <p:nvCxnSpPr>
+          <p:cNvPr id="12" name="Straight Connector 11"/>
+          <p:cNvCxnSpPr>
+            <a:stCxn id="11" idx="2"/>
+          </p:cNvCxnSpPr>
+          <p:nvPr/>
+        </p:nvCxnSpPr>
+        <p:spPr>
+          <a:xfrm flipH="1" flipV="1">
+            <a:off x="7139349" y="5105386"/>
+            <a:ext cx="348767" cy="114300"/>
+          </a:xfrm>
+          <a:prstGeom prst="line">
+            <a:avLst/>
+          </a:prstGeom>
+          <a:ln w="28575">
+            <a:solidFill>
+              <a:schemeClr val="tx1"/>
+            </a:solidFill>
+          </a:ln>
+        </p:spPr>
+        <p:style>
+          <a:lnRef idx="1">
+            <a:schemeClr val="accent1"/>
+          </a:lnRef>
+          <a:fillRef idx="0">
+            <a:schemeClr val="accent1"/>
+          </a:fillRef>
+          <a:effectRef idx="0">
+            <a:schemeClr val="accent1"/>
+          </a:effectRef>
+          <a:fontRef idx="minor">
+            <a:schemeClr val="tx1"/>
+          </a:fontRef>
+        </p:style>
+      </p:cxnSp>
+      <p:sp>
+        <p:nvSpPr>
+          <p:cNvPr id="13" name="Oval 12"/>
+          <p:cNvSpPr/>
+          <p:nvPr/>
+        </p:nvSpPr>
+        <p:spPr>
+          <a:xfrm>
+            <a:off x="6353912" y="5650512"/>
+            <a:ext cx="228600" cy="228600"/>
+          </a:xfrm>
+          <a:prstGeom prst="ellipse">
+            <a:avLst/>
+          </a:prstGeom>
+          <a:solidFill>
+            <a:schemeClr val="bg1"/>
+          </a:solidFill>
+          <a:ln>
+            <a:solidFill>
+              <a:schemeClr val="tx1"/>
+            </a:solidFill>
+          </a:ln>
+        </p:spPr>
+        <p:style>
+          <a:lnRef idx="2">
+            <a:schemeClr val="accent1">
+              <a:shade val="50000"/>
+            </a:schemeClr>
+          </a:lnRef>
+          <a:fillRef idx="1">
+            <a:schemeClr val="accent1"/>
+          </a:fillRef>
+          <a:effectRef idx="0">
+            <a:schemeClr val="accent1"/>
+          </a:effectRef>
+          <a:fontRef idx="minor">
+            <a:schemeClr val="lt1"/>
+          </a:fontRef>
+        </p:style>
+        <p:txBody>
+          <a:bodyPr rtlCol="0" anchor="ctr"/>
+          <a:lstStyle/>
+          <a:p>
+            <a:pPr algn="ctr"/>
+            <a:r>
+              <a:rPr lang="en-US" sz="1600" dirty="0">
+                <a:solidFill>
+                  <a:schemeClr val="tx1"/>
+                </a:solidFill>
+                <a:latin typeface="Arial" panose="020B0604020202020204" pitchFamily="34" charset="0"/>
+                <a:cs typeface="Arial" panose="020B0604020202020204" pitchFamily="34" charset="0"/>
+              </a:rPr>
+              <a:t>5</a:t>
+            </a:r>
+            <a:endParaRPr lang="en-US" sz="1600" dirty="0">
+              <a:solidFill>
+                <a:schemeClr val="tx1"/>
+              </a:solidFill>
+              <a:latin typeface="Arial" panose="020B0604020202020204" pitchFamily="34" charset="0"/>
+              <a:cs typeface="Arial" panose="020B0604020202020204" pitchFamily="34" charset="0"/>
+            </a:endParaRPr>
+          </a:p>
+        </p:txBody>
+      </p:sp>
+      <p:cxnSp>
+        <p:nvCxnSpPr>
+          <p:cNvPr id="14" name="Straight Connector 13"/>
+          <p:cNvCxnSpPr/>
+          <p:nvPr/>
+        </p:nvCxnSpPr>
+        <p:spPr>
+          <a:xfrm flipV="1">
+            <a:off x="6450624" y="5219686"/>
+            <a:ext cx="131888" cy="430830"/>
+          </a:xfrm>
+          <a:prstGeom prst="line">
+            <a:avLst/>
+          </a:prstGeom>
+          <a:ln w="28575">
+            <a:solidFill>
+              <a:schemeClr val="tx1"/>
+            </a:solidFill>
+          </a:ln>
+        </p:spPr>
+        <p:style>
+          <a:lnRef idx="1">
+            <a:schemeClr val="accent1"/>
+          </a:lnRef>
+          <a:fillRef idx="0">
+            <a:schemeClr val="accent1"/>
+          </a:fillRef>
+          <a:effectRef idx="0">
+            <a:schemeClr val="accent1"/>
+          </a:effectRef>
+          <a:fontRef idx="minor">
+            <a:schemeClr val="tx1"/>
+          </a:fontRef>
+        </p:style>
+      </p:cxnSp>
+      <p:sp>
+        <p:nvSpPr>
+          <p:cNvPr id="15" name="Oval 14"/>
+          <p:cNvSpPr/>
+          <p:nvPr/>
+        </p:nvSpPr>
+        <p:spPr>
+          <a:xfrm>
+            <a:off x="7681552" y="3883262"/>
+            <a:ext cx="228600" cy="228600"/>
+          </a:xfrm>
+          <a:prstGeom prst="ellipse">
+            <a:avLst/>
+          </a:prstGeom>
+          <a:solidFill>
+            <a:schemeClr val="bg1"/>
+          </a:solidFill>
+          <a:ln>
+            <a:solidFill>
+              <a:schemeClr val="tx1"/>
+            </a:solidFill>
+          </a:ln>
+        </p:spPr>
+        <p:style>
+          <a:lnRef idx="2">
+            <a:schemeClr val="accent1">
+              <a:shade val="50000"/>
+            </a:schemeClr>
+          </a:lnRef>
+          <a:fillRef idx="1">
+            <a:schemeClr val="accent1"/>
+          </a:fillRef>
+          <a:effectRef idx="0">
+            <a:schemeClr val="accent1"/>
+          </a:effectRef>
+          <a:fontRef idx="minor">
+            <a:schemeClr val="lt1"/>
+          </a:fontRef>
+        </p:style>
+        <p:txBody>
+          <a:bodyPr rtlCol="0" anchor="ctr"/>
+          <a:lstStyle/>
+          <a:p>
+            <a:pPr algn="ctr"/>
+            <a:r>
+              <a:rPr lang="en-US" sz="1600" dirty="0" smtClean="0">
+                <a:solidFill>
+                  <a:schemeClr val="tx1"/>
+                </a:solidFill>
+                <a:latin typeface="Arial" panose="020B0604020202020204" pitchFamily="34" charset="0"/>
+                <a:cs typeface="Arial" panose="020B0604020202020204" pitchFamily="34" charset="0"/>
+              </a:rPr>
+              <a:t>6</a:t>
+            </a:r>
+            <a:endParaRPr lang="en-US" sz="1600" dirty="0">
+              <a:solidFill>
+                <a:schemeClr val="tx1"/>
+              </a:solidFill>
+              <a:latin typeface="Arial" panose="020B0604020202020204" pitchFamily="34" charset="0"/>
+              <a:cs typeface="Arial" panose="020B0604020202020204" pitchFamily="34" charset="0"/>
+            </a:endParaRPr>
+          </a:p>
+        </p:txBody>
+      </p:sp>
+      <p:cxnSp>
+        <p:nvCxnSpPr>
+          <p:cNvPr id="16" name="Straight Connector 15"/>
+          <p:cNvCxnSpPr>
+            <a:stCxn id="15" idx="2"/>
+          </p:cNvCxnSpPr>
+          <p:nvPr/>
+        </p:nvCxnSpPr>
+        <p:spPr>
+          <a:xfrm flipH="1">
+            <a:off x="7447082" y="3997562"/>
+            <a:ext cx="234470" cy="45064"/>
+          </a:xfrm>
+          <a:prstGeom prst="line">
+            <a:avLst/>
+          </a:prstGeom>
+          <a:ln w="28575">
+            <a:solidFill>
+              <a:schemeClr val="tx1"/>
+            </a:solidFill>
+          </a:ln>
+        </p:spPr>
+        <p:style>
+          <a:lnRef idx="1">
+            <a:schemeClr val="accent1"/>
+          </a:lnRef>
+          <a:fillRef idx="0">
+            <a:schemeClr val="accent1"/>
+          </a:fillRef>
+          <a:effectRef idx="0">
+            <a:schemeClr val="accent1"/>
+          </a:effectRef>
+          <a:fontRef idx="minor">
+            <a:schemeClr val="tx1"/>
+          </a:fontRef>
+        </p:style>
+      </p:cxnSp>
+      <p:sp>
+        <p:nvSpPr>
+          <p:cNvPr id="17" name="Oval 16"/>
+          <p:cNvSpPr/>
+          <p:nvPr/>
+        </p:nvSpPr>
+        <p:spPr>
+          <a:xfrm>
+            <a:off x="4700960" y="3452436"/>
+            <a:ext cx="228600" cy="228600"/>
+          </a:xfrm>
+          <a:prstGeom prst="ellipse">
+            <a:avLst/>
+          </a:prstGeom>
+          <a:solidFill>
+            <a:schemeClr val="bg1"/>
+          </a:solidFill>
+          <a:ln>
+            <a:solidFill>
+              <a:schemeClr val="tx1"/>
+            </a:solidFill>
+          </a:ln>
+        </p:spPr>
+        <p:style>
+          <a:lnRef idx="2">
+            <a:schemeClr val="accent1">
+              <a:shade val="50000"/>
+            </a:schemeClr>
+          </a:lnRef>
+          <a:fillRef idx="1">
+            <a:schemeClr val="accent1"/>
+          </a:fillRef>
+          <a:effectRef idx="0">
+            <a:schemeClr val="accent1"/>
+          </a:effectRef>
+          <a:fontRef idx="minor">
+            <a:schemeClr val="lt1"/>
+          </a:fontRef>
+        </p:style>
+        <p:txBody>
+          <a:bodyPr rtlCol="0" anchor="ctr"/>
+          <a:lstStyle/>
+          <a:p>
+            <a:pPr algn="ctr"/>
+            <a:r>
+              <a:rPr lang="en-US" sz="1600" dirty="0">
+                <a:solidFill>
+                  <a:schemeClr val="tx1"/>
+                </a:solidFill>
+                <a:latin typeface="Arial" panose="020B0604020202020204" pitchFamily="34" charset="0"/>
+                <a:cs typeface="Arial" panose="020B0604020202020204" pitchFamily="34" charset="0"/>
+              </a:rPr>
+              <a:t>2</a:t>
+            </a:r>
+            <a:endParaRPr lang="en-US" sz="1600" dirty="0">
+              <a:solidFill>
+                <a:schemeClr val="tx1"/>
+              </a:solidFill>
+              <a:latin typeface="Arial" panose="020B0604020202020204" pitchFamily="34" charset="0"/>
+              <a:cs typeface="Arial" panose="020B0604020202020204" pitchFamily="34" charset="0"/>
+            </a:endParaRPr>
+          </a:p>
+        </p:txBody>
+      </p:sp>
+      <p:sp>
+        <p:nvSpPr>
+          <p:cNvPr id="18" name="Oval 17"/>
+          <p:cNvSpPr/>
+          <p:nvPr/>
+        </p:nvSpPr>
+        <p:spPr>
+          <a:xfrm>
+            <a:off x="6629401" y="5732576"/>
+            <a:ext cx="228600" cy="228600"/>
+          </a:xfrm>
+          <a:prstGeom prst="ellipse">
+            <a:avLst/>
+          </a:prstGeom>
+          <a:solidFill>
+            <a:schemeClr val="bg1"/>
+          </a:solidFill>
+          <a:ln>
+            <a:solidFill>
+              <a:schemeClr val="tx1"/>
+            </a:solidFill>
+          </a:ln>
+        </p:spPr>
+        <p:style>
+          <a:lnRef idx="2">
+            <a:schemeClr val="accent1">
+              <a:shade val="50000"/>
+            </a:schemeClr>
+          </a:lnRef>
+          <a:fillRef idx="1">
+            <a:schemeClr val="accent1"/>
+          </a:fillRef>
+          <a:effectRef idx="0">
+            <a:schemeClr val="accent1"/>
+          </a:effectRef>
+          <a:fontRef idx="minor">
+            <a:schemeClr val="lt1"/>
+          </a:fontRef>
+        </p:style>
+        <p:txBody>
+          <a:bodyPr rtlCol="0" anchor="ctr"/>
+          <a:lstStyle/>
+          <a:p>
+            <a:pPr algn="ctr"/>
+            <a:endParaRPr lang="en-US" sz="1600" dirty="0">
+              <a:solidFill>
+                <a:schemeClr val="tx1"/>
+              </a:solidFill>
+              <a:latin typeface="Arial" panose="020B0604020202020204" pitchFamily="34" charset="0"/>
+              <a:cs typeface="Arial" panose="020B0604020202020204" pitchFamily="34" charset="0"/>
+            </a:endParaRPr>
+          </a:p>
+        </p:txBody>
+      </p:sp>
+      <p:cxnSp>
+        <p:nvCxnSpPr>
+          <p:cNvPr id="19" name="Straight Connector 18"/>
+          <p:cNvCxnSpPr/>
+          <p:nvPr/>
+        </p:nvCxnSpPr>
+        <p:spPr>
+          <a:xfrm flipV="1">
+            <a:off x="6726113" y="5386739"/>
+            <a:ext cx="52756" cy="345841"/>
+          </a:xfrm>
+          <a:prstGeom prst="line">
+            <a:avLst/>
+          </a:prstGeom>
+          <a:ln w="28575">
+            <a:solidFill>
+              <a:schemeClr val="tx1"/>
+            </a:solidFill>
+          </a:ln>
+        </p:spPr>
+        <p:style>
+          <a:lnRef idx="1">
+            <a:schemeClr val="accent1"/>
+          </a:lnRef>
+          <a:fillRef idx="0">
+            <a:schemeClr val="accent1"/>
+          </a:fillRef>
+          <a:effectRef idx="0">
+            <a:schemeClr val="accent1"/>
+          </a:effectRef>
+          <a:fontRef idx="minor">
+            <a:schemeClr val="tx1"/>
+          </a:fontRef>
+        </p:style>
+      </p:cxnSp>
+      <p:sp>
+        <p:nvSpPr>
+          <p:cNvPr id="20" name="Oval 19"/>
+          <p:cNvSpPr/>
+          <p:nvPr/>
+        </p:nvSpPr>
+        <p:spPr>
+          <a:xfrm>
+            <a:off x="7640516" y="4879723"/>
+            <a:ext cx="228600" cy="228600"/>
+          </a:xfrm>
+          <a:prstGeom prst="ellipse">
+            <a:avLst/>
+          </a:prstGeom>
+          <a:solidFill>
+            <a:schemeClr val="bg1"/>
+          </a:solidFill>
+          <a:ln>
+            <a:solidFill>
+              <a:schemeClr val="tx1"/>
+            </a:solidFill>
+          </a:ln>
+        </p:spPr>
+        <p:style>
+          <a:lnRef idx="2">
+            <a:schemeClr val="accent1">
+              <a:shade val="50000"/>
+            </a:schemeClr>
+          </a:lnRef>
+          <a:fillRef idx="1">
+            <a:schemeClr val="accent1"/>
+          </a:fillRef>
+          <a:effectRef idx="0">
+            <a:schemeClr val="accent1"/>
+          </a:effectRef>
+          <a:fontRef idx="minor">
+            <a:schemeClr val="lt1"/>
+          </a:fontRef>
+        </p:style>
+        <p:txBody>
+          <a:bodyPr rtlCol="0" anchor="ctr"/>
+          <a:lstStyle/>
+          <a:p>
+            <a:pPr algn="ctr"/>
+            <a:endParaRPr lang="en-US" sz="1600" dirty="0">
+              <a:solidFill>
+                <a:schemeClr val="tx1"/>
+              </a:solidFill>
+              <a:latin typeface="Arial" panose="020B0604020202020204" pitchFamily="34" charset="0"/>
+              <a:cs typeface="Arial" panose="020B0604020202020204" pitchFamily="34" charset="0"/>
+            </a:endParaRPr>
+          </a:p>
+        </p:txBody>
+      </p:sp>
+      <p:cxnSp>
+        <p:nvCxnSpPr>
+          <p:cNvPr id="21" name="Straight Connector 20"/>
+          <p:cNvCxnSpPr>
+            <a:stCxn id="20" idx="2"/>
+          </p:cNvCxnSpPr>
+          <p:nvPr/>
+        </p:nvCxnSpPr>
+        <p:spPr>
+          <a:xfrm flipH="1" flipV="1">
+            <a:off x="7291749" y="4879723"/>
+            <a:ext cx="348767" cy="114300"/>
+          </a:xfrm>
+          <a:prstGeom prst="line">
+            <a:avLst/>
+          </a:prstGeom>
+          <a:ln w="28575">
+            <a:solidFill>
+              <a:schemeClr val="tx1"/>
+            </a:solidFill>
+          </a:ln>
+        </p:spPr>
+        <p:style>
+          <a:lnRef idx="1">
+            <a:schemeClr val="accent1"/>
+          </a:lnRef>
+          <a:fillRef idx="0">
+            <a:schemeClr val="accent1"/>
+          </a:fillRef>
+          <a:effectRef idx="0">
+            <a:schemeClr val="accent1"/>
+          </a:effectRef>
+          <a:fontRef idx="minor">
+            <a:schemeClr val="tx1"/>
+          </a:fontRef>
+        </p:style>
+      </p:cxnSp>
+      <p:sp>
+        <p:nvSpPr>
+          <p:cNvPr id="22" name="Oval 21"/>
+          <p:cNvSpPr/>
+          <p:nvPr/>
+        </p:nvSpPr>
+        <p:spPr>
+          <a:xfrm>
+            <a:off x="5152417" y="4668690"/>
+            <a:ext cx="228600" cy="228600"/>
+          </a:xfrm>
+          <a:prstGeom prst="ellipse">
+            <a:avLst/>
+          </a:prstGeom>
+          <a:solidFill>
+            <a:schemeClr val="bg1"/>
+          </a:solidFill>
+          <a:ln>
+            <a:solidFill>
+              <a:schemeClr val="tx1"/>
+            </a:solidFill>
+          </a:ln>
+        </p:spPr>
+        <p:style>
+          <a:lnRef idx="2">
+            <a:schemeClr val="accent1">
+              <a:shade val="50000"/>
+            </a:schemeClr>
+          </a:lnRef>
+          <a:fillRef idx="1">
+            <a:schemeClr val="accent1"/>
+          </a:fillRef>
+          <a:effectRef idx="0">
+            <a:schemeClr val="accent1"/>
+          </a:effectRef>
+          <a:fontRef idx="minor">
+            <a:schemeClr val="lt1"/>
+          </a:fontRef>
+        </p:style>
+        <p:txBody>
+          <a:bodyPr rtlCol="0" anchor="ctr"/>
+          <a:lstStyle/>
+          <a:p>
+            <a:pPr algn="ctr"/>
+            <a:endParaRPr lang="en-US" sz="1600" dirty="0">
+              <a:solidFill>
+                <a:schemeClr val="tx1"/>
+              </a:solidFill>
+              <a:latin typeface="Arial" panose="020B0604020202020204" pitchFamily="34" charset="0"/>
+              <a:cs typeface="Arial" panose="020B0604020202020204" pitchFamily="34" charset="0"/>
+            </a:endParaRPr>
+          </a:p>
+        </p:txBody>
+      </p:sp>
+      <p:sp>
+        <p:nvSpPr>
+          <p:cNvPr id="23" name="TextBox 22"/>
+          <p:cNvSpPr txBox="1"/>
+          <p:nvPr/>
+        </p:nvSpPr>
+        <p:spPr>
+          <a:xfrm>
+            <a:off x="5013092" y="4632804"/>
+            <a:ext cx="509953" cy="338554"/>
+          </a:xfrm>
+          <a:prstGeom prst="rect">
+            <a:avLst/>
+          </a:prstGeom>
+          <a:noFill/>
+        </p:spPr>
+        <p:txBody>
+          <a:bodyPr wrap="square" rtlCol="0">
+            <a:spAutoFit/>
+          </a:bodyPr>
+          <a:lstStyle/>
+          <a:p>
+            <a:pPr algn="ctr"/>
+            <a:r>
+              <a:rPr lang="en-US" sz="1600" dirty="0" smtClean="0">
+                <a:latin typeface="Arial" panose="020B0604020202020204" pitchFamily="34" charset="0"/>
+                <a:cs typeface="Arial" panose="020B0604020202020204" pitchFamily="34" charset="0"/>
+              </a:rPr>
+              <a:t>4</a:t>
+            </a:r>
+            <a:endParaRPr lang="en-US" dirty="0">
+              <a:latin typeface="Arial" panose="020B0604020202020204" pitchFamily="34" charset="0"/>
+              <a:cs typeface="Arial" panose="020B0604020202020204" pitchFamily="34" charset="0"/>
+            </a:endParaRPr>
+          </a:p>
+        </p:txBody>
+      </p:sp>
+      <p:sp>
+        <p:nvSpPr>
+          <p:cNvPr id="24" name="Oval 23"/>
+          <p:cNvSpPr/>
+          <p:nvPr/>
+        </p:nvSpPr>
+        <p:spPr>
+          <a:xfrm>
+            <a:off x="7218482" y="5272439"/>
+            <a:ext cx="228600" cy="228600"/>
+          </a:xfrm>
+          <a:prstGeom prst="ellipse">
+            <a:avLst/>
+          </a:prstGeom>
+          <a:solidFill>
+            <a:schemeClr val="bg1"/>
+          </a:solidFill>
+          <a:ln>
+            <a:solidFill>
+              <a:schemeClr val="tx1"/>
+            </a:solidFill>
+          </a:ln>
+        </p:spPr>
+        <p:style>
+          <a:lnRef idx="2">
+            <a:schemeClr val="accent1">
+              <a:shade val="50000"/>
+            </a:schemeClr>
+          </a:lnRef>
+          <a:fillRef idx="1">
+            <a:schemeClr val="accent1"/>
+          </a:fillRef>
+          <a:effectRef idx="0">
+            <a:schemeClr val="accent1"/>
+          </a:effectRef>
+          <a:fontRef idx="minor">
+            <a:schemeClr val="lt1"/>
+          </a:fontRef>
+        </p:style>
+        <p:txBody>
+          <a:bodyPr rtlCol="0" anchor="ctr"/>
+          <a:lstStyle/>
+          <a:p>
+            <a:pPr algn="ctr"/>
+            <a:endParaRPr lang="en-US" sz="1600" dirty="0">
+              <a:solidFill>
+                <a:schemeClr val="tx1"/>
+              </a:solidFill>
+              <a:latin typeface="Arial" panose="020B0604020202020204" pitchFamily="34" charset="0"/>
+              <a:cs typeface="Arial" panose="020B0604020202020204" pitchFamily="34" charset="0"/>
+            </a:endParaRPr>
+          </a:p>
+        </p:txBody>
+      </p:sp>
+      <p:cxnSp>
+        <p:nvCxnSpPr>
+          <p:cNvPr id="25" name="Straight Connector 24"/>
+          <p:cNvCxnSpPr>
+            <a:stCxn id="24" idx="2"/>
+          </p:cNvCxnSpPr>
+          <p:nvPr/>
+        </p:nvCxnSpPr>
+        <p:spPr>
+          <a:xfrm flipH="1" flipV="1">
+            <a:off x="6910749" y="5169869"/>
+            <a:ext cx="307733" cy="216870"/>
+          </a:xfrm>
+          <a:prstGeom prst="line">
+            <a:avLst/>
+          </a:prstGeom>
+          <a:ln w="28575">
+            <a:solidFill>
+              <a:schemeClr val="tx1"/>
+            </a:solidFill>
+          </a:ln>
+        </p:spPr>
+        <p:style>
+          <a:lnRef idx="1">
+            <a:schemeClr val="accent1"/>
+          </a:lnRef>
+          <a:fillRef idx="0">
+            <a:schemeClr val="accent1"/>
+          </a:fillRef>
+          <a:effectRef idx="0">
+            <a:schemeClr val="accent1"/>
+          </a:effectRef>
+          <a:fontRef idx="minor">
+            <a:schemeClr val="tx1"/>
+          </a:fontRef>
+        </p:style>
+      </p:cxnSp>
+      <p:sp>
+        <p:nvSpPr>
+          <p:cNvPr id="26" name="TextBox 25"/>
+          <p:cNvSpPr txBox="1"/>
+          <p:nvPr/>
+        </p:nvSpPr>
+        <p:spPr>
+          <a:xfrm>
+            <a:off x="7127631" y="5224788"/>
+            <a:ext cx="509953" cy="338554"/>
+          </a:xfrm>
+          <a:prstGeom prst="rect">
+            <a:avLst/>
+          </a:prstGeom>
+          <a:noFill/>
+        </p:spPr>
+        <p:txBody>
+          <a:bodyPr wrap="square" rtlCol="0">
+            <a:spAutoFit/>
+          </a:bodyPr>
+          <a:lstStyle/>
+          <a:p>
+            <a:r>
+              <a:rPr lang="en-US" sz="1600" dirty="0" smtClean="0">
+                <a:latin typeface="Arial" panose="020B0604020202020204" pitchFamily="34" charset="0"/>
+                <a:cs typeface="Arial" panose="020B0604020202020204" pitchFamily="34" charset="0"/>
+              </a:rPr>
+              <a:t>14</a:t>
+            </a:r>
+            <a:endParaRPr lang="en-US" dirty="0">
+              <a:latin typeface="Arial" panose="020B0604020202020204" pitchFamily="34" charset="0"/>
+              <a:cs typeface="Arial" panose="020B0604020202020204" pitchFamily="34" charset="0"/>
+            </a:endParaRPr>
+          </a:p>
+        </p:txBody>
+      </p:sp>
+      <p:sp>
+        <p:nvSpPr>
+          <p:cNvPr id="27" name="Oval 26"/>
+          <p:cNvSpPr/>
+          <p:nvPr/>
+        </p:nvSpPr>
+        <p:spPr>
+          <a:xfrm>
+            <a:off x="7367959" y="3349859"/>
+            <a:ext cx="228600" cy="228600"/>
+          </a:xfrm>
+          <a:prstGeom prst="ellipse">
+            <a:avLst/>
+          </a:prstGeom>
+          <a:solidFill>
+            <a:schemeClr val="bg1"/>
+          </a:solidFill>
+          <a:ln>
+            <a:solidFill>
+              <a:schemeClr val="tx1"/>
+            </a:solidFill>
+          </a:ln>
+        </p:spPr>
+        <p:style>
+          <a:lnRef idx="2">
+            <a:schemeClr val="accent1">
+              <a:shade val="50000"/>
+            </a:schemeClr>
+          </a:lnRef>
+          <a:fillRef idx="1">
+            <a:schemeClr val="accent1"/>
+          </a:fillRef>
+          <a:effectRef idx="0">
+            <a:schemeClr val="accent1"/>
+          </a:effectRef>
+          <a:fontRef idx="minor">
+            <a:schemeClr val="lt1"/>
+          </a:fontRef>
+        </p:style>
+        <p:txBody>
+          <a:bodyPr rtlCol="0" anchor="ctr"/>
+          <a:lstStyle/>
+          <a:p>
+            <a:pPr algn="ctr"/>
+            <a:endParaRPr lang="en-US" sz="1600" dirty="0">
+              <a:solidFill>
+                <a:schemeClr val="tx1"/>
+              </a:solidFill>
+              <a:latin typeface="Arial" panose="020B0604020202020204" pitchFamily="34" charset="0"/>
+              <a:cs typeface="Arial" panose="020B0604020202020204" pitchFamily="34" charset="0"/>
+            </a:endParaRPr>
+          </a:p>
+        </p:txBody>
+      </p:sp>
+      <p:sp>
+        <p:nvSpPr>
+          <p:cNvPr id="28" name="TextBox 27"/>
+          <p:cNvSpPr txBox="1"/>
+          <p:nvPr/>
+        </p:nvSpPr>
+        <p:spPr>
+          <a:xfrm>
+            <a:off x="7274182" y="3300743"/>
+            <a:ext cx="509953" cy="338554"/>
+          </a:xfrm>
+          <a:prstGeom prst="rect">
+            <a:avLst/>
+          </a:prstGeom>
+          <a:noFill/>
+        </p:spPr>
+        <p:txBody>
+          <a:bodyPr wrap="square" rtlCol="0">
+            <a:spAutoFit/>
+          </a:bodyPr>
+          <a:lstStyle/>
+          <a:p>
+            <a:r>
+              <a:rPr lang="en-US" sz="1600" dirty="0" smtClean="0">
+                <a:latin typeface="Arial" panose="020B0604020202020204" pitchFamily="34" charset="0"/>
+                <a:cs typeface="Arial" panose="020B0604020202020204" pitchFamily="34" charset="0"/>
+              </a:rPr>
+              <a:t>13</a:t>
+            </a:r>
+            <a:endParaRPr lang="en-US" dirty="0">
+              <a:latin typeface="Arial" panose="020B0604020202020204" pitchFamily="34" charset="0"/>
+              <a:cs typeface="Arial" panose="020B0604020202020204" pitchFamily="34" charset="0"/>
+            </a:endParaRPr>
+          </a:p>
+        </p:txBody>
+      </p:sp>
+      <p:sp>
+        <p:nvSpPr>
+          <p:cNvPr id="32" name="Oval 31"/>
+          <p:cNvSpPr/>
+          <p:nvPr/>
+        </p:nvSpPr>
+        <p:spPr>
+          <a:xfrm>
+            <a:off x="4563216" y="3147635"/>
+            <a:ext cx="228600" cy="228600"/>
+          </a:xfrm>
+          <a:prstGeom prst="ellipse">
+            <a:avLst/>
+          </a:prstGeom>
+          <a:solidFill>
+            <a:schemeClr val="bg1"/>
+          </a:solidFill>
+          <a:ln>
+            <a:solidFill>
+              <a:schemeClr val="tx1"/>
+            </a:solidFill>
+          </a:ln>
+        </p:spPr>
+        <p:style>
+          <a:lnRef idx="2">
+            <a:schemeClr val="accent1">
+              <a:shade val="50000"/>
+            </a:schemeClr>
+          </a:lnRef>
+          <a:fillRef idx="1">
+            <a:schemeClr val="accent1"/>
+          </a:fillRef>
+          <a:effectRef idx="0">
+            <a:schemeClr val="accent1"/>
+          </a:effectRef>
+          <a:fontRef idx="minor">
+            <a:schemeClr val="lt1"/>
+          </a:fontRef>
+        </p:style>
+        <p:txBody>
+          <a:bodyPr rtlCol="0" anchor="ctr"/>
+          <a:lstStyle/>
+          <a:p>
+            <a:pPr algn="ctr"/>
+            <a:endParaRPr lang="en-US" sz="1600" dirty="0">
+              <a:solidFill>
+                <a:schemeClr val="tx1"/>
+              </a:solidFill>
+              <a:latin typeface="Arial" panose="020B0604020202020204" pitchFamily="34" charset="0"/>
+              <a:cs typeface="Arial" panose="020B0604020202020204" pitchFamily="34" charset="0"/>
+            </a:endParaRPr>
+          </a:p>
+        </p:txBody>
+      </p:sp>
+      <p:sp>
+        <p:nvSpPr>
+          <p:cNvPr id="33" name="TextBox 32"/>
+          <p:cNvSpPr txBox="1"/>
+          <p:nvPr/>
+        </p:nvSpPr>
+        <p:spPr>
+          <a:xfrm>
+            <a:off x="4457705" y="3108010"/>
+            <a:ext cx="509953" cy="338554"/>
+          </a:xfrm>
+          <a:prstGeom prst="rect">
+            <a:avLst/>
+          </a:prstGeom>
+          <a:noFill/>
+        </p:spPr>
+        <p:txBody>
+          <a:bodyPr wrap="square" rtlCol="0">
+            <a:spAutoFit/>
+          </a:bodyPr>
+          <a:lstStyle/>
+          <a:p>
+            <a:r>
+              <a:rPr lang="en-US" sz="1600" dirty="0" smtClean="0">
+                <a:latin typeface="Arial" panose="020B0604020202020204" pitchFamily="34" charset="0"/>
+                <a:cs typeface="Arial" panose="020B0604020202020204" pitchFamily="34" charset="0"/>
+              </a:rPr>
+              <a:t>16</a:t>
+            </a:r>
+            <a:endParaRPr lang="en-US" dirty="0">
+              <a:latin typeface="Arial" panose="020B0604020202020204" pitchFamily="34" charset="0"/>
+              <a:cs typeface="Arial" panose="020B0604020202020204" pitchFamily="34" charset="0"/>
+            </a:endParaRPr>
+          </a:p>
+        </p:txBody>
+      </p:sp>
+      <p:cxnSp>
+        <p:nvCxnSpPr>
+          <p:cNvPr id="34" name="Straight Connector 33"/>
+          <p:cNvCxnSpPr/>
+          <p:nvPr/>
+        </p:nvCxnSpPr>
+        <p:spPr>
+          <a:xfrm flipV="1">
+            <a:off x="4298584" y="3349860"/>
+            <a:ext cx="304321" cy="136329"/>
+          </a:xfrm>
+          <a:prstGeom prst="line">
+            <a:avLst/>
+          </a:prstGeom>
+          <a:ln w="28575">
+            <a:solidFill>
+              <a:schemeClr val="tx1"/>
+            </a:solidFill>
+          </a:ln>
+        </p:spPr>
+        <p:style>
+          <a:lnRef idx="1">
+            <a:schemeClr val="accent1"/>
+          </a:lnRef>
+          <a:fillRef idx="0">
+            <a:schemeClr val="accent1"/>
+          </a:fillRef>
+          <a:effectRef idx="0">
+            <a:schemeClr val="accent1"/>
+          </a:effectRef>
+          <a:fontRef idx="minor">
+            <a:schemeClr val="tx1"/>
+          </a:fontRef>
+        </p:style>
+      </p:cxnSp>
+      <p:sp>
+        <p:nvSpPr>
+          <p:cNvPr id="35" name="TextBox 34"/>
+          <p:cNvSpPr txBox="1"/>
+          <p:nvPr/>
+        </p:nvSpPr>
+        <p:spPr>
+          <a:xfrm>
+            <a:off x="3569676" y="114300"/>
+            <a:ext cx="395654" cy="307777"/>
+          </a:xfrm>
+          <a:prstGeom prst="rect">
+            <a:avLst/>
+          </a:prstGeom>
+          <a:noFill/>
+        </p:spPr>
+        <p:txBody>
+          <a:bodyPr wrap="square" rtlCol="0">
+            <a:spAutoFit/>
+          </a:bodyPr>
+          <a:lstStyle/>
+          <a:p>
+            <a:r>
+              <a:rPr lang="en-US" sz="1400" b="1" dirty="0" smtClean="0">
+                <a:latin typeface="Arial" panose="020B0604020202020204" pitchFamily="34" charset="0"/>
+                <a:cs typeface="Arial" panose="020B0604020202020204" pitchFamily="34" charset="0"/>
+              </a:rPr>
+              <a:t>A)</a:t>
+            </a:r>
+            <a:endParaRPr lang="en-US" sz="1400" b="1" dirty="0">
+              <a:latin typeface="Arial" panose="020B0604020202020204" pitchFamily="34" charset="0"/>
+              <a:cs typeface="Arial" panose="020B0604020202020204" pitchFamily="34" charset="0"/>
+            </a:endParaRPr>
+          </a:p>
+        </p:txBody>
+      </p:sp>
+      <p:sp>
+        <p:nvSpPr>
+          <p:cNvPr id="36" name="TextBox 35"/>
+          <p:cNvSpPr txBox="1"/>
+          <p:nvPr/>
+        </p:nvSpPr>
+        <p:spPr>
+          <a:xfrm>
+            <a:off x="3569676" y="3134458"/>
+            <a:ext cx="395654" cy="307777"/>
+          </a:xfrm>
+          <a:prstGeom prst="rect">
+            <a:avLst/>
+          </a:prstGeom>
+          <a:noFill/>
+        </p:spPr>
+        <p:txBody>
+          <a:bodyPr wrap="square" rtlCol="0">
+            <a:spAutoFit/>
+          </a:bodyPr>
+          <a:lstStyle/>
+          <a:p>
+            <a:r>
+              <a:rPr lang="en-US" sz="1400" b="1" dirty="0" smtClean="0">
+                <a:latin typeface="Arial" panose="020B0604020202020204" pitchFamily="34" charset="0"/>
+                <a:cs typeface="Arial" panose="020B0604020202020204" pitchFamily="34" charset="0"/>
+              </a:rPr>
+              <a:t>B)</a:t>
+            </a:r>
+            <a:endParaRPr lang="en-US" sz="1400" b="1" dirty="0">
+              <a:latin typeface="Arial" panose="020B0604020202020204" pitchFamily="34" charset="0"/>
+              <a:cs typeface="Arial" panose="020B0604020202020204" pitchFamily="34" charset="0"/>
+            </a:endParaRPr>
+          </a:p>
+        </p:txBody>
+      </p:sp>
+      <p:cxnSp>
+        <p:nvCxnSpPr>
+          <p:cNvPr id="37" name="Straight Connector 36"/>
+          <p:cNvCxnSpPr/>
+          <p:nvPr/>
+        </p:nvCxnSpPr>
+        <p:spPr>
+          <a:xfrm flipV="1">
+            <a:off x="4925833" y="4217962"/>
+            <a:ext cx="83649" cy="151826"/>
+          </a:xfrm>
+          <a:prstGeom prst="line">
+            <a:avLst/>
+          </a:prstGeom>
+          <a:ln w="28575">
+            <a:solidFill>
+              <a:schemeClr val="tx1"/>
+            </a:solidFill>
+          </a:ln>
+        </p:spPr>
+        <p:style>
+          <a:lnRef idx="1">
+            <a:schemeClr val="accent1"/>
+          </a:lnRef>
+          <a:fillRef idx="0">
+            <a:schemeClr val="accent1"/>
+          </a:fillRef>
+          <a:effectRef idx="0">
+            <a:schemeClr val="accent1"/>
+          </a:effectRef>
+          <a:fontRef idx="minor">
+            <a:schemeClr val="tx1"/>
+          </a:fontRef>
+        </p:style>
+      </p:cxnSp>
+      <p:sp>
+        <p:nvSpPr>
+          <p:cNvPr id="43" name="TextBox 42"/>
+          <p:cNvSpPr txBox="1"/>
+          <p:nvPr/>
+        </p:nvSpPr>
+        <p:spPr>
+          <a:xfrm>
+            <a:off x="6532679" y="5686393"/>
+            <a:ext cx="509953" cy="338554"/>
+          </a:xfrm>
+          <a:prstGeom prst="rect">
+            <a:avLst/>
+          </a:prstGeom>
+          <a:noFill/>
+        </p:spPr>
+        <p:txBody>
+          <a:bodyPr wrap="square" rtlCol="0">
+            <a:spAutoFit/>
+          </a:bodyPr>
+          <a:lstStyle/>
+          <a:p>
+            <a:r>
+              <a:rPr lang="en-US" sz="1600" dirty="0" smtClean="0">
+                <a:latin typeface="Arial" panose="020B0604020202020204" pitchFamily="34" charset="0"/>
+                <a:cs typeface="Arial" panose="020B0604020202020204" pitchFamily="34" charset="0"/>
+              </a:rPr>
+              <a:t>10</a:t>
+            </a:r>
+            <a:endParaRPr lang="en-US" dirty="0">
+              <a:latin typeface="Arial" panose="020B0604020202020204" pitchFamily="34" charset="0"/>
+              <a:cs typeface="Arial" panose="020B0604020202020204" pitchFamily="34" charset="0"/>
+            </a:endParaRPr>
+          </a:p>
+        </p:txBody>
+      </p:sp>
+      <p:sp>
+        <p:nvSpPr>
+          <p:cNvPr id="44" name="Oval 43"/>
+          <p:cNvSpPr/>
+          <p:nvPr/>
+        </p:nvSpPr>
+        <p:spPr>
+          <a:xfrm>
+            <a:off x="3601924" y="4619576"/>
+            <a:ext cx="228600" cy="228600"/>
+          </a:xfrm>
+          <a:prstGeom prst="ellipse">
+            <a:avLst/>
+          </a:prstGeom>
+          <a:solidFill>
+            <a:schemeClr val="bg1"/>
+          </a:solidFill>
+          <a:ln>
+            <a:solidFill>
+              <a:schemeClr val="tx1"/>
+            </a:solidFill>
+          </a:ln>
+        </p:spPr>
+        <p:style>
+          <a:lnRef idx="2">
+            <a:schemeClr val="accent1">
+              <a:shade val="50000"/>
+            </a:schemeClr>
+          </a:lnRef>
+          <a:fillRef idx="1">
+            <a:schemeClr val="accent1"/>
+          </a:fillRef>
+          <a:effectRef idx="0">
+            <a:schemeClr val="accent1"/>
+          </a:effectRef>
+          <a:fontRef idx="minor">
+            <a:schemeClr val="lt1"/>
+          </a:fontRef>
+        </p:style>
+        <p:txBody>
+          <a:bodyPr rtlCol="0" anchor="ctr"/>
+          <a:lstStyle/>
+          <a:p>
+            <a:pPr algn="ctr"/>
+            <a:endParaRPr lang="en-US" sz="1600" dirty="0">
+              <a:solidFill>
+                <a:schemeClr val="tx1"/>
+              </a:solidFill>
+              <a:latin typeface="Arial" panose="020B0604020202020204" pitchFamily="34" charset="0"/>
+              <a:cs typeface="Arial" panose="020B0604020202020204" pitchFamily="34" charset="0"/>
+            </a:endParaRPr>
+          </a:p>
+        </p:txBody>
+      </p:sp>
+      <p:sp>
+        <p:nvSpPr>
+          <p:cNvPr id="45" name="TextBox 44"/>
+          <p:cNvSpPr txBox="1"/>
+          <p:nvPr/>
+        </p:nvSpPr>
+        <p:spPr>
+          <a:xfrm>
+            <a:off x="3584335" y="4568269"/>
+            <a:ext cx="509953" cy="338554"/>
+          </a:xfrm>
+          <a:prstGeom prst="rect">
+            <a:avLst/>
+          </a:prstGeom>
+          <a:noFill/>
+        </p:spPr>
+        <p:txBody>
+          <a:bodyPr wrap="square" rtlCol="0">
+            <a:spAutoFit/>
+          </a:bodyPr>
+          <a:lstStyle/>
+          <a:p>
+            <a:r>
+              <a:rPr lang="en-US" sz="1600" dirty="0" smtClean="0">
+                <a:latin typeface="Arial" panose="020B0604020202020204" pitchFamily="34" charset="0"/>
+                <a:cs typeface="Arial" panose="020B0604020202020204" pitchFamily="34" charset="0"/>
+              </a:rPr>
+              <a:t>7</a:t>
+            </a:r>
+            <a:endParaRPr lang="en-US" dirty="0">
+              <a:latin typeface="Arial" panose="020B0604020202020204" pitchFamily="34" charset="0"/>
+              <a:cs typeface="Arial" panose="020B0604020202020204" pitchFamily="34" charset="0"/>
+            </a:endParaRPr>
+          </a:p>
+        </p:txBody>
+      </p:sp>
+      <p:cxnSp>
+        <p:nvCxnSpPr>
+          <p:cNvPr id="46" name="Straight Connector 45"/>
+          <p:cNvCxnSpPr>
+            <a:endCxn id="17" idx="3"/>
+          </p:cNvCxnSpPr>
+          <p:nvPr/>
+        </p:nvCxnSpPr>
+        <p:spPr>
+          <a:xfrm flipV="1">
+            <a:off x="4418895" y="3647558"/>
+            <a:ext cx="315543" cy="84805"/>
+          </a:xfrm>
+          <a:prstGeom prst="line">
+            <a:avLst/>
+          </a:prstGeom>
+          <a:ln w="28575">
+            <a:solidFill>
+              <a:schemeClr val="tx1"/>
+            </a:solidFill>
+          </a:ln>
+        </p:spPr>
+        <p:style>
+          <a:lnRef idx="1">
+            <a:schemeClr val="accent1"/>
+          </a:lnRef>
+          <a:fillRef idx="0">
+            <a:schemeClr val="accent1"/>
+          </a:fillRef>
+          <a:effectRef idx="0">
+            <a:schemeClr val="accent1"/>
+          </a:effectRef>
+          <a:fontRef idx="minor">
+            <a:schemeClr val="tx1"/>
+          </a:fontRef>
+        </p:style>
+      </p:cxnSp>
+      <p:sp>
+        <p:nvSpPr>
+          <p:cNvPr id="47" name="Oval 46"/>
+          <p:cNvSpPr/>
+          <p:nvPr/>
+        </p:nvSpPr>
+        <p:spPr>
+          <a:xfrm>
+            <a:off x="7051433" y="5576502"/>
+            <a:ext cx="228600" cy="228600"/>
+          </a:xfrm>
+          <a:prstGeom prst="ellipse">
+            <a:avLst/>
+          </a:prstGeom>
+          <a:solidFill>
+            <a:schemeClr val="bg1"/>
+          </a:solidFill>
+          <a:ln>
+            <a:solidFill>
+              <a:schemeClr val="tx1"/>
+            </a:solidFill>
+          </a:ln>
+        </p:spPr>
+        <p:style>
+          <a:lnRef idx="2">
+            <a:schemeClr val="accent1">
+              <a:shade val="50000"/>
+            </a:schemeClr>
+          </a:lnRef>
+          <a:fillRef idx="1">
+            <a:schemeClr val="accent1"/>
+          </a:fillRef>
+          <a:effectRef idx="0">
+            <a:schemeClr val="accent1"/>
+          </a:effectRef>
+          <a:fontRef idx="minor">
+            <a:schemeClr val="lt1"/>
+          </a:fontRef>
+        </p:style>
+        <p:txBody>
+          <a:bodyPr rtlCol="0" anchor="ctr"/>
+          <a:lstStyle/>
+          <a:p>
+            <a:pPr algn="ctr"/>
+            <a:endParaRPr lang="en-US" sz="1600" dirty="0">
+              <a:solidFill>
+                <a:schemeClr val="tx1"/>
+              </a:solidFill>
+              <a:latin typeface="Arial" panose="020B0604020202020204" pitchFamily="34" charset="0"/>
+              <a:cs typeface="Arial" panose="020B0604020202020204" pitchFamily="34" charset="0"/>
+            </a:endParaRPr>
+          </a:p>
+        </p:txBody>
+      </p:sp>
+      <p:sp>
+        <p:nvSpPr>
+          <p:cNvPr id="48" name="TextBox 47"/>
+          <p:cNvSpPr txBox="1"/>
+          <p:nvPr/>
+        </p:nvSpPr>
+        <p:spPr>
+          <a:xfrm>
+            <a:off x="7025049" y="5527111"/>
+            <a:ext cx="509953" cy="338554"/>
+          </a:xfrm>
+          <a:prstGeom prst="rect">
+            <a:avLst/>
+          </a:prstGeom>
+          <a:noFill/>
+        </p:spPr>
+        <p:txBody>
+          <a:bodyPr wrap="square" rtlCol="0">
+            <a:spAutoFit/>
+          </a:bodyPr>
+          <a:lstStyle/>
+          <a:p>
+            <a:r>
+              <a:rPr lang="en-US" sz="1600" dirty="0" smtClean="0">
+                <a:latin typeface="Arial" panose="020B0604020202020204" pitchFamily="34" charset="0"/>
+                <a:cs typeface="Arial" panose="020B0604020202020204" pitchFamily="34" charset="0"/>
+              </a:rPr>
+              <a:t>8</a:t>
+            </a:r>
+            <a:endParaRPr lang="en-US" dirty="0">
+              <a:latin typeface="Arial" panose="020B0604020202020204" pitchFamily="34" charset="0"/>
+              <a:cs typeface="Arial" panose="020B0604020202020204" pitchFamily="34" charset="0"/>
+            </a:endParaRPr>
+          </a:p>
+        </p:txBody>
+      </p:sp>
+      <p:cxnSp>
+        <p:nvCxnSpPr>
+          <p:cNvPr id="49" name="Straight Connector 48"/>
+          <p:cNvCxnSpPr>
+            <a:stCxn id="47" idx="1"/>
+          </p:cNvCxnSpPr>
+          <p:nvPr/>
+        </p:nvCxnSpPr>
+        <p:spPr>
+          <a:xfrm flipH="1" flipV="1">
+            <a:off x="7019619" y="5412702"/>
+            <a:ext cx="65292" cy="197278"/>
+          </a:xfrm>
+          <a:prstGeom prst="line">
+            <a:avLst/>
+          </a:prstGeom>
+          <a:ln w="28575">
+            <a:solidFill>
+              <a:schemeClr val="tx1"/>
+            </a:solidFill>
+          </a:ln>
+        </p:spPr>
+        <p:style>
+          <a:lnRef idx="1">
+            <a:schemeClr val="accent1"/>
+          </a:lnRef>
+          <a:fillRef idx="0">
+            <a:schemeClr val="accent1"/>
+          </a:fillRef>
+          <a:effectRef idx="0">
+            <a:schemeClr val="accent1"/>
+          </a:effectRef>
+          <a:fontRef idx="minor">
+            <a:schemeClr val="tx1"/>
+          </a:fontRef>
+        </p:style>
+      </p:cxnSp>
+      <p:cxnSp>
+        <p:nvCxnSpPr>
+          <p:cNvPr id="50" name="Straight Connector 49"/>
+          <p:cNvCxnSpPr/>
+          <p:nvPr/>
+        </p:nvCxnSpPr>
+        <p:spPr>
+          <a:xfrm flipV="1">
+            <a:off x="3774413" y="4276291"/>
+            <a:ext cx="47319" cy="332301"/>
+          </a:xfrm>
+          <a:prstGeom prst="line">
+            <a:avLst/>
+          </a:prstGeom>
+          <a:ln w="28575">
+            <a:solidFill>
+              <a:schemeClr val="tx1"/>
+            </a:solidFill>
+          </a:ln>
+        </p:spPr>
+        <p:style>
+          <a:lnRef idx="1">
+            <a:schemeClr val="accent1"/>
+          </a:lnRef>
+          <a:fillRef idx="0">
+            <a:schemeClr val="accent1"/>
+          </a:fillRef>
+          <a:effectRef idx="0">
+            <a:schemeClr val="accent1"/>
+          </a:effectRef>
+          <a:fontRef idx="minor">
+            <a:schemeClr val="tx1"/>
+          </a:fontRef>
+        </p:style>
+      </p:cxnSp>
+      <p:sp>
+        <p:nvSpPr>
+          <p:cNvPr id="51" name="Oval 50"/>
+          <p:cNvSpPr/>
+          <p:nvPr/>
+        </p:nvSpPr>
+        <p:spPr>
+          <a:xfrm>
+            <a:off x="5820441" y="4917067"/>
+            <a:ext cx="228600" cy="228600"/>
+          </a:xfrm>
+          <a:prstGeom prst="ellipse">
+            <a:avLst/>
+          </a:prstGeom>
+          <a:solidFill>
+            <a:schemeClr val="bg1"/>
+          </a:solidFill>
+          <a:ln>
+            <a:solidFill>
+              <a:schemeClr val="tx1"/>
+            </a:solidFill>
+          </a:ln>
+        </p:spPr>
+        <p:style>
+          <a:lnRef idx="2">
+            <a:schemeClr val="accent1">
+              <a:shade val="50000"/>
+            </a:schemeClr>
+          </a:lnRef>
+          <a:fillRef idx="1">
+            <a:schemeClr val="accent1"/>
+          </a:fillRef>
+          <a:effectRef idx="0">
+            <a:schemeClr val="accent1"/>
+          </a:effectRef>
+          <a:fontRef idx="minor">
+            <a:schemeClr val="lt1"/>
+          </a:fontRef>
+        </p:style>
+        <p:txBody>
+          <a:bodyPr rtlCol="0" anchor="ctr"/>
+          <a:lstStyle/>
+          <a:p>
+            <a:pPr algn="ctr"/>
+            <a:endParaRPr lang="en-US" sz="1600" dirty="0">
+              <a:solidFill>
+                <a:schemeClr val="tx1"/>
+              </a:solidFill>
+              <a:latin typeface="Arial" panose="020B0604020202020204" pitchFamily="34" charset="0"/>
+              <a:cs typeface="Arial" panose="020B0604020202020204" pitchFamily="34" charset="0"/>
+            </a:endParaRPr>
+          </a:p>
+        </p:txBody>
+      </p:sp>
+      <p:sp>
+        <p:nvSpPr>
+          <p:cNvPr id="52" name="TextBox 51"/>
+          <p:cNvSpPr txBox="1"/>
+          <p:nvPr/>
+        </p:nvSpPr>
+        <p:spPr>
+          <a:xfrm>
+            <a:off x="5714932" y="4856968"/>
+            <a:ext cx="509953" cy="338554"/>
+          </a:xfrm>
+          <a:prstGeom prst="rect">
+            <a:avLst/>
+          </a:prstGeom>
+          <a:noFill/>
+        </p:spPr>
+        <p:txBody>
+          <a:bodyPr wrap="square" rtlCol="0">
+            <a:spAutoFit/>
+          </a:bodyPr>
+          <a:lstStyle/>
+          <a:p>
+            <a:r>
+              <a:rPr lang="en-US" sz="1600" dirty="0" smtClean="0">
+                <a:latin typeface="Arial" panose="020B0604020202020204" pitchFamily="34" charset="0"/>
+                <a:cs typeface="Arial" panose="020B0604020202020204" pitchFamily="34" charset="0"/>
+              </a:rPr>
+              <a:t>12</a:t>
+            </a:r>
+            <a:endParaRPr lang="en-US" dirty="0">
+              <a:latin typeface="Arial" panose="020B0604020202020204" pitchFamily="34" charset="0"/>
+              <a:cs typeface="Arial" panose="020B0604020202020204" pitchFamily="34" charset="0"/>
+            </a:endParaRPr>
+          </a:p>
+        </p:txBody>
+      </p:sp>
+      <p:sp>
+        <p:nvSpPr>
+          <p:cNvPr id="53" name="Oval 52"/>
+          <p:cNvSpPr/>
+          <p:nvPr/>
+        </p:nvSpPr>
+        <p:spPr>
+          <a:xfrm>
+            <a:off x="5424788" y="4797645"/>
+            <a:ext cx="228600" cy="228600"/>
+          </a:xfrm>
+          <a:prstGeom prst="ellipse">
+            <a:avLst/>
+          </a:prstGeom>
+          <a:solidFill>
+            <a:schemeClr val="bg1"/>
+          </a:solidFill>
+          <a:ln>
+            <a:solidFill>
+              <a:schemeClr val="tx1"/>
+            </a:solidFill>
+          </a:ln>
+        </p:spPr>
+        <p:style>
+          <a:lnRef idx="2">
+            <a:schemeClr val="accent1">
+              <a:shade val="50000"/>
+            </a:schemeClr>
+          </a:lnRef>
+          <a:fillRef idx="1">
+            <a:schemeClr val="accent1"/>
+          </a:fillRef>
+          <a:effectRef idx="0">
+            <a:schemeClr val="accent1"/>
+          </a:effectRef>
+          <a:fontRef idx="minor">
+            <a:schemeClr val="lt1"/>
+          </a:fontRef>
+        </p:style>
+        <p:txBody>
+          <a:bodyPr rtlCol="0" anchor="ctr"/>
+          <a:lstStyle/>
+          <a:p>
+            <a:pPr algn="ctr"/>
+            <a:endParaRPr lang="en-US" sz="1600" dirty="0">
+              <a:solidFill>
+                <a:schemeClr val="tx1"/>
+              </a:solidFill>
+              <a:latin typeface="Arial" panose="020B0604020202020204" pitchFamily="34" charset="0"/>
+              <a:cs typeface="Arial" panose="020B0604020202020204" pitchFamily="34" charset="0"/>
+            </a:endParaRPr>
+          </a:p>
+        </p:txBody>
+      </p:sp>
+      <p:sp>
+        <p:nvSpPr>
+          <p:cNvPr id="54" name="TextBox 53"/>
+          <p:cNvSpPr txBox="1"/>
+          <p:nvPr/>
+        </p:nvSpPr>
+        <p:spPr>
+          <a:xfrm>
+            <a:off x="5395715" y="4742668"/>
+            <a:ext cx="509953" cy="338554"/>
+          </a:xfrm>
+          <a:prstGeom prst="rect">
+            <a:avLst/>
+          </a:prstGeom>
+          <a:noFill/>
+        </p:spPr>
+        <p:txBody>
+          <a:bodyPr wrap="square" rtlCol="0">
+            <a:spAutoFit/>
+          </a:bodyPr>
+          <a:lstStyle/>
+          <a:p>
+            <a:r>
+              <a:rPr lang="en-US" sz="1600" dirty="0" smtClean="0">
+                <a:latin typeface="Arial" panose="020B0604020202020204" pitchFamily="34" charset="0"/>
+                <a:cs typeface="Arial" panose="020B0604020202020204" pitchFamily="34" charset="0"/>
+              </a:rPr>
+              <a:t>9</a:t>
+            </a:r>
+            <a:endParaRPr lang="en-US" dirty="0">
+              <a:latin typeface="Arial" panose="020B0604020202020204" pitchFamily="34" charset="0"/>
+              <a:cs typeface="Arial" panose="020B0604020202020204" pitchFamily="34" charset="0"/>
+            </a:endParaRPr>
+          </a:p>
+        </p:txBody>
+      </p:sp>
+      <p:sp>
+        <p:nvSpPr>
+          <p:cNvPr id="55" name="TextBox 54"/>
+          <p:cNvSpPr txBox="1"/>
+          <p:nvPr/>
+        </p:nvSpPr>
+        <p:spPr>
+          <a:xfrm>
+            <a:off x="4365387" y="2275742"/>
+            <a:ext cx="1222131" cy="246221"/>
+          </a:xfrm>
+          <a:prstGeom prst="rect">
+            <a:avLst/>
+          </a:prstGeom>
+          <a:noFill/>
+        </p:spPr>
+        <p:txBody>
+          <a:bodyPr wrap="square" rtlCol="0">
+            <a:spAutoFit/>
+          </a:bodyPr>
+          <a:lstStyle/>
+          <a:p>
+            <a:r>
+              <a:rPr lang="en-US" sz="1000" dirty="0" smtClean="0">
+                <a:latin typeface="Arial" panose="020B0604020202020204" pitchFamily="34" charset="0"/>
+                <a:cs typeface="Arial" panose="020B0604020202020204" pitchFamily="34" charset="0"/>
+              </a:rPr>
+              <a:t>(</a:t>
+            </a:r>
+            <a:r>
+              <a:rPr lang="en-US" sz="1000" dirty="0" smtClean="0">
+                <a:latin typeface="Arial" panose="020B0604020202020204" pitchFamily="34" charset="0"/>
+                <a:cs typeface="Arial" panose="020B0604020202020204" pitchFamily="34" charset="0"/>
+              </a:rPr>
+              <a:t>74</a:t>
+            </a:r>
+            <a:r>
+              <a:rPr lang="en-US" sz="1000" dirty="0" smtClean="0">
+                <a:latin typeface="Arial" panose="020B0604020202020204" pitchFamily="34" charset="0"/>
+                <a:cs typeface="Arial" panose="020B0604020202020204" pitchFamily="34" charset="0"/>
+              </a:rPr>
+              <a:t>%)</a:t>
+            </a:r>
+            <a:endParaRPr lang="en-US" sz="1000" dirty="0">
+              <a:latin typeface="Arial" panose="020B0604020202020204" pitchFamily="34" charset="0"/>
+              <a:cs typeface="Arial" panose="020B0604020202020204" pitchFamily="34" charset="0"/>
+            </a:endParaRPr>
+          </a:p>
+        </p:txBody>
+      </p:sp>
+      <p:sp>
+        <p:nvSpPr>
+          <p:cNvPr id="56" name="TextBox 55"/>
+          <p:cNvSpPr txBox="1"/>
+          <p:nvPr/>
+        </p:nvSpPr>
+        <p:spPr>
+          <a:xfrm>
+            <a:off x="4642354" y="2454569"/>
+            <a:ext cx="1222131" cy="246221"/>
+          </a:xfrm>
+          <a:prstGeom prst="rect">
+            <a:avLst/>
+          </a:prstGeom>
+          <a:noFill/>
+        </p:spPr>
+        <p:txBody>
+          <a:bodyPr wrap="square" rtlCol="0">
+            <a:spAutoFit/>
+          </a:bodyPr>
+          <a:lstStyle/>
+          <a:p>
+            <a:r>
+              <a:rPr lang="en-US" sz="1000" dirty="0" smtClean="0">
+                <a:latin typeface="Arial" panose="020B0604020202020204" pitchFamily="34" charset="0"/>
+                <a:cs typeface="Arial" panose="020B0604020202020204" pitchFamily="34" charset="0"/>
+              </a:rPr>
+              <a:t>(</a:t>
+            </a:r>
+            <a:r>
+              <a:rPr lang="en-US" sz="1000" dirty="0" smtClean="0">
+                <a:latin typeface="Arial" panose="020B0604020202020204" pitchFamily="34" charset="0"/>
+                <a:cs typeface="Arial" panose="020B0604020202020204" pitchFamily="34" charset="0"/>
+              </a:rPr>
+              <a:t>22</a:t>
+            </a:r>
+            <a:r>
+              <a:rPr lang="en-US" sz="1000" dirty="0" smtClean="0">
+                <a:latin typeface="Arial" panose="020B0604020202020204" pitchFamily="34" charset="0"/>
+                <a:cs typeface="Arial" panose="020B0604020202020204" pitchFamily="34" charset="0"/>
+              </a:rPr>
+              <a:t>%)</a:t>
+            </a:r>
+            <a:endParaRPr lang="en-US" sz="1000" dirty="0">
+              <a:latin typeface="Arial" panose="020B0604020202020204" pitchFamily="34" charset="0"/>
+              <a:cs typeface="Arial" panose="020B0604020202020204" pitchFamily="34" charset="0"/>
+            </a:endParaRPr>
+          </a:p>
+        </p:txBody>
+      </p:sp>
+      <p:sp>
+        <p:nvSpPr>
+          <p:cNvPr id="57" name="TextBox 56"/>
+          <p:cNvSpPr txBox="1"/>
+          <p:nvPr/>
+        </p:nvSpPr>
+        <p:spPr>
+          <a:xfrm>
+            <a:off x="4382971" y="2631910"/>
+            <a:ext cx="1222131" cy="246221"/>
+          </a:xfrm>
+          <a:prstGeom prst="rect">
+            <a:avLst/>
+          </a:prstGeom>
+          <a:noFill/>
+        </p:spPr>
+        <p:txBody>
+          <a:bodyPr wrap="square" rtlCol="0">
+            <a:spAutoFit/>
+          </a:bodyPr>
+          <a:lstStyle/>
+          <a:p>
+            <a:r>
+              <a:rPr lang="en-US" sz="1000" dirty="0" smtClean="0">
+                <a:latin typeface="Arial" panose="020B0604020202020204" pitchFamily="34" charset="0"/>
+                <a:cs typeface="Arial" panose="020B0604020202020204" pitchFamily="34" charset="0"/>
+              </a:rPr>
+              <a:t>(4%)</a:t>
+            </a:r>
+            <a:endParaRPr lang="en-US" sz="1000" dirty="0">
+              <a:latin typeface="Arial" panose="020B0604020202020204" pitchFamily="34" charset="0"/>
+              <a:cs typeface="Arial" panose="020B0604020202020204" pitchFamily="34" charset="0"/>
+            </a:endParaRPr>
+          </a:p>
+        </p:txBody>
+      </p:sp>
+      <p:cxnSp>
+        <p:nvCxnSpPr>
+          <p:cNvPr id="62" name="Straight Connector 61"/>
+          <p:cNvCxnSpPr/>
+          <p:nvPr/>
+        </p:nvCxnSpPr>
+        <p:spPr>
+          <a:xfrm flipV="1">
+            <a:off x="4990883" y="4815971"/>
+            <a:ext cx="178656" cy="63752"/>
+          </a:xfrm>
+          <a:prstGeom prst="line">
+            <a:avLst/>
+          </a:prstGeom>
+          <a:ln w="28575">
+            <a:solidFill>
+              <a:schemeClr val="tx1"/>
+            </a:solidFill>
+          </a:ln>
+        </p:spPr>
+        <p:style>
+          <a:lnRef idx="1">
+            <a:schemeClr val="accent1"/>
+          </a:lnRef>
+          <a:fillRef idx="0">
+            <a:schemeClr val="accent1"/>
+          </a:fillRef>
+          <a:effectRef idx="0">
+            <a:schemeClr val="accent1"/>
+          </a:effectRef>
+          <a:fontRef idx="minor">
+            <a:schemeClr val="tx1"/>
+          </a:fontRef>
+        </p:style>
+      </p:cxnSp>
+      <p:cxnSp>
+        <p:nvCxnSpPr>
+          <p:cNvPr id="67" name="Straight Connector 66"/>
+          <p:cNvCxnSpPr/>
+          <p:nvPr/>
+        </p:nvCxnSpPr>
+        <p:spPr>
+          <a:xfrm flipV="1">
+            <a:off x="5403473" y="5029473"/>
+            <a:ext cx="83649" cy="151826"/>
+          </a:xfrm>
+          <a:prstGeom prst="line">
+            <a:avLst/>
+          </a:prstGeom>
+          <a:ln w="28575">
+            <a:solidFill>
+              <a:schemeClr val="tx1"/>
+            </a:solidFill>
+          </a:ln>
+        </p:spPr>
+        <p:style>
+          <a:lnRef idx="1">
+            <a:schemeClr val="accent1"/>
+          </a:lnRef>
+          <a:fillRef idx="0">
+            <a:schemeClr val="accent1"/>
+          </a:fillRef>
+          <a:effectRef idx="0">
+            <a:schemeClr val="accent1"/>
+          </a:effectRef>
+          <a:fontRef idx="minor">
+            <a:schemeClr val="tx1"/>
+          </a:fontRef>
+        </p:style>
+      </p:cxnSp>
+      <p:sp>
+        <p:nvSpPr>
+          <p:cNvPr id="69" name="TextBox 68"/>
+          <p:cNvSpPr txBox="1"/>
+          <p:nvPr/>
+        </p:nvSpPr>
+        <p:spPr>
+          <a:xfrm>
+            <a:off x="7561685" y="4824763"/>
+            <a:ext cx="509953" cy="338554"/>
+          </a:xfrm>
+          <a:prstGeom prst="rect">
+            <a:avLst/>
+          </a:prstGeom>
+          <a:noFill/>
+        </p:spPr>
+        <p:txBody>
+          <a:bodyPr wrap="square" rtlCol="0">
+            <a:spAutoFit/>
+          </a:bodyPr>
+          <a:lstStyle/>
+          <a:p>
+            <a:r>
+              <a:rPr lang="en-US" sz="1600" dirty="0" smtClean="0">
+                <a:latin typeface="Arial" panose="020B0604020202020204" pitchFamily="34" charset="0"/>
+                <a:cs typeface="Arial" panose="020B0604020202020204" pitchFamily="34" charset="0"/>
+              </a:rPr>
+              <a:t>11</a:t>
+            </a:r>
+            <a:endParaRPr lang="en-US" dirty="0">
+              <a:latin typeface="Arial" panose="020B0604020202020204" pitchFamily="34" charset="0"/>
+              <a:cs typeface="Arial" panose="020B0604020202020204" pitchFamily="34" charset="0"/>
+            </a:endParaRPr>
+          </a:p>
+        </p:txBody>
+      </p:sp>
+      <p:cxnSp>
+        <p:nvCxnSpPr>
+          <p:cNvPr id="70" name="Straight Connector 69"/>
+          <p:cNvCxnSpPr/>
+          <p:nvPr/>
+        </p:nvCxnSpPr>
+        <p:spPr>
+          <a:xfrm flipV="1">
+            <a:off x="5881783" y="5155359"/>
+            <a:ext cx="83649" cy="151826"/>
+          </a:xfrm>
+          <a:prstGeom prst="line">
+            <a:avLst/>
+          </a:prstGeom>
+          <a:ln w="28575">
+            <a:solidFill>
+              <a:schemeClr val="tx1"/>
+            </a:solidFill>
+          </a:ln>
+        </p:spPr>
+        <p:style>
+          <a:lnRef idx="1">
+            <a:schemeClr val="accent1"/>
+          </a:lnRef>
+          <a:fillRef idx="0">
+            <a:schemeClr val="accent1"/>
+          </a:fillRef>
+          <a:effectRef idx="0">
+            <a:schemeClr val="accent1"/>
+          </a:effectRef>
+          <a:fontRef idx="minor">
+            <a:schemeClr val="tx1"/>
+          </a:fontRef>
+        </p:style>
+      </p:cxnSp>
+      <p:sp>
+        <p:nvSpPr>
+          <p:cNvPr id="72" name="TextBox 71"/>
+          <p:cNvSpPr txBox="1"/>
+          <p:nvPr/>
+        </p:nvSpPr>
+        <p:spPr>
+          <a:xfrm>
+            <a:off x="7584923" y="4577102"/>
+            <a:ext cx="509953" cy="338554"/>
+          </a:xfrm>
+          <a:prstGeom prst="rect">
+            <a:avLst/>
+          </a:prstGeom>
+          <a:noFill/>
+        </p:spPr>
+        <p:txBody>
+          <a:bodyPr wrap="square" rtlCol="0">
+            <a:spAutoFit/>
+          </a:bodyPr>
+          <a:lstStyle/>
+          <a:p>
+            <a:r>
+              <a:rPr lang="en-US" sz="1600" dirty="0" smtClean="0">
+                <a:latin typeface="Arial" panose="020B0604020202020204" pitchFamily="34" charset="0"/>
+                <a:cs typeface="Arial" panose="020B0604020202020204" pitchFamily="34" charset="0"/>
+              </a:rPr>
+              <a:t>15</a:t>
+            </a:r>
+            <a:endParaRPr lang="en-US" dirty="0">
+              <a:latin typeface="Arial" panose="020B0604020202020204" pitchFamily="34" charset="0"/>
+              <a:cs typeface="Arial" panose="020B0604020202020204" pitchFamily="34" charset="0"/>
+            </a:endParaRPr>
+          </a:p>
+        </p:txBody>
+      </p:sp>
+    </p:spTree>
+    <p:extLst>
+      <p:ext uri="{BB962C8B-B14F-4D97-AF65-F5344CB8AC3E}">
+        <p14:creationId xmlns:p14="http://schemas.microsoft.com/office/powerpoint/2010/main" val="786038959"/>
       </p:ext>
     </p:extLst>
   </p:cSld>

</xml_diff>

<commit_message>
final tweaks before submission
</commit_message>
<xml_diff>
--- a/Figures/piecing_together_figs.pptx
+++ b/Figures/piecing_together_figs.pptx
@@ -205,7 +205,7 @@
           <a:p>
             <a:fld id="{E21A01C1-7195-4936-AB8D-A0C52A614CAA}" type="datetimeFigureOut">
               <a:rPr lang="en-US" smtClean="0"/>
-              <a:t>6/17/2021</a:t>
+              <a:t>6/22/2021</a:t>
             </a:fld>
             <a:endParaRPr lang="en-US"/>
           </a:p>
@@ -980,7 +980,7 @@
           <a:p>
             <a:fld id="{24F71ACE-7A2E-44C7-BEB0-E2DBFE9F86D8}" type="datetimeFigureOut">
               <a:rPr lang="en-US" smtClean="0"/>
-              <a:t>6/17/2021</a:t>
+              <a:t>6/22/2021</a:t>
             </a:fld>
             <a:endParaRPr lang="en-US"/>
           </a:p>
@@ -1150,7 +1150,7 @@
           <a:p>
             <a:fld id="{24F71ACE-7A2E-44C7-BEB0-E2DBFE9F86D8}" type="datetimeFigureOut">
               <a:rPr lang="en-US" smtClean="0"/>
-              <a:t>6/17/2021</a:t>
+              <a:t>6/22/2021</a:t>
             </a:fld>
             <a:endParaRPr lang="en-US"/>
           </a:p>
@@ -1330,7 +1330,7 @@
           <a:p>
             <a:fld id="{24F71ACE-7A2E-44C7-BEB0-E2DBFE9F86D8}" type="datetimeFigureOut">
               <a:rPr lang="en-US" smtClean="0"/>
-              <a:t>6/17/2021</a:t>
+              <a:t>6/22/2021</a:t>
             </a:fld>
             <a:endParaRPr lang="en-US"/>
           </a:p>
@@ -1500,7 +1500,7 @@
           <a:p>
             <a:fld id="{24F71ACE-7A2E-44C7-BEB0-E2DBFE9F86D8}" type="datetimeFigureOut">
               <a:rPr lang="en-US" smtClean="0"/>
-              <a:t>6/17/2021</a:t>
+              <a:t>6/22/2021</a:t>
             </a:fld>
             <a:endParaRPr lang="en-US"/>
           </a:p>
@@ -1746,7 +1746,7 @@
           <a:p>
             <a:fld id="{24F71ACE-7A2E-44C7-BEB0-E2DBFE9F86D8}" type="datetimeFigureOut">
               <a:rPr lang="en-US" smtClean="0"/>
-              <a:t>6/17/2021</a:t>
+              <a:t>6/22/2021</a:t>
             </a:fld>
             <a:endParaRPr lang="en-US"/>
           </a:p>
@@ -1978,7 +1978,7 @@
           <a:p>
             <a:fld id="{24F71ACE-7A2E-44C7-BEB0-E2DBFE9F86D8}" type="datetimeFigureOut">
               <a:rPr lang="en-US" smtClean="0"/>
-              <a:t>6/17/2021</a:t>
+              <a:t>6/22/2021</a:t>
             </a:fld>
             <a:endParaRPr lang="en-US"/>
           </a:p>
@@ -2345,7 +2345,7 @@
           <a:p>
             <a:fld id="{24F71ACE-7A2E-44C7-BEB0-E2DBFE9F86D8}" type="datetimeFigureOut">
               <a:rPr lang="en-US" smtClean="0"/>
-              <a:t>6/17/2021</a:t>
+              <a:t>6/22/2021</a:t>
             </a:fld>
             <a:endParaRPr lang="en-US"/>
           </a:p>
@@ -2463,7 +2463,7 @@
           <a:p>
             <a:fld id="{24F71ACE-7A2E-44C7-BEB0-E2DBFE9F86D8}" type="datetimeFigureOut">
               <a:rPr lang="en-US" smtClean="0"/>
-              <a:t>6/17/2021</a:t>
+              <a:t>6/22/2021</a:t>
             </a:fld>
             <a:endParaRPr lang="en-US"/>
           </a:p>
@@ -2558,7 +2558,7 @@
           <a:p>
             <a:fld id="{24F71ACE-7A2E-44C7-BEB0-E2DBFE9F86D8}" type="datetimeFigureOut">
               <a:rPr lang="en-US" smtClean="0"/>
-              <a:t>6/17/2021</a:t>
+              <a:t>6/22/2021</a:t>
             </a:fld>
             <a:endParaRPr lang="en-US"/>
           </a:p>
@@ -2835,7 +2835,7 @@
           <a:p>
             <a:fld id="{24F71ACE-7A2E-44C7-BEB0-E2DBFE9F86D8}" type="datetimeFigureOut">
               <a:rPr lang="en-US" smtClean="0"/>
-              <a:t>6/17/2021</a:t>
+              <a:t>6/22/2021</a:t>
             </a:fld>
             <a:endParaRPr lang="en-US"/>
           </a:p>
@@ -3088,7 +3088,7 @@
           <a:p>
             <a:fld id="{24F71ACE-7A2E-44C7-BEB0-E2DBFE9F86D8}" type="datetimeFigureOut">
               <a:rPr lang="en-US" smtClean="0"/>
-              <a:t>6/17/2021</a:t>
+              <a:t>6/22/2021</a:t>
             </a:fld>
             <a:endParaRPr lang="en-US"/>
           </a:p>
@@ -3301,7 +3301,7 @@
           <a:p>
             <a:fld id="{24F71ACE-7A2E-44C7-BEB0-E2DBFE9F86D8}" type="datetimeFigureOut">
               <a:rPr lang="en-US" smtClean="0"/>
-              <a:t>6/17/2021</a:t>
+              <a:t>6/22/2021</a:t>
             </a:fld>
             <a:endParaRPr lang="en-US"/>
           </a:p>
@@ -3708,13 +3708,7 @@
       </p:grpSpPr>
       <p:pic>
         <p:nvPicPr>
-          <p:cNvPr id="4" name="Picture 3">
-            <a:extLst>
-              <a:ext uri="{FF2B5EF4-FFF2-40B4-BE49-F238E27FC236}">
-                <a16:creationId xmlns:a16="http://schemas.microsoft.com/office/drawing/2014/main" id="{9CF9DF68-2311-4CE1-B837-876F6ADDC24F}"/>
-              </a:ext>
-            </a:extLst>
-          </p:cNvPr>
+          <p:cNvPr id="32" name="Picture 31"/>
           <p:cNvPicPr>
             <a:picLocks noChangeAspect="1"/>
           </p:cNvPicPr>
@@ -3728,28 +3722,25 @@
               </a:ext>
             </a:extLst>
           </a:blip>
-          <a:srcRect l="10816" t="12769" r="24666" b="27418"/>
+          <a:srcRect l="10458" t="12691" r="24837" b="27308"/>
           <a:stretch/>
         </p:blipFill>
         <p:spPr>
           <a:xfrm>
-            <a:off x="3856195" y="287935"/>
-            <a:ext cx="3419063" cy="4101946"/>
+            <a:off x="3846258" y="300453"/>
+            <a:ext cx="3429000" cy="4114800"/>
           </a:xfrm>
           <a:prstGeom prst="rect">
             <a:avLst/>
           </a:prstGeom>
+          <a:ln>
+            <a:noFill/>
+          </a:ln>
         </p:spPr>
       </p:pic>
       <p:pic>
         <p:nvPicPr>
-          <p:cNvPr id="5" name="Picture 4">
-            <a:extLst>
-              <a:ext uri="{FF2B5EF4-FFF2-40B4-BE49-F238E27FC236}">
-                <a16:creationId xmlns:a16="http://schemas.microsoft.com/office/drawing/2014/main" id="{23D3EEAC-8E72-4DD1-9797-345E2DEAE07F}"/>
-              </a:ext>
-            </a:extLst>
-          </p:cNvPr>
+          <p:cNvPr id="31" name="Picture 30"/>
           <p:cNvPicPr>
             <a:picLocks noChangeAspect="1"/>
           </p:cNvPicPr>
@@ -3763,17 +3754,20 @@
               </a:ext>
             </a:extLst>
           </a:blip>
-          <a:srcRect l="10198" t="12769" r="25057" b="27418"/>
+          <a:srcRect l="10458" t="12693" r="25003" b="27308"/>
           <a:stretch/>
         </p:blipFill>
         <p:spPr>
           <a:xfrm>
-            <a:off x="297826" y="286317"/>
-            <a:ext cx="3431033" cy="4101947"/>
+            <a:off x="296518" y="300453"/>
+            <a:ext cx="3420208" cy="4114800"/>
           </a:xfrm>
           <a:prstGeom prst="rect">
             <a:avLst/>
           </a:prstGeom>
+          <a:ln>
+            <a:noFill/>
+          </a:ln>
         </p:spPr>
       </p:pic>
       <p:sp>
@@ -3900,7 +3894,7 @@
         </p:nvSpPr>
         <p:spPr>
           <a:xfrm>
-            <a:off x="2568319" y="4052137"/>
+            <a:off x="2550735" y="4052137"/>
             <a:ext cx="281688" cy="240770"/>
           </a:xfrm>
           <a:prstGeom prst="star5">
@@ -4077,11 +4071,18 @@
           <a:lstStyle/>
           <a:p>
             <a:r>
+              <a:rPr lang="en-US" b="1" dirty="0" smtClean="0">
+                <a:latin typeface="Arial" panose="020B0604020202020204" pitchFamily="34" charset="0"/>
+                <a:cs typeface="Arial" panose="020B0604020202020204" pitchFamily="34" charset="0"/>
+              </a:rPr>
+              <a:t>(a</a:t>
+            </a:r>
+            <a:r>
               <a:rPr lang="en-US" b="1" dirty="0">
                 <a:latin typeface="Arial" panose="020B0604020202020204" pitchFamily="34" charset="0"/>
                 <a:cs typeface="Arial" panose="020B0604020202020204" pitchFamily="34" charset="0"/>
               </a:rPr>
-              <a:t>a)</a:t>
+              <a:t>)</a:t>
             </a:r>
           </a:p>
         </p:txBody>
@@ -4115,11 +4116,18 @@
           <a:lstStyle/>
           <a:p>
             <a:r>
+              <a:rPr lang="en-US" b="1" dirty="0" smtClean="0">
+                <a:latin typeface="Arial" panose="020B0604020202020204" pitchFamily="34" charset="0"/>
+                <a:cs typeface="Arial" panose="020B0604020202020204" pitchFamily="34" charset="0"/>
+              </a:rPr>
+              <a:t>(b</a:t>
+            </a:r>
+            <a:r>
               <a:rPr lang="en-US" b="1" dirty="0">
                 <a:latin typeface="Arial" panose="020B0604020202020204" pitchFamily="34" charset="0"/>
                 <a:cs typeface="Arial" panose="020B0604020202020204" pitchFamily="34" charset="0"/>
               </a:rPr>
-              <a:t>b)</a:t>
+              <a:t>)</a:t>
             </a:r>
           </a:p>
         </p:txBody>
@@ -4507,7 +4515,7 @@
         </p:nvSpPr>
         <p:spPr>
           <a:xfrm>
-            <a:off x="1686201" y="3818875"/>
+            <a:off x="1668617" y="3810083"/>
             <a:ext cx="1610135" cy="307777"/>
           </a:xfrm>
           <a:prstGeom prst="rect">
@@ -13459,13 +13467,13 @@
       </p:grpSpPr>
       <p:pic>
         <p:nvPicPr>
-          <p:cNvPr id="5" name="Picture 4"/>
+          <p:cNvPr id="3" name="Picture 2"/>
           <p:cNvPicPr>
             <a:picLocks noChangeAspect="1"/>
           </p:cNvPicPr>
           <p:nvPr/>
         </p:nvPicPr>
-        <p:blipFill>
+        <p:blipFill rotWithShape="1">
           <a:blip r:embed="rId3" cstate="print">
             <a:extLst>
               <a:ext uri="{28A0092B-C50C-407E-A947-70E740481C1C}">
@@ -13473,14 +13481,13 @@
               </a:ext>
             </a:extLst>
           </a:blip>
-          <a:stretch>
-            <a:fillRect/>
-          </a:stretch>
+          <a:srcRect t="1923" r="12227" b="11282"/>
+          <a:stretch/>
         </p:blipFill>
         <p:spPr>
           <a:xfrm>
-            <a:off x="3446318" y="0"/>
-            <a:ext cx="5299364" cy="6858000"/>
+            <a:off x="3446318" y="131885"/>
+            <a:ext cx="4651397" cy="5952392"/>
           </a:xfrm>
           <a:prstGeom prst="rect">
             <a:avLst/>
@@ -14614,8 +14621,8 @@
         </p:nvSpPr>
         <p:spPr>
           <a:xfrm>
-            <a:off x="3569676" y="114300"/>
-            <a:ext cx="395654" cy="307777"/>
+            <a:off x="3446318" y="114300"/>
+            <a:ext cx="519012" cy="307777"/>
           </a:xfrm>
           <a:prstGeom prst="rect">
             <a:avLst/>
@@ -14633,7 +14640,14 @@
                 <a:latin typeface="Arial" panose="020B0604020202020204" pitchFamily="34" charset="0"/>
                 <a:cs typeface="Arial" panose="020B0604020202020204" pitchFamily="34" charset="0"/>
               </a:rPr>
-              <a:t>a)</a:t>
+              <a:t>(a</a:t>
+            </a:r>
+            <a:r>
+              <a:rPr lang="en-US" sz="1400" b="1" dirty="0" smtClean="0">
+                <a:latin typeface="Arial" panose="020B0604020202020204" pitchFamily="34" charset="0"/>
+                <a:cs typeface="Arial" panose="020B0604020202020204" pitchFamily="34" charset="0"/>
+              </a:rPr>
+              <a:t>)</a:t>
             </a:r>
             <a:endParaRPr lang="en-US" sz="1400" b="1" dirty="0">
               <a:latin typeface="Arial" panose="020B0604020202020204" pitchFamily="34" charset="0"/>
@@ -14650,8 +14664,8 @@
         </p:nvSpPr>
         <p:spPr>
           <a:xfrm>
-            <a:off x="3569676" y="3134458"/>
-            <a:ext cx="395654" cy="307777"/>
+            <a:off x="3446318" y="3134458"/>
+            <a:ext cx="519012" cy="307777"/>
           </a:xfrm>
           <a:prstGeom prst="rect">
             <a:avLst/>
@@ -14669,7 +14683,14 @@
                 <a:latin typeface="Arial" panose="020B0604020202020204" pitchFamily="34" charset="0"/>
                 <a:cs typeface="Arial" panose="020B0604020202020204" pitchFamily="34" charset="0"/>
               </a:rPr>
-              <a:t>b)</a:t>
+              <a:t>(b</a:t>
+            </a:r>
+            <a:r>
+              <a:rPr lang="en-US" sz="1400" b="1" dirty="0" smtClean="0">
+                <a:latin typeface="Arial" panose="020B0604020202020204" pitchFamily="34" charset="0"/>
+                <a:cs typeface="Arial" panose="020B0604020202020204" pitchFamily="34" charset="0"/>
+              </a:rPr>
+              <a:t>)</a:t>
             </a:r>
             <a:endParaRPr lang="en-US" sz="1400" b="1" dirty="0">
               <a:latin typeface="Arial" panose="020B0604020202020204" pitchFamily="34" charset="0"/>

</xml_diff>